<commit_message>
Addedd figures that show the distrbutyion of point and gridded flood reports
</commit_message>
<xml_diff>
--- a/Manuscript/Figures/03_DATA_PointFR_2019_2020.pptx
+++ b/Manuscript/Figures/03_DATA_PointFR_2019_2020.pptx
@@ -2,12 +2,12 @@
 <file path=ppt/presentation.xml><?xml version="1.0" encoding="utf-8"?>
 <p:presentation xmlns:a="http://schemas.openxmlformats.org/drawingml/2006/main" xmlns:r="http://schemas.openxmlformats.org/officeDocument/2006/relationships" xmlns:p="http://schemas.openxmlformats.org/presentationml/2006/main" saveSubsetFonts="1">
   <p:sldMasterIdLst>
-    <p:sldMasterId id="2147483708" r:id="rId1"/>
+    <p:sldMasterId id="2147483720" r:id="rId1"/>
   </p:sldMasterIdLst>
   <p:sldIdLst>
     <p:sldId id="257" r:id="rId2"/>
   </p:sldIdLst>
-  <p:sldSz cx="5292725" cy="8496300"/>
+  <p:sldSz cx="4824413" cy="7775575"/>
   <p:notesSz cx="6858000" cy="9144000"/>
   <p:defaultTextStyle>
     <a:defPPr>
@@ -115,7 +115,7 @@
 <file path=ppt/revisionInfo.xml><?xml version="1.0" encoding="utf-8"?>
 <p1510:revInfo xmlns:a="http://schemas.openxmlformats.org/drawingml/2006/main" xmlns:r="http://schemas.openxmlformats.org/officeDocument/2006/relationships" xmlns:p1510="http://schemas.microsoft.com/office/powerpoint/2015/10/main">
   <p1510:revLst>
-    <p1510:client id="{126645AD-FFD9-48D7-998E-55749BAE9F89}" v="16" dt="2022-09-26T16:41:38.835"/>
+    <p1510:client id="{DC5D3258-78EA-403B-A7A3-C0A744C4755F}" v="21" dt="2023-10-09T16:28:13.449"/>
   </p1510:revLst>
 </p1510:revInfo>
 </file>
@@ -1063,6 +1063,854 @@
             <ac:picMk id="107" creationId="{65FF2E0B-15FE-4DF7-A739-B68E8F4BC61C}"/>
           </ac:picMkLst>
         </pc:picChg>
+      </pc:sldChg>
+    </pc:docChg>
+  </pc:docChgLst>
+  <pc:docChgLst>
+    <pc:chgData name="Fatima Pillosu" userId="a6295d4dc9e22643" providerId="LiveId" clId="{DC5D3258-78EA-403B-A7A3-C0A744C4755F}"/>
+    <pc:docChg chg="undo custSel modSld">
+      <pc:chgData name="Fatima Pillosu" userId="a6295d4dc9e22643" providerId="LiveId" clId="{DC5D3258-78EA-403B-A7A3-C0A744C4755F}" dt="2023-10-09T16:30:54.358" v="695" actId="207"/>
+      <pc:docMkLst>
+        <pc:docMk/>
+      </pc:docMkLst>
+      <pc:sldChg chg="addSp delSp modSp mod">
+        <pc:chgData name="Fatima Pillosu" userId="a6295d4dc9e22643" providerId="LiveId" clId="{DC5D3258-78EA-403B-A7A3-C0A744C4755F}" dt="2023-10-09T16:30:54.358" v="695" actId="207"/>
+        <pc:sldMkLst>
+          <pc:docMk/>
+          <pc:sldMk cId="757844797" sldId="257"/>
+        </pc:sldMkLst>
+        <pc:spChg chg="add mod">
+          <ac:chgData name="Fatima Pillosu" userId="a6295d4dc9e22643" providerId="LiveId" clId="{DC5D3258-78EA-403B-A7A3-C0A744C4755F}" dt="2023-10-09T14:50:32.399" v="82" actId="164"/>
+          <ac:spMkLst>
+            <pc:docMk/>
+            <pc:sldMk cId="757844797" sldId="257"/>
+            <ac:spMk id="15" creationId="{CB08F722-571B-14FE-C89F-102A788D7733}"/>
+          </ac:spMkLst>
+        </pc:spChg>
+        <pc:spChg chg="add mod">
+          <ac:chgData name="Fatima Pillosu" userId="a6295d4dc9e22643" providerId="LiveId" clId="{DC5D3258-78EA-403B-A7A3-C0A744C4755F}" dt="2023-10-09T14:50:57.907" v="86" actId="164"/>
+          <ac:spMkLst>
+            <pc:docMk/>
+            <pc:sldMk cId="757844797" sldId="257"/>
+            <ac:spMk id="16" creationId="{30E3BC50-0AD4-8B06-32EF-138B13212C78}"/>
+          </ac:spMkLst>
+        </pc:spChg>
+        <pc:spChg chg="add mod">
+          <ac:chgData name="Fatima Pillosu" userId="a6295d4dc9e22643" providerId="LiveId" clId="{DC5D3258-78EA-403B-A7A3-C0A744C4755F}" dt="2023-10-09T14:50:39.401" v="83" actId="164"/>
+          <ac:spMkLst>
+            <pc:docMk/>
+            <pc:sldMk cId="757844797" sldId="257"/>
+            <ac:spMk id="17" creationId="{0590DDEB-8E5B-6423-D947-57D3133DB0B2}"/>
+          </ac:spMkLst>
+        </pc:spChg>
+        <pc:spChg chg="add mod">
+          <ac:chgData name="Fatima Pillosu" userId="a6295d4dc9e22643" providerId="LiveId" clId="{DC5D3258-78EA-403B-A7A3-C0A744C4755F}" dt="2023-10-09T14:50:44.164" v="84" actId="164"/>
+          <ac:spMkLst>
+            <pc:docMk/>
+            <pc:sldMk cId="757844797" sldId="257"/>
+            <ac:spMk id="18" creationId="{E33C8199-EA27-CD13-A3BD-FD8034F7DDDF}"/>
+          </ac:spMkLst>
+        </pc:spChg>
+        <pc:spChg chg="add mod">
+          <ac:chgData name="Fatima Pillosu" userId="a6295d4dc9e22643" providerId="LiveId" clId="{DC5D3258-78EA-403B-A7A3-C0A744C4755F}" dt="2023-10-09T14:50:48.704" v="85" actId="164"/>
+          <ac:spMkLst>
+            <pc:docMk/>
+            <pc:sldMk cId="757844797" sldId="257"/>
+            <ac:spMk id="19" creationId="{3CCAF412-41F7-6803-73ED-BBC8749620B5}"/>
+          </ac:spMkLst>
+        </pc:spChg>
+        <pc:spChg chg="add mod">
+          <ac:chgData name="Fatima Pillosu" userId="a6295d4dc9e22643" providerId="LiveId" clId="{DC5D3258-78EA-403B-A7A3-C0A744C4755F}" dt="2023-10-09T14:51:02.562" v="87" actId="164"/>
+          <ac:spMkLst>
+            <pc:docMk/>
+            <pc:sldMk cId="757844797" sldId="257"/>
+            <ac:spMk id="20" creationId="{F2E2A7DA-906D-0C02-C3DA-4E0DCDF61E81}"/>
+          </ac:spMkLst>
+        </pc:spChg>
+        <pc:spChg chg="add del mod">
+          <ac:chgData name="Fatima Pillosu" userId="a6295d4dc9e22643" providerId="LiveId" clId="{DC5D3258-78EA-403B-A7A3-C0A744C4755F}" dt="2023-10-09T16:03:26.127" v="136" actId="478"/>
+          <ac:spMkLst>
+            <pc:docMk/>
+            <pc:sldMk cId="757844797" sldId="257"/>
+            <ac:spMk id="27" creationId="{49005135-F30D-8794-2DCF-887CC744D24A}"/>
+          </ac:spMkLst>
+        </pc:spChg>
+        <pc:spChg chg="add del mod">
+          <ac:chgData name="Fatima Pillosu" userId="a6295d4dc9e22643" providerId="LiveId" clId="{DC5D3258-78EA-403B-A7A3-C0A744C4755F}" dt="2023-10-09T16:03:24.379" v="135" actId="478"/>
+          <ac:spMkLst>
+            <pc:docMk/>
+            <pc:sldMk cId="757844797" sldId="257"/>
+            <ac:spMk id="28" creationId="{D822F288-0951-C7AC-24AB-1D57E2A9BAB4}"/>
+          </ac:spMkLst>
+        </pc:spChg>
+        <pc:spChg chg="del mod topLvl">
+          <ac:chgData name="Fatima Pillosu" userId="a6295d4dc9e22643" providerId="LiveId" clId="{DC5D3258-78EA-403B-A7A3-C0A744C4755F}" dt="2023-10-09T16:27:54.601" v="685" actId="21"/>
+          <ac:spMkLst>
+            <pc:docMk/>
+            <pc:sldMk cId="757844797" sldId="257"/>
+            <ac:spMk id="36" creationId="{9BEE48C2-CA14-4B69-88A2-87E59D384FE2}"/>
+          </ac:spMkLst>
+        </pc:spChg>
+        <pc:spChg chg="del mod topLvl">
+          <ac:chgData name="Fatima Pillosu" userId="a6295d4dc9e22643" providerId="LiveId" clId="{DC5D3258-78EA-403B-A7A3-C0A744C4755F}" dt="2023-10-09T16:27:54.601" v="685" actId="21"/>
+          <ac:spMkLst>
+            <pc:docMk/>
+            <pc:sldMk cId="757844797" sldId="257"/>
+            <ac:spMk id="37" creationId="{0123747F-4327-4A3F-AA0A-EC34732D5666}"/>
+          </ac:spMkLst>
+        </pc:spChg>
+        <pc:spChg chg="del mod topLvl">
+          <ac:chgData name="Fatima Pillosu" userId="a6295d4dc9e22643" providerId="LiveId" clId="{DC5D3258-78EA-403B-A7A3-C0A744C4755F}" dt="2023-10-09T16:27:54.601" v="685" actId="21"/>
+          <ac:spMkLst>
+            <pc:docMk/>
+            <pc:sldMk cId="757844797" sldId="257"/>
+            <ac:spMk id="38" creationId="{F37BACEB-E65F-4CC5-8B77-44D06A4C4C80}"/>
+          </ac:spMkLst>
+        </pc:spChg>
+        <pc:spChg chg="add del mod">
+          <ac:chgData name="Fatima Pillosu" userId="a6295d4dc9e22643" providerId="LiveId" clId="{DC5D3258-78EA-403B-A7A3-C0A744C4755F}" dt="2023-10-09T16:27:54.601" v="685" actId="21"/>
+          <ac:spMkLst>
+            <pc:docMk/>
+            <pc:sldMk cId="757844797" sldId="257"/>
+            <ac:spMk id="56" creationId="{B5BA8D3D-8BD0-D160-E08C-885F56AF77FE}"/>
+          </ac:spMkLst>
+        </pc:spChg>
+        <pc:spChg chg="add del mod">
+          <ac:chgData name="Fatima Pillosu" userId="a6295d4dc9e22643" providerId="LiveId" clId="{DC5D3258-78EA-403B-A7A3-C0A744C4755F}" dt="2023-10-09T16:27:54.601" v="685" actId="21"/>
+          <ac:spMkLst>
+            <pc:docMk/>
+            <pc:sldMk cId="757844797" sldId="257"/>
+            <ac:spMk id="57" creationId="{21C7788D-8640-5BFE-7459-D980126B3F4A}"/>
+          </ac:spMkLst>
+        </pc:spChg>
+        <pc:spChg chg="add del mod">
+          <ac:chgData name="Fatima Pillosu" userId="a6295d4dc9e22643" providerId="LiveId" clId="{DC5D3258-78EA-403B-A7A3-C0A744C4755F}" dt="2023-10-09T16:27:52.779" v="684" actId="478"/>
+          <ac:spMkLst>
+            <pc:docMk/>
+            <pc:sldMk cId="757844797" sldId="257"/>
+            <ac:spMk id="58" creationId="{0CF63E93-7CEB-3211-18CB-891EAF543B48}"/>
+          </ac:spMkLst>
+        </pc:spChg>
+        <pc:spChg chg="add mod">
+          <ac:chgData name="Fatima Pillosu" userId="a6295d4dc9e22643" providerId="LiveId" clId="{DC5D3258-78EA-403B-A7A3-C0A744C4755F}" dt="2023-10-09T16:28:13.449" v="686"/>
+          <ac:spMkLst>
+            <pc:docMk/>
+            <pc:sldMk cId="757844797" sldId="257"/>
+            <ac:spMk id="59" creationId="{CED439DF-2D7E-B3C5-67FF-360353E14808}"/>
+          </ac:spMkLst>
+        </pc:spChg>
+        <pc:spChg chg="add mod">
+          <ac:chgData name="Fatima Pillosu" userId="a6295d4dc9e22643" providerId="LiveId" clId="{DC5D3258-78EA-403B-A7A3-C0A744C4755F}" dt="2023-10-09T16:28:25.768" v="688" actId="1035"/>
+          <ac:spMkLst>
+            <pc:docMk/>
+            <pc:sldMk cId="757844797" sldId="257"/>
+            <ac:spMk id="60" creationId="{ADB5DB83-0619-8A7D-5971-A4CCAD0A65E5}"/>
+          </ac:spMkLst>
+        </pc:spChg>
+        <pc:spChg chg="add mod">
+          <ac:chgData name="Fatima Pillosu" userId="a6295d4dc9e22643" providerId="LiveId" clId="{DC5D3258-78EA-403B-A7A3-C0A744C4755F}" dt="2023-10-09T16:28:13.449" v="686"/>
+          <ac:spMkLst>
+            <pc:docMk/>
+            <pc:sldMk cId="757844797" sldId="257"/>
+            <ac:spMk id="61" creationId="{EC0E2FD2-8D57-68B3-3268-75019ED7E471}"/>
+          </ac:spMkLst>
+        </pc:spChg>
+        <pc:spChg chg="add mod">
+          <ac:chgData name="Fatima Pillosu" userId="a6295d4dc9e22643" providerId="LiveId" clId="{DC5D3258-78EA-403B-A7A3-C0A744C4755F}" dt="2023-10-09T16:28:13.449" v="686"/>
+          <ac:spMkLst>
+            <pc:docMk/>
+            <pc:sldMk cId="757844797" sldId="257"/>
+            <ac:spMk id="62" creationId="{AB8CFB82-E9B0-CD22-AB9A-C42F588EAE4A}"/>
+          </ac:spMkLst>
+        </pc:spChg>
+        <pc:spChg chg="add mod">
+          <ac:chgData name="Fatima Pillosu" userId="a6295d4dc9e22643" providerId="LiveId" clId="{DC5D3258-78EA-403B-A7A3-C0A744C4755F}" dt="2023-10-09T16:30:07.371" v="691" actId="207"/>
+          <ac:spMkLst>
+            <pc:docMk/>
+            <pc:sldMk cId="757844797" sldId="257"/>
+            <ac:spMk id="63" creationId="{1E62147A-98D3-6078-0E2E-3664BE5A0902}"/>
+          </ac:spMkLst>
+        </pc:spChg>
+        <pc:spChg chg="add mod">
+          <ac:chgData name="Fatima Pillosu" userId="a6295d4dc9e22643" providerId="LiveId" clId="{DC5D3258-78EA-403B-A7A3-C0A744C4755F}" dt="2023-10-09T16:30:40.579" v="694" actId="207"/>
+          <ac:spMkLst>
+            <pc:docMk/>
+            <pc:sldMk cId="757844797" sldId="257"/>
+            <ac:spMk id="64" creationId="{F063DA2A-4C9F-78C4-A56C-1202D061135B}"/>
+          </ac:spMkLst>
+        </pc:spChg>
+        <pc:spChg chg="add mod">
+          <ac:chgData name="Fatima Pillosu" userId="a6295d4dc9e22643" providerId="LiveId" clId="{DC5D3258-78EA-403B-A7A3-C0A744C4755F}" dt="2023-10-09T16:30:54.358" v="695" actId="207"/>
+          <ac:spMkLst>
+            <pc:docMk/>
+            <pc:sldMk cId="757844797" sldId="257"/>
+            <ac:spMk id="65" creationId="{7C230A14-CA86-A885-4714-2D622CBE1B51}"/>
+          </ac:spMkLst>
+        </pc:spChg>
+        <pc:spChg chg="add mod">
+          <ac:chgData name="Fatima Pillosu" userId="a6295d4dc9e22643" providerId="LiveId" clId="{DC5D3258-78EA-403B-A7A3-C0A744C4755F}" dt="2023-10-09T16:28:33.156" v="690" actId="1036"/>
+          <ac:spMkLst>
+            <pc:docMk/>
+            <pc:sldMk cId="757844797" sldId="257"/>
+            <ac:spMk id="66" creationId="{E37A1976-8171-5789-3387-0D6F842E4D4C}"/>
+          </ac:spMkLst>
+        </pc:spChg>
+        <pc:spChg chg="add mod">
+          <ac:chgData name="Fatima Pillosu" userId="a6295d4dc9e22643" providerId="LiveId" clId="{DC5D3258-78EA-403B-A7A3-C0A744C4755F}" dt="2023-10-09T16:28:13.449" v="686"/>
+          <ac:spMkLst>
+            <pc:docMk/>
+            <pc:sldMk cId="757844797" sldId="257"/>
+            <ac:spMk id="67" creationId="{DCA67142-A09A-5247-AC6F-13E80FADC4C9}"/>
+          </ac:spMkLst>
+        </pc:spChg>
+        <pc:spChg chg="add mod">
+          <ac:chgData name="Fatima Pillosu" userId="a6295d4dc9e22643" providerId="LiveId" clId="{DC5D3258-78EA-403B-A7A3-C0A744C4755F}" dt="2023-10-09T16:28:13.449" v="686"/>
+          <ac:spMkLst>
+            <pc:docMk/>
+            <pc:sldMk cId="757844797" sldId="257"/>
+            <ac:spMk id="68" creationId="{0D9022CD-908A-6AF7-B87C-4E5D77B34010}"/>
+          </ac:spMkLst>
+        </pc:spChg>
+        <pc:spChg chg="add mod">
+          <ac:chgData name="Fatima Pillosu" userId="a6295d4dc9e22643" providerId="LiveId" clId="{DC5D3258-78EA-403B-A7A3-C0A744C4755F}" dt="2023-10-09T16:28:25.768" v="688" actId="1035"/>
+          <ac:spMkLst>
+            <pc:docMk/>
+            <pc:sldMk cId="757844797" sldId="257"/>
+            <ac:spMk id="75" creationId="{78E9F1CB-8298-B91F-438E-D510F52FEA28}"/>
+          </ac:spMkLst>
+        </pc:spChg>
+        <pc:spChg chg="add mod">
+          <ac:chgData name="Fatima Pillosu" userId="a6295d4dc9e22643" providerId="LiveId" clId="{DC5D3258-78EA-403B-A7A3-C0A744C4755F}" dt="2023-10-09T16:28:25.768" v="688" actId="1035"/>
+          <ac:spMkLst>
+            <pc:docMk/>
+            <pc:sldMk cId="757844797" sldId="257"/>
+            <ac:spMk id="76" creationId="{716361D2-FEFE-6BF7-DD82-D2938962FB00}"/>
+          </ac:spMkLst>
+        </pc:spChg>
+        <pc:spChg chg="add mod">
+          <ac:chgData name="Fatima Pillosu" userId="a6295d4dc9e22643" providerId="LiveId" clId="{DC5D3258-78EA-403B-A7A3-C0A744C4755F}" dt="2023-10-09T16:28:25.768" v="688" actId="1035"/>
+          <ac:spMkLst>
+            <pc:docMk/>
+            <pc:sldMk cId="757844797" sldId="257"/>
+            <ac:spMk id="77" creationId="{EFB5CF1A-5073-DC8B-3FE0-977FA870996B}"/>
+          </ac:spMkLst>
+        </pc:spChg>
+        <pc:spChg chg="add mod">
+          <ac:chgData name="Fatima Pillosu" userId="a6295d4dc9e22643" providerId="LiveId" clId="{DC5D3258-78EA-403B-A7A3-C0A744C4755F}" dt="2023-10-09T16:28:25.768" v="688" actId="1035"/>
+          <ac:spMkLst>
+            <pc:docMk/>
+            <pc:sldMk cId="757844797" sldId="257"/>
+            <ac:spMk id="78" creationId="{A641455B-8A00-B3BE-B0D9-B4A7D7E6EA80}"/>
+          </ac:spMkLst>
+        </pc:spChg>
+        <pc:spChg chg="add mod">
+          <ac:chgData name="Fatima Pillosu" userId="a6295d4dc9e22643" providerId="LiveId" clId="{DC5D3258-78EA-403B-A7A3-C0A744C4755F}" dt="2023-10-09T16:28:25.768" v="688" actId="1035"/>
+          <ac:spMkLst>
+            <pc:docMk/>
+            <pc:sldMk cId="757844797" sldId="257"/>
+            <ac:spMk id="79" creationId="{0979CDC5-F480-F87E-B8E0-3112261875C3}"/>
+          </ac:spMkLst>
+        </pc:spChg>
+        <pc:spChg chg="add mod">
+          <ac:chgData name="Fatima Pillosu" userId="a6295d4dc9e22643" providerId="LiveId" clId="{DC5D3258-78EA-403B-A7A3-C0A744C4755F}" dt="2023-10-09T16:28:25.768" v="688" actId="1035"/>
+          <ac:spMkLst>
+            <pc:docMk/>
+            <pc:sldMk cId="757844797" sldId="257"/>
+            <ac:spMk id="80" creationId="{25352047-C30C-B405-F79D-792CA5BF09B5}"/>
+          </ac:spMkLst>
+        </pc:spChg>
+        <pc:spChg chg="add mod">
+          <ac:chgData name="Fatima Pillosu" userId="a6295d4dc9e22643" providerId="LiveId" clId="{DC5D3258-78EA-403B-A7A3-C0A744C4755F}" dt="2023-10-09T16:28:25.768" v="688" actId="1035"/>
+          <ac:spMkLst>
+            <pc:docMk/>
+            <pc:sldMk cId="757844797" sldId="257"/>
+            <ac:spMk id="81" creationId="{B66E93D2-201C-DF19-6C23-B59BA0DA9F23}"/>
+          </ac:spMkLst>
+        </pc:spChg>
+        <pc:spChg chg="add mod">
+          <ac:chgData name="Fatima Pillosu" userId="a6295d4dc9e22643" providerId="LiveId" clId="{DC5D3258-78EA-403B-A7A3-C0A744C4755F}" dt="2023-10-09T16:28:25.768" v="688" actId="1035"/>
+          <ac:spMkLst>
+            <pc:docMk/>
+            <pc:sldMk cId="757844797" sldId="257"/>
+            <ac:spMk id="82" creationId="{5AD4E0C3-D847-7048-88AE-742598B249F3}"/>
+          </ac:spMkLst>
+        </pc:spChg>
+        <pc:spChg chg="del mod">
+          <ac:chgData name="Fatima Pillosu" userId="a6295d4dc9e22643" providerId="LiveId" clId="{DC5D3258-78EA-403B-A7A3-C0A744C4755F}" dt="2023-10-09T16:27:54.601" v="685" actId="21"/>
+          <ac:spMkLst>
+            <pc:docMk/>
+            <pc:sldMk cId="757844797" sldId="257"/>
+            <ac:spMk id="92" creationId="{37D9B613-D9C0-469C-BBC9-EEFE4A85A77A}"/>
+          </ac:spMkLst>
+        </pc:spChg>
+        <pc:spChg chg="del mod">
+          <ac:chgData name="Fatima Pillosu" userId="a6295d4dc9e22643" providerId="LiveId" clId="{DC5D3258-78EA-403B-A7A3-C0A744C4755F}" dt="2023-10-09T16:27:54.601" v="685" actId="21"/>
+          <ac:spMkLst>
+            <pc:docMk/>
+            <pc:sldMk cId="757844797" sldId="257"/>
+            <ac:spMk id="93" creationId="{9D06E09E-CD98-438C-A701-22FF937B3ED0}"/>
+          </ac:spMkLst>
+        </pc:spChg>
+        <pc:spChg chg="del mod topLvl">
+          <ac:chgData name="Fatima Pillosu" userId="a6295d4dc9e22643" providerId="LiveId" clId="{DC5D3258-78EA-403B-A7A3-C0A744C4755F}" dt="2023-10-09T16:27:54.601" v="685" actId="21"/>
+          <ac:spMkLst>
+            <pc:docMk/>
+            <pc:sldMk cId="757844797" sldId="257"/>
+            <ac:spMk id="95" creationId="{E9980B4C-2EFC-49A7-90B4-9C9A97721C26}"/>
+          </ac:spMkLst>
+        </pc:spChg>
+        <pc:spChg chg="del mod topLvl">
+          <ac:chgData name="Fatima Pillosu" userId="a6295d4dc9e22643" providerId="LiveId" clId="{DC5D3258-78EA-403B-A7A3-C0A744C4755F}" dt="2023-10-09T16:27:54.601" v="685" actId="21"/>
+          <ac:spMkLst>
+            <pc:docMk/>
+            <pc:sldMk cId="757844797" sldId="257"/>
+            <ac:spMk id="96" creationId="{99A3E4F1-8198-4D88-AE12-C7F3BBAF4306}"/>
+          </ac:spMkLst>
+        </pc:spChg>
+        <pc:spChg chg="del mod topLvl">
+          <ac:chgData name="Fatima Pillosu" userId="a6295d4dc9e22643" providerId="LiveId" clId="{DC5D3258-78EA-403B-A7A3-C0A744C4755F}" dt="2023-10-09T16:27:54.601" v="685" actId="21"/>
+          <ac:spMkLst>
+            <pc:docMk/>
+            <pc:sldMk cId="757844797" sldId="257"/>
+            <ac:spMk id="97" creationId="{294CA738-FE67-4CF4-9E40-86060B91CFDE}"/>
+          </ac:spMkLst>
+        </pc:spChg>
+        <pc:spChg chg="del mod topLvl">
+          <ac:chgData name="Fatima Pillosu" userId="a6295d4dc9e22643" providerId="LiveId" clId="{DC5D3258-78EA-403B-A7A3-C0A744C4755F}" dt="2023-10-09T16:27:54.601" v="685" actId="21"/>
+          <ac:spMkLst>
+            <pc:docMk/>
+            <pc:sldMk cId="757844797" sldId="257"/>
+            <ac:spMk id="98" creationId="{B3C4AA53-4B7A-4886-BA01-9DEB0993365A}"/>
+          </ac:spMkLst>
+        </pc:spChg>
+        <pc:spChg chg="del mod ord">
+          <ac:chgData name="Fatima Pillosu" userId="a6295d4dc9e22643" providerId="LiveId" clId="{DC5D3258-78EA-403B-A7A3-C0A744C4755F}" dt="2023-10-09T16:27:54.601" v="685" actId="21"/>
+          <ac:spMkLst>
+            <pc:docMk/>
+            <pc:sldMk cId="757844797" sldId="257"/>
+            <ac:spMk id="99" creationId="{BF248943-4EAD-4B54-8A2E-E71AF1EE239F}"/>
+          </ac:spMkLst>
+        </pc:spChg>
+        <pc:spChg chg="del mod">
+          <ac:chgData name="Fatima Pillosu" userId="a6295d4dc9e22643" providerId="LiveId" clId="{DC5D3258-78EA-403B-A7A3-C0A744C4755F}" dt="2023-10-09T16:27:54.601" v="685" actId="21"/>
+          <ac:spMkLst>
+            <pc:docMk/>
+            <pc:sldMk cId="757844797" sldId="257"/>
+            <ac:spMk id="109" creationId="{55779BBD-849C-4FD7-A1FC-BD93F101E1AB}"/>
+          </ac:spMkLst>
+        </pc:spChg>
+        <pc:spChg chg="del mod">
+          <ac:chgData name="Fatima Pillosu" userId="a6295d4dc9e22643" providerId="LiveId" clId="{DC5D3258-78EA-403B-A7A3-C0A744C4755F}" dt="2023-10-09T16:22:08.918" v="397" actId="478"/>
+          <ac:spMkLst>
+            <pc:docMk/>
+            <pc:sldMk cId="757844797" sldId="257"/>
+            <ac:spMk id="110" creationId="{AFD52EBA-12FB-4422-9823-FE0863D8E1F6}"/>
+          </ac:spMkLst>
+        </pc:spChg>
+        <pc:spChg chg="del mod ord">
+          <ac:chgData name="Fatima Pillosu" userId="a6295d4dc9e22643" providerId="LiveId" clId="{DC5D3258-78EA-403B-A7A3-C0A744C4755F}" dt="2023-10-09T16:27:54.601" v="685" actId="21"/>
+          <ac:spMkLst>
+            <pc:docMk/>
+            <pc:sldMk cId="757844797" sldId="257"/>
+            <ac:spMk id="111" creationId="{71DC6237-B2A6-490B-BA6E-0C6F816A8A81}"/>
+          </ac:spMkLst>
+        </pc:spChg>
+        <pc:spChg chg="del mod">
+          <ac:chgData name="Fatima Pillosu" userId="a6295d4dc9e22643" providerId="LiveId" clId="{DC5D3258-78EA-403B-A7A3-C0A744C4755F}" dt="2023-10-09T16:22:10.541" v="398" actId="478"/>
+          <ac:spMkLst>
+            <pc:docMk/>
+            <pc:sldMk cId="757844797" sldId="257"/>
+            <ac:spMk id="112" creationId="{928A9739-1930-41B0-BF0D-B0840A6BC98B}"/>
+          </ac:spMkLst>
+        </pc:spChg>
+        <pc:spChg chg="del mod ord">
+          <ac:chgData name="Fatima Pillosu" userId="a6295d4dc9e22643" providerId="LiveId" clId="{DC5D3258-78EA-403B-A7A3-C0A744C4755F}" dt="2023-10-09T16:27:54.601" v="685" actId="21"/>
+          <ac:spMkLst>
+            <pc:docMk/>
+            <pc:sldMk cId="757844797" sldId="257"/>
+            <ac:spMk id="113" creationId="{948A4E9F-0DCD-44B0-A049-D468D58D7A00}"/>
+          </ac:spMkLst>
+        </pc:spChg>
+        <pc:spChg chg="del mod ord">
+          <ac:chgData name="Fatima Pillosu" userId="a6295d4dc9e22643" providerId="LiveId" clId="{DC5D3258-78EA-403B-A7A3-C0A744C4755F}" dt="2023-10-09T16:27:54.601" v="685" actId="21"/>
+          <ac:spMkLst>
+            <pc:docMk/>
+            <pc:sldMk cId="757844797" sldId="257"/>
+            <ac:spMk id="114" creationId="{898FE3E2-3D30-4BF0-B727-F5A6861060D1}"/>
+          </ac:spMkLst>
+        </pc:spChg>
+        <pc:spChg chg="del mod ord">
+          <ac:chgData name="Fatima Pillosu" userId="a6295d4dc9e22643" providerId="LiveId" clId="{DC5D3258-78EA-403B-A7A3-C0A744C4755F}" dt="2023-10-09T16:27:54.601" v="685" actId="21"/>
+          <ac:spMkLst>
+            <pc:docMk/>
+            <pc:sldMk cId="757844797" sldId="257"/>
+            <ac:spMk id="115" creationId="{39A92815-0DCA-4786-979B-FDE7DE11801D}"/>
+          </ac:spMkLst>
+        </pc:spChg>
+        <pc:spChg chg="del mod ord">
+          <ac:chgData name="Fatima Pillosu" userId="a6295d4dc9e22643" providerId="LiveId" clId="{DC5D3258-78EA-403B-A7A3-C0A744C4755F}" dt="2023-10-09T16:27:54.601" v="685" actId="21"/>
+          <ac:spMkLst>
+            <pc:docMk/>
+            <pc:sldMk cId="757844797" sldId="257"/>
+            <ac:spMk id="116" creationId="{A7BEB4BB-01F0-40C9-A47A-CFFCBAF653E2}"/>
+          </ac:spMkLst>
+        </pc:spChg>
+        <pc:grpChg chg="del mod">
+          <ac:chgData name="Fatima Pillosu" userId="a6295d4dc9e22643" providerId="LiveId" clId="{DC5D3258-78EA-403B-A7A3-C0A744C4755F}" dt="2023-10-09T16:22:36.519" v="400" actId="165"/>
+          <ac:grpSpMkLst>
+            <pc:docMk/>
+            <pc:sldMk cId="757844797" sldId="257"/>
+            <ac:grpSpMk id="2" creationId="{18546E26-0DAE-4868-A527-05FBE2F241BA}"/>
+          </ac:grpSpMkLst>
+        </pc:grpChg>
+        <pc:grpChg chg="add del mod">
+          <ac:chgData name="Fatima Pillosu" userId="a6295d4dc9e22643" providerId="LiveId" clId="{DC5D3258-78EA-403B-A7A3-C0A744C4755F}" dt="2023-10-09T16:03:22.703" v="134" actId="478"/>
+          <ac:grpSpMkLst>
+            <pc:docMk/>
+            <pc:sldMk cId="757844797" sldId="257"/>
+            <ac:grpSpMk id="21" creationId="{8AA8A364-30D2-55AD-8D90-B042BF92EFF4}"/>
+          </ac:grpSpMkLst>
+        </pc:grpChg>
+        <pc:grpChg chg="add del mod">
+          <ac:chgData name="Fatima Pillosu" userId="a6295d4dc9e22643" providerId="LiveId" clId="{DC5D3258-78EA-403B-A7A3-C0A744C4755F}" dt="2023-10-09T16:03:26.599" v="137" actId="478"/>
+          <ac:grpSpMkLst>
+            <pc:docMk/>
+            <pc:sldMk cId="757844797" sldId="257"/>
+            <ac:grpSpMk id="22" creationId="{BFB66EFC-33DF-0481-ACA9-ABA1CFF51564}"/>
+          </ac:grpSpMkLst>
+        </pc:grpChg>
+        <pc:grpChg chg="add del mod">
+          <ac:chgData name="Fatima Pillosu" userId="a6295d4dc9e22643" providerId="LiveId" clId="{DC5D3258-78EA-403B-A7A3-C0A744C4755F}" dt="2023-10-09T16:03:27.087" v="138" actId="478"/>
+          <ac:grpSpMkLst>
+            <pc:docMk/>
+            <pc:sldMk cId="757844797" sldId="257"/>
+            <ac:grpSpMk id="23" creationId="{CF324607-41D1-80A0-5123-0875EC68C526}"/>
+          </ac:grpSpMkLst>
+        </pc:grpChg>
+        <pc:grpChg chg="add del mod">
+          <ac:chgData name="Fatima Pillosu" userId="a6295d4dc9e22643" providerId="LiveId" clId="{DC5D3258-78EA-403B-A7A3-C0A744C4755F}" dt="2023-10-09T16:03:22.167" v="133" actId="478"/>
+          <ac:grpSpMkLst>
+            <pc:docMk/>
+            <pc:sldMk cId="757844797" sldId="257"/>
+            <ac:grpSpMk id="24" creationId="{133C4005-7F19-ABC5-F15B-EF8B2296CBE7}"/>
+          </ac:grpSpMkLst>
+        </pc:grpChg>
+        <pc:grpChg chg="add del mod">
+          <ac:chgData name="Fatima Pillosu" userId="a6295d4dc9e22643" providerId="LiveId" clId="{DC5D3258-78EA-403B-A7A3-C0A744C4755F}" dt="2023-10-09T16:03:27.966" v="140" actId="478"/>
+          <ac:grpSpMkLst>
+            <pc:docMk/>
+            <pc:sldMk cId="757844797" sldId="257"/>
+            <ac:grpSpMk id="25" creationId="{96DD1E25-C4F7-0E3C-8038-02EEB1AC2F90}"/>
+          </ac:grpSpMkLst>
+        </pc:grpChg>
+        <pc:grpChg chg="add del mod">
+          <ac:chgData name="Fatima Pillosu" userId="a6295d4dc9e22643" providerId="LiveId" clId="{DC5D3258-78EA-403B-A7A3-C0A744C4755F}" dt="2023-10-09T16:03:27.519" v="139" actId="478"/>
+          <ac:grpSpMkLst>
+            <pc:docMk/>
+            <pc:sldMk cId="757844797" sldId="257"/>
+            <ac:grpSpMk id="26" creationId="{24019F3F-4BED-56BE-E2FF-5D78476FE129}"/>
+          </ac:grpSpMkLst>
+        </pc:grpChg>
+        <pc:grpChg chg="del">
+          <ac:chgData name="Fatima Pillosu" userId="a6295d4dc9e22643" providerId="LiveId" clId="{DC5D3258-78EA-403B-A7A3-C0A744C4755F}" dt="2023-10-09T14:42:03.371" v="5" actId="478"/>
+          <ac:grpSpMkLst>
+            <pc:docMk/>
+            <pc:sldMk cId="757844797" sldId="257"/>
+            <ac:grpSpMk id="83" creationId="{08889A1E-937E-4C4F-8348-725EAEA453C9}"/>
+          </ac:grpSpMkLst>
+        </pc:grpChg>
+        <pc:grpChg chg="del">
+          <ac:chgData name="Fatima Pillosu" userId="a6295d4dc9e22643" providerId="LiveId" clId="{DC5D3258-78EA-403B-A7A3-C0A744C4755F}" dt="2023-10-09T14:42:02.298" v="3" actId="478"/>
+          <ac:grpSpMkLst>
+            <pc:docMk/>
+            <pc:sldMk cId="757844797" sldId="257"/>
+            <ac:grpSpMk id="86" creationId="{59286259-A77E-43CC-BB29-5455BA280895}"/>
+          </ac:grpSpMkLst>
+        </pc:grpChg>
+        <pc:grpChg chg="del mod">
+          <ac:chgData name="Fatima Pillosu" userId="a6295d4dc9e22643" providerId="LiveId" clId="{DC5D3258-78EA-403B-A7A3-C0A744C4755F}" dt="2023-10-09T14:42:00.996" v="1" actId="478"/>
+          <ac:grpSpMkLst>
+            <pc:docMk/>
+            <pc:sldMk cId="757844797" sldId="257"/>
+            <ac:grpSpMk id="89" creationId="{3A2D4E9A-0093-4709-A1DA-C580661D622B}"/>
+          </ac:grpSpMkLst>
+        </pc:grpChg>
+        <pc:grpChg chg="del">
+          <ac:chgData name="Fatima Pillosu" userId="a6295d4dc9e22643" providerId="LiveId" clId="{DC5D3258-78EA-403B-A7A3-C0A744C4755F}" dt="2023-10-09T14:42:03.828" v="6" actId="478"/>
+          <ac:grpSpMkLst>
+            <pc:docMk/>
+            <pc:sldMk cId="757844797" sldId="257"/>
+            <ac:grpSpMk id="100" creationId="{745601C8-8CDC-4891-B9F0-2D9B3B30AFE5}"/>
+          </ac:grpSpMkLst>
+        </pc:grpChg>
+        <pc:grpChg chg="del">
+          <ac:chgData name="Fatima Pillosu" userId="a6295d4dc9e22643" providerId="LiveId" clId="{DC5D3258-78EA-403B-A7A3-C0A744C4755F}" dt="2023-10-09T14:42:02.737" v="4" actId="478"/>
+          <ac:grpSpMkLst>
+            <pc:docMk/>
+            <pc:sldMk cId="757844797" sldId="257"/>
+            <ac:grpSpMk id="103" creationId="{FC3CE34D-0ADE-42E4-BA77-FB893A9D5D23}"/>
+          </ac:grpSpMkLst>
+        </pc:grpChg>
+        <pc:grpChg chg="del">
+          <ac:chgData name="Fatima Pillosu" userId="a6295d4dc9e22643" providerId="LiveId" clId="{DC5D3258-78EA-403B-A7A3-C0A744C4755F}" dt="2023-10-09T14:42:01.656" v="2" actId="478"/>
+          <ac:grpSpMkLst>
+            <pc:docMk/>
+            <pc:sldMk cId="757844797" sldId="257"/>
+            <ac:grpSpMk id="106" creationId="{3D979CE6-A489-4A82-88E1-06B4A3FAFC3C}"/>
+          </ac:grpSpMkLst>
+        </pc:grpChg>
+        <pc:picChg chg="add mod modCrop">
+          <ac:chgData name="Fatima Pillosu" userId="a6295d4dc9e22643" providerId="LiveId" clId="{DC5D3258-78EA-403B-A7A3-C0A744C4755F}" dt="2023-10-09T14:50:32.399" v="82" actId="164"/>
+          <ac:picMkLst>
+            <pc:docMk/>
+            <pc:sldMk cId="757844797" sldId="257"/>
+            <ac:picMk id="4" creationId="{7CA61536-0FDD-C98A-FFEA-D011EBCCE06D}"/>
+          </ac:picMkLst>
+        </pc:picChg>
+        <pc:picChg chg="add mod modCrop">
+          <ac:chgData name="Fatima Pillosu" userId="a6295d4dc9e22643" providerId="LiveId" clId="{DC5D3258-78EA-403B-A7A3-C0A744C4755F}" dt="2023-10-09T14:50:48.704" v="85" actId="164"/>
+          <ac:picMkLst>
+            <pc:docMk/>
+            <pc:sldMk cId="757844797" sldId="257"/>
+            <ac:picMk id="6" creationId="{177F81EF-39A4-9785-5433-2387CCD46374}"/>
+          </ac:picMkLst>
+        </pc:picChg>
+        <pc:picChg chg="add mod modCrop">
+          <ac:chgData name="Fatima Pillosu" userId="a6295d4dc9e22643" providerId="LiveId" clId="{DC5D3258-78EA-403B-A7A3-C0A744C4755F}" dt="2023-10-09T14:50:57.907" v="86" actId="164"/>
+          <ac:picMkLst>
+            <pc:docMk/>
+            <pc:sldMk cId="757844797" sldId="257"/>
+            <ac:picMk id="8" creationId="{1187A286-022D-69E0-4199-49464F7C5355}"/>
+          </ac:picMkLst>
+        </pc:picChg>
+        <pc:picChg chg="add mod modCrop">
+          <ac:chgData name="Fatima Pillosu" userId="a6295d4dc9e22643" providerId="LiveId" clId="{DC5D3258-78EA-403B-A7A3-C0A744C4755F}" dt="2023-10-09T14:50:39.401" v="83" actId="164"/>
+          <ac:picMkLst>
+            <pc:docMk/>
+            <pc:sldMk cId="757844797" sldId="257"/>
+            <ac:picMk id="10" creationId="{76A04860-5181-9F2E-1CA9-5F568F34D350}"/>
+          </ac:picMkLst>
+        </pc:picChg>
+        <pc:picChg chg="add mod modCrop">
+          <ac:chgData name="Fatima Pillosu" userId="a6295d4dc9e22643" providerId="LiveId" clId="{DC5D3258-78EA-403B-A7A3-C0A744C4755F}" dt="2023-10-09T14:50:44.164" v="84" actId="164"/>
+          <ac:picMkLst>
+            <pc:docMk/>
+            <pc:sldMk cId="757844797" sldId="257"/>
+            <ac:picMk id="12" creationId="{3345E67D-BC5F-88D7-AE3B-C8033F87366A}"/>
+          </ac:picMkLst>
+        </pc:picChg>
+        <pc:picChg chg="add del mod modCrop">
+          <ac:chgData name="Fatima Pillosu" userId="a6295d4dc9e22643" providerId="LiveId" clId="{DC5D3258-78EA-403B-A7A3-C0A744C4755F}" dt="2023-10-09T14:51:02.562" v="87" actId="164"/>
+          <ac:picMkLst>
+            <pc:docMk/>
+            <pc:sldMk cId="757844797" sldId="257"/>
+            <ac:picMk id="14" creationId="{131413A1-C5DE-BD59-49D0-38D297992393}"/>
+          </ac:picMkLst>
+        </pc:picChg>
+        <pc:picChg chg="add del mod">
+          <ac:chgData name="Fatima Pillosu" userId="a6295d4dc9e22643" providerId="LiveId" clId="{DC5D3258-78EA-403B-A7A3-C0A744C4755F}" dt="2023-10-09T16:07:04.789" v="146" actId="478"/>
+          <ac:picMkLst>
+            <pc:docMk/>
+            <pc:sldMk cId="757844797" sldId="257"/>
+            <ac:picMk id="30" creationId="{6792C32C-1740-D97A-4F30-C232E1ECE210}"/>
+          </ac:picMkLst>
+        </pc:picChg>
+        <pc:picChg chg="add del mod">
+          <ac:chgData name="Fatima Pillosu" userId="a6295d4dc9e22643" providerId="LiveId" clId="{DC5D3258-78EA-403B-A7A3-C0A744C4755F}" dt="2023-10-09T16:07:04.789" v="146" actId="478"/>
+          <ac:picMkLst>
+            <pc:docMk/>
+            <pc:sldMk cId="757844797" sldId="257"/>
+            <ac:picMk id="32" creationId="{B4F81217-1FAB-A940-939D-DF3AD8F0B504}"/>
+          </ac:picMkLst>
+        </pc:picChg>
+        <pc:picChg chg="add del mod">
+          <ac:chgData name="Fatima Pillosu" userId="a6295d4dc9e22643" providerId="LiveId" clId="{DC5D3258-78EA-403B-A7A3-C0A744C4755F}" dt="2023-10-09T16:07:04.789" v="146" actId="478"/>
+          <ac:picMkLst>
+            <pc:docMk/>
+            <pc:sldMk cId="757844797" sldId="257"/>
+            <ac:picMk id="34" creationId="{037D23B6-061B-48D0-DC17-7293DB249C9A}"/>
+          </ac:picMkLst>
+        </pc:picChg>
+        <pc:picChg chg="add del mod">
+          <ac:chgData name="Fatima Pillosu" userId="a6295d4dc9e22643" providerId="LiveId" clId="{DC5D3258-78EA-403B-A7A3-C0A744C4755F}" dt="2023-10-09T16:07:04.789" v="146" actId="478"/>
+          <ac:picMkLst>
+            <pc:docMk/>
+            <pc:sldMk cId="757844797" sldId="257"/>
+            <ac:picMk id="39" creationId="{9CC4C0DB-367A-F533-57DE-8A12047A2116}"/>
+          </ac:picMkLst>
+        </pc:picChg>
+        <pc:picChg chg="add del mod">
+          <ac:chgData name="Fatima Pillosu" userId="a6295d4dc9e22643" providerId="LiveId" clId="{DC5D3258-78EA-403B-A7A3-C0A744C4755F}" dt="2023-10-09T16:07:04.789" v="146" actId="478"/>
+          <ac:picMkLst>
+            <pc:docMk/>
+            <pc:sldMk cId="757844797" sldId="257"/>
+            <ac:picMk id="41" creationId="{700685CD-64B8-97A7-74E9-20A45BC18B86}"/>
+          </ac:picMkLst>
+        </pc:picChg>
+        <pc:picChg chg="add del mod modCrop">
+          <ac:chgData name="Fatima Pillosu" userId="a6295d4dc9e22643" providerId="LiveId" clId="{DC5D3258-78EA-403B-A7A3-C0A744C4755F}" dt="2023-10-09T16:07:04.789" v="146" actId="478"/>
+          <ac:picMkLst>
+            <pc:docMk/>
+            <pc:sldMk cId="757844797" sldId="257"/>
+            <ac:picMk id="43" creationId="{A161090F-EE9F-EA94-23BB-C19FCA795763}"/>
+          </ac:picMkLst>
+        </pc:picChg>
+        <pc:picChg chg="add del mod modCrop">
+          <ac:chgData name="Fatima Pillosu" userId="a6295d4dc9e22643" providerId="LiveId" clId="{DC5D3258-78EA-403B-A7A3-C0A744C4755F}" dt="2023-10-09T16:27:54.601" v="685" actId="21"/>
+          <ac:picMkLst>
+            <pc:docMk/>
+            <pc:sldMk cId="757844797" sldId="257"/>
+            <ac:picMk id="45" creationId="{7A5004F3-023C-E2D0-763D-D64E5C24143E}"/>
+          </ac:picMkLst>
+        </pc:picChg>
+        <pc:picChg chg="add del mod modCrop">
+          <ac:chgData name="Fatima Pillosu" userId="a6295d4dc9e22643" providerId="LiveId" clId="{DC5D3258-78EA-403B-A7A3-C0A744C4755F}" dt="2023-10-09T16:27:54.601" v="685" actId="21"/>
+          <ac:picMkLst>
+            <pc:docMk/>
+            <pc:sldMk cId="757844797" sldId="257"/>
+            <ac:picMk id="47" creationId="{235DDA31-2200-4A5D-A320-5274296AE453}"/>
+          </ac:picMkLst>
+        </pc:picChg>
+        <pc:picChg chg="add del mod modCrop">
+          <ac:chgData name="Fatima Pillosu" userId="a6295d4dc9e22643" providerId="LiveId" clId="{DC5D3258-78EA-403B-A7A3-C0A744C4755F}" dt="2023-10-09T16:27:54.601" v="685" actId="21"/>
+          <ac:picMkLst>
+            <pc:docMk/>
+            <pc:sldMk cId="757844797" sldId="257"/>
+            <ac:picMk id="49" creationId="{78302A27-5C09-4317-36CC-BD551D0C8BB2}"/>
+          </ac:picMkLst>
+        </pc:picChg>
+        <pc:picChg chg="add del mod modCrop">
+          <ac:chgData name="Fatima Pillosu" userId="a6295d4dc9e22643" providerId="LiveId" clId="{DC5D3258-78EA-403B-A7A3-C0A744C4755F}" dt="2023-10-09T16:27:54.601" v="685" actId="21"/>
+          <ac:picMkLst>
+            <pc:docMk/>
+            <pc:sldMk cId="757844797" sldId="257"/>
+            <ac:picMk id="51" creationId="{27C6867E-B2BE-EB69-1313-89BAEDE1E4B2}"/>
+          </ac:picMkLst>
+        </pc:picChg>
+        <pc:picChg chg="add del mod modCrop">
+          <ac:chgData name="Fatima Pillosu" userId="a6295d4dc9e22643" providerId="LiveId" clId="{DC5D3258-78EA-403B-A7A3-C0A744C4755F}" dt="2023-10-09T16:27:54.601" v="685" actId="21"/>
+          <ac:picMkLst>
+            <pc:docMk/>
+            <pc:sldMk cId="757844797" sldId="257"/>
+            <ac:picMk id="53" creationId="{AD1F896C-BE67-FB96-BC1A-802A62483B96}"/>
+          </ac:picMkLst>
+        </pc:picChg>
+        <pc:picChg chg="add del mod modCrop">
+          <ac:chgData name="Fatima Pillosu" userId="a6295d4dc9e22643" providerId="LiveId" clId="{DC5D3258-78EA-403B-A7A3-C0A744C4755F}" dt="2023-10-09T16:27:54.601" v="685" actId="21"/>
+          <ac:picMkLst>
+            <pc:docMk/>
+            <pc:sldMk cId="757844797" sldId="257"/>
+            <ac:picMk id="55" creationId="{98B84DA6-5A9C-3054-32CB-1E12CE1C0F9E}"/>
+          </ac:picMkLst>
+        </pc:picChg>
+        <pc:picChg chg="add mod">
+          <ac:chgData name="Fatima Pillosu" userId="a6295d4dc9e22643" providerId="LiveId" clId="{DC5D3258-78EA-403B-A7A3-C0A744C4755F}" dt="2023-10-09T16:28:25.768" v="688" actId="1035"/>
+          <ac:picMkLst>
+            <pc:docMk/>
+            <pc:sldMk cId="757844797" sldId="257"/>
+            <ac:picMk id="69" creationId="{D58FADA8-8086-D85B-8D3B-9DBB5B12A0F7}"/>
+          </ac:picMkLst>
+        </pc:picChg>
+        <pc:picChg chg="add mod">
+          <ac:chgData name="Fatima Pillosu" userId="a6295d4dc9e22643" providerId="LiveId" clId="{DC5D3258-78EA-403B-A7A3-C0A744C4755F}" dt="2023-10-09T16:28:25.768" v="688" actId="1035"/>
+          <ac:picMkLst>
+            <pc:docMk/>
+            <pc:sldMk cId="757844797" sldId="257"/>
+            <ac:picMk id="70" creationId="{E8C5188A-A656-1EBC-3C7E-7620EB300559}"/>
+          </ac:picMkLst>
+        </pc:picChg>
+        <pc:picChg chg="add mod">
+          <ac:chgData name="Fatima Pillosu" userId="a6295d4dc9e22643" providerId="LiveId" clId="{DC5D3258-78EA-403B-A7A3-C0A744C4755F}" dt="2023-10-09T16:28:25.768" v="688" actId="1035"/>
+          <ac:picMkLst>
+            <pc:docMk/>
+            <pc:sldMk cId="757844797" sldId="257"/>
+            <ac:picMk id="71" creationId="{F97695B2-B48E-D79D-C7D1-EDE06ED8AF6A}"/>
+          </ac:picMkLst>
+        </pc:picChg>
+        <pc:picChg chg="add mod">
+          <ac:chgData name="Fatima Pillosu" userId="a6295d4dc9e22643" providerId="LiveId" clId="{DC5D3258-78EA-403B-A7A3-C0A744C4755F}" dt="2023-10-09T16:28:25.768" v="688" actId="1035"/>
+          <ac:picMkLst>
+            <pc:docMk/>
+            <pc:sldMk cId="757844797" sldId="257"/>
+            <ac:picMk id="72" creationId="{1F470B5D-39FE-D633-D522-3916A61C7D8E}"/>
+          </ac:picMkLst>
+        </pc:picChg>
+        <pc:picChg chg="add mod">
+          <ac:chgData name="Fatima Pillosu" userId="a6295d4dc9e22643" providerId="LiveId" clId="{DC5D3258-78EA-403B-A7A3-C0A744C4755F}" dt="2023-10-09T16:28:25.768" v="688" actId="1035"/>
+          <ac:picMkLst>
+            <pc:docMk/>
+            <pc:sldMk cId="757844797" sldId="257"/>
+            <ac:picMk id="73" creationId="{E1E26006-90D7-FECE-0D31-C91BBD50C7FD}"/>
+          </ac:picMkLst>
+        </pc:picChg>
+        <pc:picChg chg="add mod">
+          <ac:chgData name="Fatima Pillosu" userId="a6295d4dc9e22643" providerId="LiveId" clId="{DC5D3258-78EA-403B-A7A3-C0A744C4755F}" dt="2023-10-09T16:28:25.768" v="688" actId="1035"/>
+          <ac:picMkLst>
+            <pc:docMk/>
+            <pc:sldMk cId="757844797" sldId="257"/>
+            <ac:picMk id="74" creationId="{53930D14-6A6C-5B5D-6265-A5E0AD6428F1}"/>
+          </ac:picMkLst>
+        </pc:picChg>
+      </pc:sldChg>
+    </pc:docChg>
+  </pc:docChgLst>
+  <pc:docChgLst>
+    <pc:chgData name="Fatima Pillosu" userId="a6295d4dc9e22643" providerId="LiveId" clId="{0B7DB749-794A-4C30-9DD1-EA4752C2C6E9}"/>
+    <pc:docChg chg="modSld">
+      <pc:chgData name="Fatima Pillosu" userId="a6295d4dc9e22643" providerId="LiveId" clId="{0B7DB749-794A-4C30-9DD1-EA4752C2C6E9}" dt="2023-10-09T21:51:39.482" v="0" actId="207"/>
+      <pc:docMkLst>
+        <pc:docMk/>
+      </pc:docMkLst>
+      <pc:sldChg chg="modSp mod">
+        <pc:chgData name="Fatima Pillosu" userId="a6295d4dc9e22643" providerId="LiveId" clId="{0B7DB749-794A-4C30-9DD1-EA4752C2C6E9}" dt="2023-10-09T21:51:39.482" v="0" actId="207"/>
+        <pc:sldMkLst>
+          <pc:docMk/>
+          <pc:sldMk cId="757844797" sldId="257"/>
+        </pc:sldMkLst>
+        <pc:spChg chg="mod">
+          <ac:chgData name="Fatima Pillosu" userId="a6295d4dc9e22643" providerId="LiveId" clId="{0B7DB749-794A-4C30-9DD1-EA4752C2C6E9}" dt="2023-10-09T21:51:39.482" v="0" actId="207"/>
+          <ac:spMkLst>
+            <pc:docMk/>
+            <pc:sldMk cId="757844797" sldId="257"/>
+            <ac:spMk id="59" creationId="{CED439DF-2D7E-B3C5-67FF-360353E14808}"/>
+          </ac:spMkLst>
+        </pc:spChg>
+        <pc:spChg chg="mod">
+          <ac:chgData name="Fatima Pillosu" userId="a6295d4dc9e22643" providerId="LiveId" clId="{0B7DB749-794A-4C30-9DD1-EA4752C2C6E9}" dt="2023-10-09T21:51:39.482" v="0" actId="207"/>
+          <ac:spMkLst>
+            <pc:docMk/>
+            <pc:sldMk cId="757844797" sldId="257"/>
+            <ac:spMk id="60" creationId="{ADB5DB83-0619-8A7D-5971-A4CCAD0A65E5}"/>
+          </ac:spMkLst>
+        </pc:spChg>
+        <pc:spChg chg="mod">
+          <ac:chgData name="Fatima Pillosu" userId="a6295d4dc9e22643" providerId="LiveId" clId="{0B7DB749-794A-4C30-9DD1-EA4752C2C6E9}" dt="2023-10-09T21:51:39.482" v="0" actId="207"/>
+          <ac:spMkLst>
+            <pc:docMk/>
+            <pc:sldMk cId="757844797" sldId="257"/>
+            <ac:spMk id="61" creationId="{EC0E2FD2-8D57-68B3-3268-75019ED7E471}"/>
+          </ac:spMkLst>
+        </pc:spChg>
+        <pc:spChg chg="mod">
+          <ac:chgData name="Fatima Pillosu" userId="a6295d4dc9e22643" providerId="LiveId" clId="{0B7DB749-794A-4C30-9DD1-EA4752C2C6E9}" dt="2023-10-09T21:51:39.482" v="0" actId="207"/>
+          <ac:spMkLst>
+            <pc:docMk/>
+            <pc:sldMk cId="757844797" sldId="257"/>
+            <ac:spMk id="62" creationId="{AB8CFB82-E9B0-CD22-AB9A-C42F588EAE4A}"/>
+          </ac:spMkLst>
+        </pc:spChg>
+        <pc:spChg chg="mod">
+          <ac:chgData name="Fatima Pillosu" userId="a6295d4dc9e22643" providerId="LiveId" clId="{0B7DB749-794A-4C30-9DD1-EA4752C2C6E9}" dt="2023-10-09T21:51:39.482" v="0" actId="207"/>
+          <ac:spMkLst>
+            <pc:docMk/>
+            <pc:sldMk cId="757844797" sldId="257"/>
+            <ac:spMk id="63" creationId="{1E62147A-98D3-6078-0E2E-3664BE5A0902}"/>
+          </ac:spMkLst>
+        </pc:spChg>
+        <pc:spChg chg="mod">
+          <ac:chgData name="Fatima Pillosu" userId="a6295d4dc9e22643" providerId="LiveId" clId="{0B7DB749-794A-4C30-9DD1-EA4752C2C6E9}" dt="2023-10-09T21:51:39.482" v="0" actId="207"/>
+          <ac:spMkLst>
+            <pc:docMk/>
+            <pc:sldMk cId="757844797" sldId="257"/>
+            <ac:spMk id="64" creationId="{F063DA2A-4C9F-78C4-A56C-1202D061135B}"/>
+          </ac:spMkLst>
+        </pc:spChg>
+        <pc:spChg chg="mod">
+          <ac:chgData name="Fatima Pillosu" userId="a6295d4dc9e22643" providerId="LiveId" clId="{0B7DB749-794A-4C30-9DD1-EA4752C2C6E9}" dt="2023-10-09T21:51:39.482" v="0" actId="207"/>
+          <ac:spMkLst>
+            <pc:docMk/>
+            <pc:sldMk cId="757844797" sldId="257"/>
+            <ac:spMk id="65" creationId="{7C230A14-CA86-A885-4714-2D622CBE1B51}"/>
+          </ac:spMkLst>
+        </pc:spChg>
+        <pc:spChg chg="mod">
+          <ac:chgData name="Fatima Pillosu" userId="a6295d4dc9e22643" providerId="LiveId" clId="{0B7DB749-794A-4C30-9DD1-EA4752C2C6E9}" dt="2023-10-09T21:51:39.482" v="0" actId="207"/>
+          <ac:spMkLst>
+            <pc:docMk/>
+            <pc:sldMk cId="757844797" sldId="257"/>
+            <ac:spMk id="66" creationId="{E37A1976-8171-5789-3387-0D6F842E4D4C}"/>
+          </ac:spMkLst>
+        </pc:spChg>
+        <pc:spChg chg="mod">
+          <ac:chgData name="Fatima Pillosu" userId="a6295d4dc9e22643" providerId="LiveId" clId="{0B7DB749-794A-4C30-9DD1-EA4752C2C6E9}" dt="2023-10-09T21:51:39.482" v="0" actId="207"/>
+          <ac:spMkLst>
+            <pc:docMk/>
+            <pc:sldMk cId="757844797" sldId="257"/>
+            <ac:spMk id="67" creationId="{DCA67142-A09A-5247-AC6F-13E80FADC4C9}"/>
+          </ac:spMkLst>
+        </pc:spChg>
+        <pc:spChg chg="mod">
+          <ac:chgData name="Fatima Pillosu" userId="a6295d4dc9e22643" providerId="LiveId" clId="{0B7DB749-794A-4C30-9DD1-EA4752C2C6E9}" dt="2023-10-09T21:51:39.482" v="0" actId="207"/>
+          <ac:spMkLst>
+            <pc:docMk/>
+            <pc:sldMk cId="757844797" sldId="257"/>
+            <ac:spMk id="68" creationId="{0D9022CD-908A-6AF7-B87C-4E5D77B34010}"/>
+          </ac:spMkLst>
+        </pc:spChg>
+        <pc:spChg chg="mod">
+          <ac:chgData name="Fatima Pillosu" userId="a6295d4dc9e22643" providerId="LiveId" clId="{0B7DB749-794A-4C30-9DD1-EA4752C2C6E9}" dt="2023-10-09T21:51:39.482" v="0" actId="207"/>
+          <ac:spMkLst>
+            <pc:docMk/>
+            <pc:sldMk cId="757844797" sldId="257"/>
+            <ac:spMk id="75" creationId="{78E9F1CB-8298-B91F-438E-D510F52FEA28}"/>
+          </ac:spMkLst>
+        </pc:spChg>
+        <pc:spChg chg="mod">
+          <ac:chgData name="Fatima Pillosu" userId="a6295d4dc9e22643" providerId="LiveId" clId="{0B7DB749-794A-4C30-9DD1-EA4752C2C6E9}" dt="2023-10-09T21:51:39.482" v="0" actId="207"/>
+          <ac:spMkLst>
+            <pc:docMk/>
+            <pc:sldMk cId="757844797" sldId="257"/>
+            <ac:spMk id="76" creationId="{716361D2-FEFE-6BF7-DD82-D2938962FB00}"/>
+          </ac:spMkLst>
+        </pc:spChg>
+        <pc:spChg chg="mod">
+          <ac:chgData name="Fatima Pillosu" userId="a6295d4dc9e22643" providerId="LiveId" clId="{0B7DB749-794A-4C30-9DD1-EA4752C2C6E9}" dt="2023-10-09T21:51:39.482" v="0" actId="207"/>
+          <ac:spMkLst>
+            <pc:docMk/>
+            <pc:sldMk cId="757844797" sldId="257"/>
+            <ac:spMk id="77" creationId="{EFB5CF1A-5073-DC8B-3FE0-977FA870996B}"/>
+          </ac:spMkLst>
+        </pc:spChg>
+        <pc:spChg chg="mod">
+          <ac:chgData name="Fatima Pillosu" userId="a6295d4dc9e22643" providerId="LiveId" clId="{0B7DB749-794A-4C30-9DD1-EA4752C2C6E9}" dt="2023-10-09T21:51:39.482" v="0" actId="207"/>
+          <ac:spMkLst>
+            <pc:docMk/>
+            <pc:sldMk cId="757844797" sldId="257"/>
+            <ac:spMk id="78" creationId="{A641455B-8A00-B3BE-B0D9-B4A7D7E6EA80}"/>
+          </ac:spMkLst>
+        </pc:spChg>
+        <pc:spChg chg="mod">
+          <ac:chgData name="Fatima Pillosu" userId="a6295d4dc9e22643" providerId="LiveId" clId="{0B7DB749-794A-4C30-9DD1-EA4752C2C6E9}" dt="2023-10-09T21:51:39.482" v="0" actId="207"/>
+          <ac:spMkLst>
+            <pc:docMk/>
+            <pc:sldMk cId="757844797" sldId="257"/>
+            <ac:spMk id="79" creationId="{0979CDC5-F480-F87E-B8E0-3112261875C3}"/>
+          </ac:spMkLst>
+        </pc:spChg>
+        <pc:spChg chg="mod">
+          <ac:chgData name="Fatima Pillosu" userId="a6295d4dc9e22643" providerId="LiveId" clId="{0B7DB749-794A-4C30-9DD1-EA4752C2C6E9}" dt="2023-10-09T21:51:39.482" v="0" actId="207"/>
+          <ac:spMkLst>
+            <pc:docMk/>
+            <pc:sldMk cId="757844797" sldId="257"/>
+            <ac:spMk id="80" creationId="{25352047-C30C-B405-F79D-792CA5BF09B5}"/>
+          </ac:spMkLst>
+        </pc:spChg>
+        <pc:spChg chg="mod">
+          <ac:chgData name="Fatima Pillosu" userId="a6295d4dc9e22643" providerId="LiveId" clId="{0B7DB749-794A-4C30-9DD1-EA4752C2C6E9}" dt="2023-10-09T21:51:39.482" v="0" actId="207"/>
+          <ac:spMkLst>
+            <pc:docMk/>
+            <pc:sldMk cId="757844797" sldId="257"/>
+            <ac:spMk id="81" creationId="{B66E93D2-201C-DF19-6C23-B59BA0DA9F23}"/>
+          </ac:spMkLst>
+        </pc:spChg>
+        <pc:spChg chg="mod">
+          <ac:chgData name="Fatima Pillosu" userId="a6295d4dc9e22643" providerId="LiveId" clId="{0B7DB749-794A-4C30-9DD1-EA4752C2C6E9}" dt="2023-10-09T21:51:39.482" v="0" actId="207"/>
+          <ac:spMkLst>
+            <pc:docMk/>
+            <pc:sldMk cId="757844797" sldId="257"/>
+            <ac:spMk id="82" creationId="{5AD4E0C3-D847-7048-88AE-742598B249F3}"/>
+          </ac:spMkLst>
+        </pc:spChg>
       </pc:sldChg>
     </pc:docChg>
   </pc:docChgLst>
@@ -3201,15 +4049,15 @@
         </p:nvSpPr>
         <p:spPr>
           <a:xfrm>
-            <a:off x="396955" y="1390483"/>
-            <a:ext cx="4498816" cy="2957971"/>
+            <a:off x="361831" y="1272531"/>
+            <a:ext cx="4100751" cy="2707052"/>
           </a:xfrm>
         </p:spPr>
         <p:txBody>
           <a:bodyPr anchor="b"/>
           <a:lstStyle>
             <a:lvl1pPr algn="ctr">
-              <a:defRPr sz="3473"/>
+              <a:defRPr sz="3166"/>
             </a:lvl1pPr>
           </a:lstStyle>
           <a:p>
@@ -3217,7 +4065,6 @@
               <a:rPr lang="en-US"/>
               <a:t>Click to edit Master title style</a:t>
             </a:r>
-            <a:endParaRPr lang="en-US" dirty="0"/>
           </a:p>
         </p:txBody>
       </p:sp>
@@ -3233,8 +4080,8 @@
         </p:nvSpPr>
         <p:spPr>
           <a:xfrm>
-            <a:off x="661591" y="4462525"/>
-            <a:ext cx="3969544" cy="2051305"/>
+            <a:off x="603052" y="4083977"/>
+            <a:ext cx="3618310" cy="1877297"/>
           </a:xfrm>
         </p:spPr>
         <p:txBody>
@@ -3242,39 +4089,39 @@
           <a:lstStyle>
             <a:lvl1pPr marL="0" indent="0" algn="ctr">
               <a:buNone/>
-              <a:defRPr sz="1389"/>
+              <a:defRPr sz="1266"/>
             </a:lvl1pPr>
-            <a:lvl2pPr marL="264627" indent="0" algn="ctr">
+            <a:lvl2pPr marL="241219" indent="0" algn="ctr">
               <a:buNone/>
-              <a:defRPr sz="1158"/>
+              <a:defRPr sz="1055"/>
             </a:lvl2pPr>
-            <a:lvl3pPr marL="529255" indent="0" algn="ctr">
+            <a:lvl3pPr marL="482437" indent="0" algn="ctr">
               <a:buNone/>
-              <a:defRPr sz="1042"/>
+              <a:defRPr sz="950"/>
             </a:lvl3pPr>
-            <a:lvl4pPr marL="793882" indent="0" algn="ctr">
+            <a:lvl4pPr marL="723656" indent="0" algn="ctr">
               <a:buNone/>
-              <a:defRPr sz="926"/>
+              <a:defRPr sz="844"/>
             </a:lvl4pPr>
-            <a:lvl5pPr marL="1058509" indent="0" algn="ctr">
+            <a:lvl5pPr marL="964875" indent="0" algn="ctr">
               <a:buNone/>
-              <a:defRPr sz="926"/>
+              <a:defRPr sz="844"/>
             </a:lvl5pPr>
-            <a:lvl6pPr marL="1323137" indent="0" algn="ctr">
+            <a:lvl6pPr marL="1206094" indent="0" algn="ctr">
               <a:buNone/>
-              <a:defRPr sz="926"/>
+              <a:defRPr sz="844"/>
             </a:lvl6pPr>
-            <a:lvl7pPr marL="1587764" indent="0" algn="ctr">
+            <a:lvl7pPr marL="1447312" indent="0" algn="ctr">
               <a:buNone/>
-              <a:defRPr sz="926"/>
+              <a:defRPr sz="844"/>
             </a:lvl7pPr>
-            <a:lvl8pPr marL="1852392" indent="0" algn="ctr">
+            <a:lvl8pPr marL="1688531" indent="0" algn="ctr">
               <a:buNone/>
-              <a:defRPr sz="926"/>
+              <a:defRPr sz="844"/>
             </a:lvl8pPr>
-            <a:lvl9pPr marL="2117019" indent="0" algn="ctr">
+            <a:lvl9pPr marL="1929750" indent="0" algn="ctr">
               <a:buNone/>
-              <a:defRPr sz="926"/>
+              <a:defRPr sz="844"/>
             </a:lvl9pPr>
           </a:lstStyle>
           <a:p>
@@ -3282,7 +4129,6 @@
               <a:rPr lang="en-US"/>
               <a:t>Click to edit Master subtitle style</a:t>
             </a:r>
-            <a:endParaRPr lang="en-US" dirty="0"/>
           </a:p>
         </p:txBody>
       </p:sp>
@@ -3303,7 +4149,7 @@
           <a:p>
             <a:fld id="{2294E16E-31E1-4807-9BDB-78BF3541B072}" type="datetimeFigureOut">
               <a:rPr lang="en-GB" smtClean="0"/>
-              <a:t>26/09/2022</a:t>
+              <a:t>09/10/2023</a:t>
             </a:fld>
             <a:endParaRPr lang="en-GB"/>
           </a:p>
@@ -3345,7 +4191,7 @@
           <a:p>
             <a:fld id="{1CB66000-84F1-465B-BD3A-D40F18E3F61B}" type="slidenum">
               <a:rPr lang="en-GB" smtClean="0"/>
-              <a:t>‹#›</a:t>
+              <a:t>‹N›</a:t>
             </a:fld>
             <a:endParaRPr lang="en-GB"/>
           </a:p>
@@ -3354,7 +4200,7 @@
     </p:spTree>
     <p:extLst>
       <p:ext uri="{BB962C8B-B14F-4D97-AF65-F5344CB8AC3E}">
-        <p14:creationId xmlns:p14="http://schemas.microsoft.com/office/powerpoint/2010/main" val="830706490"/>
+        <p14:creationId xmlns:p14="http://schemas.microsoft.com/office/powerpoint/2010/main" val="197434035"/>
       </p:ext>
     </p:extLst>
   </p:cSld>
@@ -3400,7 +4246,6 @@
               <a:rPr lang="en-US"/>
               <a:t>Click to edit Master title style</a:t>
             </a:r>
-            <a:endParaRPr lang="en-US" dirty="0"/>
           </a:p>
         </p:txBody>
       </p:sp>
@@ -3452,7 +4297,6 @@
               <a:rPr lang="en-US"/>
               <a:t>Fifth level</a:t>
             </a:r>
-            <a:endParaRPr lang="en-US" dirty="0"/>
           </a:p>
         </p:txBody>
       </p:sp>
@@ -3473,7 +4317,7 @@
           <a:p>
             <a:fld id="{2294E16E-31E1-4807-9BDB-78BF3541B072}" type="datetimeFigureOut">
               <a:rPr lang="en-GB" smtClean="0"/>
-              <a:t>26/09/2022</a:t>
+              <a:t>09/10/2023</a:t>
             </a:fld>
             <a:endParaRPr lang="en-GB"/>
           </a:p>
@@ -3515,7 +4359,7 @@
           <a:p>
             <a:fld id="{1CB66000-84F1-465B-BD3A-D40F18E3F61B}" type="slidenum">
               <a:rPr lang="en-GB" smtClean="0"/>
-              <a:t>‹#›</a:t>
+              <a:t>‹N›</a:t>
             </a:fld>
             <a:endParaRPr lang="en-GB"/>
           </a:p>
@@ -3524,7 +4368,7 @@
     </p:spTree>
     <p:extLst>
       <p:ext uri="{BB962C8B-B14F-4D97-AF65-F5344CB8AC3E}">
-        <p14:creationId xmlns:p14="http://schemas.microsoft.com/office/powerpoint/2010/main" val="1946813492"/>
+        <p14:creationId xmlns:p14="http://schemas.microsoft.com/office/powerpoint/2010/main" val="3822668917"/>
       </p:ext>
     </p:extLst>
   </p:cSld>
@@ -3563,8 +4407,8 @@
         </p:nvSpPr>
         <p:spPr>
           <a:xfrm>
-            <a:off x="3787607" y="452349"/>
-            <a:ext cx="1141244" cy="7200222"/>
+            <a:off x="3452471" y="413978"/>
+            <a:ext cx="1040264" cy="6589440"/>
           </a:xfrm>
         </p:spPr>
         <p:txBody>
@@ -3575,7 +4419,6 @@
               <a:rPr lang="en-US"/>
               <a:t>Click to edit Master title style</a:t>
             </a:r>
-            <a:endParaRPr lang="en-US" dirty="0"/>
           </a:p>
         </p:txBody>
       </p:sp>
@@ -3591,8 +4434,8 @@
         </p:nvSpPr>
         <p:spPr>
           <a:xfrm>
-            <a:off x="363875" y="452349"/>
-            <a:ext cx="3357572" cy="7200222"/>
+            <a:off x="331679" y="413978"/>
+            <a:ext cx="3060487" cy="6589440"/>
           </a:xfrm>
         </p:spPr>
         <p:txBody>
@@ -3632,7 +4475,6 @@
               <a:rPr lang="en-US"/>
               <a:t>Fifth level</a:t>
             </a:r>
-            <a:endParaRPr lang="en-US" dirty="0"/>
           </a:p>
         </p:txBody>
       </p:sp>
@@ -3653,7 +4495,7 @@
           <a:p>
             <a:fld id="{2294E16E-31E1-4807-9BDB-78BF3541B072}" type="datetimeFigureOut">
               <a:rPr lang="en-GB" smtClean="0"/>
-              <a:t>26/09/2022</a:t>
+              <a:t>09/10/2023</a:t>
             </a:fld>
             <a:endParaRPr lang="en-GB"/>
           </a:p>
@@ -3695,7 +4537,7 @@
           <a:p>
             <a:fld id="{1CB66000-84F1-465B-BD3A-D40F18E3F61B}" type="slidenum">
               <a:rPr lang="en-GB" smtClean="0"/>
-              <a:t>‹#›</a:t>
+              <a:t>‹N›</a:t>
             </a:fld>
             <a:endParaRPr lang="en-GB"/>
           </a:p>
@@ -3704,7 +4546,7 @@
     </p:spTree>
     <p:extLst>
       <p:ext uri="{BB962C8B-B14F-4D97-AF65-F5344CB8AC3E}">
-        <p14:creationId xmlns:p14="http://schemas.microsoft.com/office/powerpoint/2010/main" val="2346799470"/>
+        <p14:creationId xmlns:p14="http://schemas.microsoft.com/office/powerpoint/2010/main" val="2824850302"/>
       </p:ext>
     </p:extLst>
   </p:cSld>
@@ -3750,7 +4592,6 @@
               <a:rPr lang="en-US"/>
               <a:t>Click to edit Master title style</a:t>
             </a:r>
-            <a:endParaRPr lang="en-US" dirty="0"/>
           </a:p>
         </p:txBody>
       </p:sp>
@@ -3802,7 +4643,6 @@
               <a:rPr lang="en-US"/>
               <a:t>Fifth level</a:t>
             </a:r>
-            <a:endParaRPr lang="en-US" dirty="0"/>
           </a:p>
         </p:txBody>
       </p:sp>
@@ -3823,7 +4663,7 @@
           <a:p>
             <a:fld id="{2294E16E-31E1-4807-9BDB-78BF3541B072}" type="datetimeFigureOut">
               <a:rPr lang="en-GB" smtClean="0"/>
-              <a:t>26/09/2022</a:t>
+              <a:t>09/10/2023</a:t>
             </a:fld>
             <a:endParaRPr lang="en-GB"/>
           </a:p>
@@ -3865,7 +4705,7 @@
           <a:p>
             <a:fld id="{1CB66000-84F1-465B-BD3A-D40F18E3F61B}" type="slidenum">
               <a:rPr lang="en-GB" smtClean="0"/>
-              <a:t>‹#›</a:t>
+              <a:t>‹N›</a:t>
             </a:fld>
             <a:endParaRPr lang="en-GB"/>
           </a:p>
@@ -3874,7 +4714,7 @@
     </p:spTree>
     <p:extLst>
       <p:ext uri="{BB962C8B-B14F-4D97-AF65-F5344CB8AC3E}">
-        <p14:creationId xmlns:p14="http://schemas.microsoft.com/office/powerpoint/2010/main" val="1460712444"/>
+        <p14:creationId xmlns:p14="http://schemas.microsoft.com/office/powerpoint/2010/main" val="1970564706"/>
       </p:ext>
     </p:extLst>
   </p:cSld>
@@ -3913,15 +4753,15 @@
         </p:nvSpPr>
         <p:spPr>
           <a:xfrm>
-            <a:off x="361119" y="2118177"/>
-            <a:ext cx="4564975" cy="3534224"/>
+            <a:off x="329166" y="1938496"/>
+            <a:ext cx="4161056" cy="3234423"/>
           </a:xfrm>
         </p:spPr>
         <p:txBody>
           <a:bodyPr anchor="b"/>
           <a:lstStyle>
             <a:lvl1pPr>
-              <a:defRPr sz="3473"/>
+              <a:defRPr sz="3166"/>
             </a:lvl1pPr>
           </a:lstStyle>
           <a:p>
@@ -3929,7 +4769,6 @@
               <a:rPr lang="en-US"/>
               <a:t>Click to edit Master title style</a:t>
             </a:r>
-            <a:endParaRPr lang="en-US" dirty="0"/>
           </a:p>
         </p:txBody>
       </p:sp>
@@ -3945,8 +4784,8 @@
         </p:nvSpPr>
         <p:spPr>
           <a:xfrm>
-            <a:off x="361119" y="5685837"/>
-            <a:ext cx="4564975" cy="1858565"/>
+            <a:off x="329166" y="5203518"/>
+            <a:ext cx="4161056" cy="1700906"/>
           </a:xfrm>
         </p:spPr>
         <p:txBody>
@@ -3954,15 +4793,15 @@
           <a:lstStyle>
             <a:lvl1pPr marL="0" indent="0">
               <a:buNone/>
-              <a:defRPr sz="1389">
+              <a:defRPr sz="1266">
                 <a:solidFill>
                   <a:schemeClr val="tx1"/>
                 </a:solidFill>
               </a:defRPr>
             </a:lvl1pPr>
-            <a:lvl2pPr marL="264627" indent="0">
+            <a:lvl2pPr marL="241219" indent="0">
               <a:buNone/>
-              <a:defRPr sz="1158">
+              <a:defRPr sz="1055">
                 <a:solidFill>
                   <a:schemeClr val="tx1">
                     <a:tint val="75000"/>
@@ -3970,9 +4809,9 @@
                 </a:solidFill>
               </a:defRPr>
             </a:lvl2pPr>
-            <a:lvl3pPr marL="529255" indent="0">
+            <a:lvl3pPr marL="482437" indent="0">
               <a:buNone/>
-              <a:defRPr sz="1042">
+              <a:defRPr sz="950">
                 <a:solidFill>
                   <a:schemeClr val="tx1">
                     <a:tint val="75000"/>
@@ -3980,9 +4819,9 @@
                 </a:solidFill>
               </a:defRPr>
             </a:lvl3pPr>
-            <a:lvl4pPr marL="793882" indent="0">
+            <a:lvl4pPr marL="723656" indent="0">
               <a:buNone/>
-              <a:defRPr sz="926">
+              <a:defRPr sz="844">
                 <a:solidFill>
                   <a:schemeClr val="tx1">
                     <a:tint val="75000"/>
@@ -3990,9 +4829,9 @@
                 </a:solidFill>
               </a:defRPr>
             </a:lvl4pPr>
-            <a:lvl5pPr marL="1058509" indent="0">
+            <a:lvl5pPr marL="964875" indent="0">
               <a:buNone/>
-              <a:defRPr sz="926">
+              <a:defRPr sz="844">
                 <a:solidFill>
                   <a:schemeClr val="tx1">
                     <a:tint val="75000"/>
@@ -4000,9 +4839,9 @@
                 </a:solidFill>
               </a:defRPr>
             </a:lvl5pPr>
-            <a:lvl6pPr marL="1323137" indent="0">
+            <a:lvl6pPr marL="1206094" indent="0">
               <a:buNone/>
-              <a:defRPr sz="926">
+              <a:defRPr sz="844">
                 <a:solidFill>
                   <a:schemeClr val="tx1">
                     <a:tint val="75000"/>
@@ -4010,9 +4849,9 @@
                 </a:solidFill>
               </a:defRPr>
             </a:lvl6pPr>
-            <a:lvl7pPr marL="1587764" indent="0">
+            <a:lvl7pPr marL="1447312" indent="0">
               <a:buNone/>
-              <a:defRPr sz="926">
+              <a:defRPr sz="844">
                 <a:solidFill>
                   <a:schemeClr val="tx1">
                     <a:tint val="75000"/>
@@ -4020,9 +4859,9 @@
                 </a:solidFill>
               </a:defRPr>
             </a:lvl7pPr>
-            <a:lvl8pPr marL="1852392" indent="0">
+            <a:lvl8pPr marL="1688531" indent="0">
               <a:buNone/>
-              <a:defRPr sz="926">
+              <a:defRPr sz="844">
                 <a:solidFill>
                   <a:schemeClr val="tx1">
                     <a:tint val="75000"/>
@@ -4030,9 +4869,9 @@
                 </a:solidFill>
               </a:defRPr>
             </a:lvl8pPr>
-            <a:lvl9pPr marL="2117019" indent="0">
+            <a:lvl9pPr marL="1929750" indent="0">
               <a:buNone/>
-              <a:defRPr sz="926">
+              <a:defRPr sz="844">
                 <a:solidFill>
                   <a:schemeClr val="tx1">
                     <a:tint val="75000"/>
@@ -4067,7 +4906,7 @@
           <a:p>
             <a:fld id="{2294E16E-31E1-4807-9BDB-78BF3541B072}" type="datetimeFigureOut">
               <a:rPr lang="en-GB" smtClean="0"/>
-              <a:t>26/09/2022</a:t>
+              <a:t>09/10/2023</a:t>
             </a:fld>
             <a:endParaRPr lang="en-GB"/>
           </a:p>
@@ -4109,7 +4948,7 @@
           <a:p>
             <a:fld id="{1CB66000-84F1-465B-BD3A-D40F18E3F61B}" type="slidenum">
               <a:rPr lang="en-GB" smtClean="0"/>
-              <a:t>‹#›</a:t>
+              <a:t>‹N›</a:t>
             </a:fld>
             <a:endParaRPr lang="en-GB"/>
           </a:p>
@@ -4118,7 +4957,7 @@
     </p:spTree>
     <p:extLst>
       <p:ext uri="{BB962C8B-B14F-4D97-AF65-F5344CB8AC3E}">
-        <p14:creationId xmlns:p14="http://schemas.microsoft.com/office/powerpoint/2010/main" val="2423362248"/>
+        <p14:creationId xmlns:p14="http://schemas.microsoft.com/office/powerpoint/2010/main" val="3022079729"/>
       </p:ext>
     </p:extLst>
   </p:cSld>
@@ -4164,7 +5003,6 @@
               <a:rPr lang="en-US"/>
               <a:t>Click to edit Master title style</a:t>
             </a:r>
-            <a:endParaRPr lang="en-US" dirty="0"/>
           </a:p>
         </p:txBody>
       </p:sp>
@@ -4180,8 +5018,8 @@
         </p:nvSpPr>
         <p:spPr>
           <a:xfrm>
-            <a:off x="363875" y="2261747"/>
-            <a:ext cx="2249408" cy="5390824"/>
+            <a:off x="331678" y="2069887"/>
+            <a:ext cx="2050376" cy="4933531"/>
           </a:xfrm>
         </p:spPr>
         <p:txBody>
@@ -4221,7 +5059,6 @@
               <a:rPr lang="en-US"/>
               <a:t>Fifth level</a:t>
             </a:r>
-            <a:endParaRPr lang="en-US" dirty="0"/>
           </a:p>
         </p:txBody>
       </p:sp>
@@ -4237,8 +5074,8 @@
         </p:nvSpPr>
         <p:spPr>
           <a:xfrm>
-            <a:off x="2679442" y="2261747"/>
-            <a:ext cx="2249408" cy="5390824"/>
+            <a:off x="2442359" y="2069887"/>
+            <a:ext cx="2050376" cy="4933531"/>
           </a:xfrm>
         </p:spPr>
         <p:txBody>
@@ -4278,7 +5115,6 @@
               <a:rPr lang="en-US"/>
               <a:t>Fifth level</a:t>
             </a:r>
-            <a:endParaRPr lang="en-US" dirty="0"/>
           </a:p>
         </p:txBody>
       </p:sp>
@@ -4299,7 +5135,7 @@
           <a:p>
             <a:fld id="{2294E16E-31E1-4807-9BDB-78BF3541B072}" type="datetimeFigureOut">
               <a:rPr lang="en-GB" smtClean="0"/>
-              <a:t>26/09/2022</a:t>
+              <a:t>09/10/2023</a:t>
             </a:fld>
             <a:endParaRPr lang="en-GB"/>
           </a:p>
@@ -4341,7 +5177,7 @@
           <a:p>
             <a:fld id="{1CB66000-84F1-465B-BD3A-D40F18E3F61B}" type="slidenum">
               <a:rPr lang="en-GB" smtClean="0"/>
-              <a:t>‹#›</a:t>
+              <a:t>‹N›</a:t>
             </a:fld>
             <a:endParaRPr lang="en-GB"/>
           </a:p>
@@ -4350,7 +5186,7 @@
     </p:spTree>
     <p:extLst>
       <p:ext uri="{BB962C8B-B14F-4D97-AF65-F5344CB8AC3E}">
-        <p14:creationId xmlns:p14="http://schemas.microsoft.com/office/powerpoint/2010/main" val="3508374464"/>
+        <p14:creationId xmlns:p14="http://schemas.microsoft.com/office/powerpoint/2010/main" val="2850613007"/>
       </p:ext>
     </p:extLst>
   </p:cSld>
@@ -4389,8 +5225,8 @@
         </p:nvSpPr>
         <p:spPr>
           <a:xfrm>
-            <a:off x="364564" y="452351"/>
-            <a:ext cx="4564975" cy="1642225"/>
+            <a:off x="332307" y="413979"/>
+            <a:ext cx="4161056" cy="1502918"/>
           </a:xfrm>
         </p:spPr>
         <p:txBody>
@@ -4401,7 +5237,6 @@
               <a:rPr lang="en-US"/>
               <a:t>Click to edit Master title style</a:t>
             </a:r>
-            <a:endParaRPr lang="en-US" dirty="0"/>
           </a:p>
         </p:txBody>
       </p:sp>
@@ -4417,8 +5252,8 @@
         </p:nvSpPr>
         <p:spPr>
           <a:xfrm>
-            <a:off x="364565" y="2082774"/>
-            <a:ext cx="2239070" cy="1020735"/>
+            <a:off x="332307" y="1906097"/>
+            <a:ext cx="2040953" cy="934148"/>
           </a:xfrm>
         </p:spPr>
         <p:txBody>
@@ -4426,39 +5261,39 @@
           <a:lstStyle>
             <a:lvl1pPr marL="0" indent="0">
               <a:buNone/>
-              <a:defRPr sz="1389" b="1"/>
+              <a:defRPr sz="1266" b="1"/>
             </a:lvl1pPr>
-            <a:lvl2pPr marL="264627" indent="0">
+            <a:lvl2pPr marL="241219" indent="0">
               <a:buNone/>
-              <a:defRPr sz="1158" b="1"/>
+              <a:defRPr sz="1055" b="1"/>
             </a:lvl2pPr>
-            <a:lvl3pPr marL="529255" indent="0">
+            <a:lvl3pPr marL="482437" indent="0">
               <a:buNone/>
-              <a:defRPr sz="1042" b="1"/>
+              <a:defRPr sz="950" b="1"/>
             </a:lvl3pPr>
-            <a:lvl4pPr marL="793882" indent="0">
+            <a:lvl4pPr marL="723656" indent="0">
               <a:buNone/>
-              <a:defRPr sz="926" b="1"/>
+              <a:defRPr sz="844" b="1"/>
             </a:lvl4pPr>
-            <a:lvl5pPr marL="1058509" indent="0">
+            <a:lvl5pPr marL="964875" indent="0">
               <a:buNone/>
-              <a:defRPr sz="926" b="1"/>
+              <a:defRPr sz="844" b="1"/>
             </a:lvl5pPr>
-            <a:lvl6pPr marL="1323137" indent="0">
+            <a:lvl6pPr marL="1206094" indent="0">
               <a:buNone/>
-              <a:defRPr sz="926" b="1"/>
+              <a:defRPr sz="844" b="1"/>
             </a:lvl6pPr>
-            <a:lvl7pPr marL="1587764" indent="0">
+            <a:lvl7pPr marL="1447312" indent="0">
               <a:buNone/>
-              <a:defRPr sz="926" b="1"/>
+              <a:defRPr sz="844" b="1"/>
             </a:lvl7pPr>
-            <a:lvl8pPr marL="1852392" indent="0">
+            <a:lvl8pPr marL="1688531" indent="0">
               <a:buNone/>
-              <a:defRPr sz="926" b="1"/>
+              <a:defRPr sz="844" b="1"/>
             </a:lvl8pPr>
-            <a:lvl9pPr marL="2117019" indent="0">
+            <a:lvl9pPr marL="1929750" indent="0">
               <a:buNone/>
-              <a:defRPr sz="926" b="1"/>
+              <a:defRPr sz="844" b="1"/>
             </a:lvl9pPr>
           </a:lstStyle>
           <a:p>
@@ -4482,8 +5317,8 @@
         </p:nvSpPr>
         <p:spPr>
           <a:xfrm>
-            <a:off x="364565" y="3103510"/>
-            <a:ext cx="2239070" cy="4564795"/>
+            <a:off x="332307" y="2840245"/>
+            <a:ext cx="2040953" cy="4177572"/>
           </a:xfrm>
         </p:spPr>
         <p:txBody>
@@ -4523,7 +5358,6 @@
               <a:rPr lang="en-US"/>
               <a:t>Fifth level</a:t>
             </a:r>
-            <a:endParaRPr lang="en-US" dirty="0"/>
           </a:p>
         </p:txBody>
       </p:sp>
@@ -4539,8 +5373,8 @@
         </p:nvSpPr>
         <p:spPr>
           <a:xfrm>
-            <a:off x="2679443" y="2082774"/>
-            <a:ext cx="2250097" cy="1020735"/>
+            <a:off x="2442359" y="1906097"/>
+            <a:ext cx="2051004" cy="934148"/>
           </a:xfrm>
         </p:spPr>
         <p:txBody>
@@ -4548,39 +5382,39 @@
           <a:lstStyle>
             <a:lvl1pPr marL="0" indent="0">
               <a:buNone/>
-              <a:defRPr sz="1389" b="1"/>
+              <a:defRPr sz="1266" b="1"/>
             </a:lvl1pPr>
-            <a:lvl2pPr marL="264627" indent="0">
+            <a:lvl2pPr marL="241219" indent="0">
               <a:buNone/>
-              <a:defRPr sz="1158" b="1"/>
+              <a:defRPr sz="1055" b="1"/>
             </a:lvl2pPr>
-            <a:lvl3pPr marL="529255" indent="0">
+            <a:lvl3pPr marL="482437" indent="0">
               <a:buNone/>
-              <a:defRPr sz="1042" b="1"/>
+              <a:defRPr sz="950" b="1"/>
             </a:lvl3pPr>
-            <a:lvl4pPr marL="793882" indent="0">
+            <a:lvl4pPr marL="723656" indent="0">
               <a:buNone/>
-              <a:defRPr sz="926" b="1"/>
+              <a:defRPr sz="844" b="1"/>
             </a:lvl4pPr>
-            <a:lvl5pPr marL="1058509" indent="0">
+            <a:lvl5pPr marL="964875" indent="0">
               <a:buNone/>
-              <a:defRPr sz="926" b="1"/>
+              <a:defRPr sz="844" b="1"/>
             </a:lvl5pPr>
-            <a:lvl6pPr marL="1323137" indent="0">
+            <a:lvl6pPr marL="1206094" indent="0">
               <a:buNone/>
-              <a:defRPr sz="926" b="1"/>
+              <a:defRPr sz="844" b="1"/>
             </a:lvl6pPr>
-            <a:lvl7pPr marL="1587764" indent="0">
+            <a:lvl7pPr marL="1447312" indent="0">
               <a:buNone/>
-              <a:defRPr sz="926" b="1"/>
+              <a:defRPr sz="844" b="1"/>
             </a:lvl7pPr>
-            <a:lvl8pPr marL="1852392" indent="0">
+            <a:lvl8pPr marL="1688531" indent="0">
               <a:buNone/>
-              <a:defRPr sz="926" b="1"/>
+              <a:defRPr sz="844" b="1"/>
             </a:lvl8pPr>
-            <a:lvl9pPr marL="2117019" indent="0">
+            <a:lvl9pPr marL="1929750" indent="0">
               <a:buNone/>
-              <a:defRPr sz="926" b="1"/>
+              <a:defRPr sz="844" b="1"/>
             </a:lvl9pPr>
           </a:lstStyle>
           <a:p>
@@ -4604,8 +5438,8 @@
         </p:nvSpPr>
         <p:spPr>
           <a:xfrm>
-            <a:off x="2679443" y="3103510"/>
-            <a:ext cx="2250097" cy="4564795"/>
+            <a:off x="2442359" y="2840245"/>
+            <a:ext cx="2051004" cy="4177572"/>
           </a:xfrm>
         </p:spPr>
         <p:txBody>
@@ -4645,7 +5479,6 @@
               <a:rPr lang="en-US"/>
               <a:t>Fifth level</a:t>
             </a:r>
-            <a:endParaRPr lang="en-US" dirty="0"/>
           </a:p>
         </p:txBody>
       </p:sp>
@@ -4666,7 +5499,7 @@
           <a:p>
             <a:fld id="{2294E16E-31E1-4807-9BDB-78BF3541B072}" type="datetimeFigureOut">
               <a:rPr lang="en-GB" smtClean="0"/>
-              <a:t>26/09/2022</a:t>
+              <a:t>09/10/2023</a:t>
             </a:fld>
             <a:endParaRPr lang="en-GB"/>
           </a:p>
@@ -4708,7 +5541,7 @@
           <a:p>
             <a:fld id="{1CB66000-84F1-465B-BD3A-D40F18E3F61B}" type="slidenum">
               <a:rPr lang="en-GB" smtClean="0"/>
-              <a:t>‹#›</a:t>
+              <a:t>‹N›</a:t>
             </a:fld>
             <a:endParaRPr lang="en-GB"/>
           </a:p>
@@ -4717,7 +5550,7 @@
     </p:spTree>
     <p:extLst>
       <p:ext uri="{BB962C8B-B14F-4D97-AF65-F5344CB8AC3E}">
-        <p14:creationId xmlns:p14="http://schemas.microsoft.com/office/powerpoint/2010/main" val="1071559081"/>
+        <p14:creationId xmlns:p14="http://schemas.microsoft.com/office/powerpoint/2010/main" val="718542673"/>
       </p:ext>
     </p:extLst>
   </p:cSld>
@@ -4763,7 +5596,6 @@
               <a:rPr lang="en-US"/>
               <a:t>Click to edit Master title style</a:t>
             </a:r>
-            <a:endParaRPr lang="en-US" dirty="0"/>
           </a:p>
         </p:txBody>
       </p:sp>
@@ -4784,7 +5616,7 @@
           <a:p>
             <a:fld id="{2294E16E-31E1-4807-9BDB-78BF3541B072}" type="datetimeFigureOut">
               <a:rPr lang="en-GB" smtClean="0"/>
-              <a:t>26/09/2022</a:t>
+              <a:t>09/10/2023</a:t>
             </a:fld>
             <a:endParaRPr lang="en-GB"/>
           </a:p>
@@ -4826,7 +5658,7 @@
           <a:p>
             <a:fld id="{1CB66000-84F1-465B-BD3A-D40F18E3F61B}" type="slidenum">
               <a:rPr lang="en-GB" smtClean="0"/>
-              <a:t>‹#›</a:t>
+              <a:t>‹N›</a:t>
             </a:fld>
             <a:endParaRPr lang="en-GB"/>
           </a:p>
@@ -4835,7 +5667,7 @@
     </p:spTree>
     <p:extLst>
       <p:ext uri="{BB962C8B-B14F-4D97-AF65-F5344CB8AC3E}">
-        <p14:creationId xmlns:p14="http://schemas.microsoft.com/office/powerpoint/2010/main" val="3752968207"/>
+        <p14:creationId xmlns:p14="http://schemas.microsoft.com/office/powerpoint/2010/main" val="4010791822"/>
       </p:ext>
     </p:extLst>
   </p:cSld>
@@ -4879,7 +5711,7 @@
           <a:p>
             <a:fld id="{2294E16E-31E1-4807-9BDB-78BF3541B072}" type="datetimeFigureOut">
               <a:rPr lang="en-GB" smtClean="0"/>
-              <a:t>26/09/2022</a:t>
+              <a:t>09/10/2023</a:t>
             </a:fld>
             <a:endParaRPr lang="en-GB"/>
           </a:p>
@@ -4921,7 +5753,7 @@
           <a:p>
             <a:fld id="{1CB66000-84F1-465B-BD3A-D40F18E3F61B}" type="slidenum">
               <a:rPr lang="en-GB" smtClean="0"/>
-              <a:t>‹#›</a:t>
+              <a:t>‹N›</a:t>
             </a:fld>
             <a:endParaRPr lang="en-GB"/>
           </a:p>
@@ -4930,7 +5762,7 @@
     </p:spTree>
     <p:extLst>
       <p:ext uri="{BB962C8B-B14F-4D97-AF65-F5344CB8AC3E}">
-        <p14:creationId xmlns:p14="http://schemas.microsoft.com/office/powerpoint/2010/main" val="3905951252"/>
+        <p14:creationId xmlns:p14="http://schemas.microsoft.com/office/powerpoint/2010/main" val="686159346"/>
       </p:ext>
     </p:extLst>
   </p:cSld>
@@ -4969,15 +5801,15 @@
         </p:nvSpPr>
         <p:spPr>
           <a:xfrm>
-            <a:off x="364564" y="566420"/>
-            <a:ext cx="1707042" cy="1982470"/>
+            <a:off x="332307" y="518372"/>
+            <a:ext cx="1555999" cy="1814301"/>
           </a:xfrm>
         </p:spPr>
         <p:txBody>
           <a:bodyPr anchor="b"/>
           <a:lstStyle>
             <a:lvl1pPr>
-              <a:defRPr sz="1852"/>
+              <a:defRPr sz="1688"/>
             </a:lvl1pPr>
           </a:lstStyle>
           <a:p>
@@ -4985,7 +5817,6 @@
               <a:rPr lang="en-US"/>
               <a:t>Click to edit Master title style</a:t>
             </a:r>
-            <a:endParaRPr lang="en-US" dirty="0"/>
           </a:p>
         </p:txBody>
       </p:sp>
@@ -5001,39 +5832,39 @@
         </p:nvSpPr>
         <p:spPr>
           <a:xfrm>
-            <a:off x="2250098" y="1223312"/>
-            <a:ext cx="2679442" cy="6037880"/>
+            <a:off x="2051004" y="1119540"/>
+            <a:ext cx="2442359" cy="5525698"/>
           </a:xfrm>
         </p:spPr>
         <p:txBody>
           <a:bodyPr/>
           <a:lstStyle>
             <a:lvl1pPr>
-              <a:defRPr sz="1852"/>
+              <a:defRPr sz="1688"/>
             </a:lvl1pPr>
             <a:lvl2pPr>
-              <a:defRPr sz="1621"/>
+              <a:defRPr sz="1477"/>
             </a:lvl2pPr>
             <a:lvl3pPr>
-              <a:defRPr sz="1389"/>
+              <a:defRPr sz="1266"/>
             </a:lvl3pPr>
             <a:lvl4pPr>
-              <a:defRPr sz="1158"/>
+              <a:defRPr sz="1055"/>
             </a:lvl4pPr>
             <a:lvl5pPr>
-              <a:defRPr sz="1158"/>
+              <a:defRPr sz="1055"/>
             </a:lvl5pPr>
             <a:lvl6pPr>
-              <a:defRPr sz="1158"/>
+              <a:defRPr sz="1055"/>
             </a:lvl6pPr>
             <a:lvl7pPr>
-              <a:defRPr sz="1158"/>
+              <a:defRPr sz="1055"/>
             </a:lvl7pPr>
             <a:lvl8pPr>
-              <a:defRPr sz="1158"/>
+              <a:defRPr sz="1055"/>
             </a:lvl8pPr>
             <a:lvl9pPr>
-              <a:defRPr sz="1158"/>
+              <a:defRPr sz="1055"/>
             </a:lvl9pPr>
           </a:lstStyle>
           <a:p>
@@ -5070,7 +5901,6 @@
               <a:rPr lang="en-US"/>
               <a:t>Fifth level</a:t>
             </a:r>
-            <a:endParaRPr lang="en-US" dirty="0"/>
           </a:p>
         </p:txBody>
       </p:sp>
@@ -5086,8 +5916,8 @@
         </p:nvSpPr>
         <p:spPr>
           <a:xfrm>
-            <a:off x="364564" y="2548890"/>
-            <a:ext cx="1707042" cy="4722134"/>
+            <a:off x="332307" y="2332673"/>
+            <a:ext cx="1555999" cy="4321564"/>
           </a:xfrm>
         </p:spPr>
         <p:txBody>
@@ -5095,39 +5925,39 @@
           <a:lstStyle>
             <a:lvl1pPr marL="0" indent="0">
               <a:buNone/>
-              <a:defRPr sz="926"/>
+              <a:defRPr sz="844"/>
             </a:lvl1pPr>
-            <a:lvl2pPr marL="264627" indent="0">
+            <a:lvl2pPr marL="241219" indent="0">
               <a:buNone/>
-              <a:defRPr sz="810"/>
+              <a:defRPr sz="739"/>
             </a:lvl2pPr>
-            <a:lvl3pPr marL="529255" indent="0">
+            <a:lvl3pPr marL="482437" indent="0">
               <a:buNone/>
-              <a:defRPr sz="695"/>
+              <a:defRPr sz="633"/>
             </a:lvl3pPr>
-            <a:lvl4pPr marL="793882" indent="0">
+            <a:lvl4pPr marL="723656" indent="0">
               <a:buNone/>
-              <a:defRPr sz="579"/>
+              <a:defRPr sz="528"/>
             </a:lvl4pPr>
-            <a:lvl5pPr marL="1058509" indent="0">
+            <a:lvl5pPr marL="964875" indent="0">
               <a:buNone/>
-              <a:defRPr sz="579"/>
+              <a:defRPr sz="528"/>
             </a:lvl5pPr>
-            <a:lvl6pPr marL="1323137" indent="0">
+            <a:lvl6pPr marL="1206094" indent="0">
               <a:buNone/>
-              <a:defRPr sz="579"/>
+              <a:defRPr sz="528"/>
             </a:lvl6pPr>
-            <a:lvl7pPr marL="1587764" indent="0">
+            <a:lvl7pPr marL="1447312" indent="0">
               <a:buNone/>
-              <a:defRPr sz="579"/>
+              <a:defRPr sz="528"/>
             </a:lvl7pPr>
-            <a:lvl8pPr marL="1852392" indent="0">
+            <a:lvl8pPr marL="1688531" indent="0">
               <a:buNone/>
-              <a:defRPr sz="579"/>
+              <a:defRPr sz="528"/>
             </a:lvl8pPr>
-            <a:lvl9pPr marL="2117019" indent="0">
+            <a:lvl9pPr marL="1929750" indent="0">
               <a:buNone/>
-              <a:defRPr sz="579"/>
+              <a:defRPr sz="528"/>
             </a:lvl9pPr>
           </a:lstStyle>
           <a:p>
@@ -5156,7 +5986,7 @@
           <a:p>
             <a:fld id="{2294E16E-31E1-4807-9BDB-78BF3541B072}" type="datetimeFigureOut">
               <a:rPr lang="en-GB" smtClean="0"/>
-              <a:t>26/09/2022</a:t>
+              <a:t>09/10/2023</a:t>
             </a:fld>
             <a:endParaRPr lang="en-GB"/>
           </a:p>
@@ -5198,7 +6028,7 @@
           <a:p>
             <a:fld id="{1CB66000-84F1-465B-BD3A-D40F18E3F61B}" type="slidenum">
               <a:rPr lang="en-GB" smtClean="0"/>
-              <a:t>‹#›</a:t>
+              <a:t>‹N›</a:t>
             </a:fld>
             <a:endParaRPr lang="en-GB"/>
           </a:p>
@@ -5207,7 +6037,7 @@
     </p:spTree>
     <p:extLst>
       <p:ext uri="{BB962C8B-B14F-4D97-AF65-F5344CB8AC3E}">
-        <p14:creationId xmlns:p14="http://schemas.microsoft.com/office/powerpoint/2010/main" val="654949152"/>
+        <p14:creationId xmlns:p14="http://schemas.microsoft.com/office/powerpoint/2010/main" val="1325229358"/>
       </p:ext>
     </p:extLst>
   </p:cSld>
@@ -5246,15 +6076,15 @@
         </p:nvSpPr>
         <p:spPr>
           <a:xfrm>
-            <a:off x="364564" y="566420"/>
-            <a:ext cx="1707042" cy="1982470"/>
+            <a:off x="332307" y="518372"/>
+            <a:ext cx="1555999" cy="1814301"/>
           </a:xfrm>
         </p:spPr>
         <p:txBody>
           <a:bodyPr anchor="b"/>
           <a:lstStyle>
             <a:lvl1pPr>
-              <a:defRPr sz="1852"/>
+              <a:defRPr sz="1688"/>
             </a:lvl1pPr>
           </a:lstStyle>
           <a:p>
@@ -5262,7 +6092,6 @@
               <a:rPr lang="en-US"/>
               <a:t>Click to edit Master title style</a:t>
             </a:r>
-            <a:endParaRPr lang="en-US" dirty="0"/>
           </a:p>
         </p:txBody>
       </p:sp>
@@ -5278,8 +6107,8 @@
         </p:nvSpPr>
         <p:spPr>
           <a:xfrm>
-            <a:off x="2250098" y="1223312"/>
-            <a:ext cx="2679442" cy="6037880"/>
+            <a:off x="2051004" y="1119540"/>
+            <a:ext cx="2442359" cy="5525698"/>
           </a:xfrm>
         </p:spPr>
         <p:txBody>
@@ -5287,39 +6116,39 @@
           <a:lstStyle>
             <a:lvl1pPr marL="0" indent="0">
               <a:buNone/>
-              <a:defRPr sz="1852"/>
+              <a:defRPr sz="1688"/>
             </a:lvl1pPr>
-            <a:lvl2pPr marL="264627" indent="0">
+            <a:lvl2pPr marL="241219" indent="0">
               <a:buNone/>
-              <a:defRPr sz="1621"/>
+              <a:defRPr sz="1477"/>
             </a:lvl2pPr>
-            <a:lvl3pPr marL="529255" indent="0">
+            <a:lvl3pPr marL="482437" indent="0">
               <a:buNone/>
-              <a:defRPr sz="1389"/>
+              <a:defRPr sz="1266"/>
             </a:lvl3pPr>
-            <a:lvl4pPr marL="793882" indent="0">
+            <a:lvl4pPr marL="723656" indent="0">
               <a:buNone/>
-              <a:defRPr sz="1158"/>
+              <a:defRPr sz="1055"/>
             </a:lvl4pPr>
-            <a:lvl5pPr marL="1058509" indent="0">
+            <a:lvl5pPr marL="964875" indent="0">
               <a:buNone/>
-              <a:defRPr sz="1158"/>
+              <a:defRPr sz="1055"/>
             </a:lvl5pPr>
-            <a:lvl6pPr marL="1323137" indent="0">
+            <a:lvl6pPr marL="1206094" indent="0">
               <a:buNone/>
-              <a:defRPr sz="1158"/>
+              <a:defRPr sz="1055"/>
             </a:lvl6pPr>
-            <a:lvl7pPr marL="1587764" indent="0">
+            <a:lvl7pPr marL="1447312" indent="0">
               <a:buNone/>
-              <a:defRPr sz="1158"/>
+              <a:defRPr sz="1055"/>
             </a:lvl7pPr>
-            <a:lvl8pPr marL="1852392" indent="0">
+            <a:lvl8pPr marL="1688531" indent="0">
               <a:buNone/>
-              <a:defRPr sz="1158"/>
+              <a:defRPr sz="1055"/>
             </a:lvl8pPr>
-            <a:lvl9pPr marL="2117019" indent="0">
+            <a:lvl9pPr marL="1929750" indent="0">
               <a:buNone/>
-              <a:defRPr sz="1158"/>
+              <a:defRPr sz="1055"/>
             </a:lvl9pPr>
           </a:lstStyle>
           <a:p>
@@ -5327,7 +6156,6 @@
               <a:rPr lang="en-US"/>
               <a:t>Click icon to add picture</a:t>
             </a:r>
-            <a:endParaRPr lang="en-US" dirty="0"/>
           </a:p>
         </p:txBody>
       </p:sp>
@@ -5343,8 +6171,8 @@
         </p:nvSpPr>
         <p:spPr>
           <a:xfrm>
-            <a:off x="364564" y="2548890"/>
-            <a:ext cx="1707042" cy="4722134"/>
+            <a:off x="332307" y="2332673"/>
+            <a:ext cx="1555999" cy="4321564"/>
           </a:xfrm>
         </p:spPr>
         <p:txBody>
@@ -5352,39 +6180,39 @@
           <a:lstStyle>
             <a:lvl1pPr marL="0" indent="0">
               <a:buNone/>
-              <a:defRPr sz="926"/>
+              <a:defRPr sz="844"/>
             </a:lvl1pPr>
-            <a:lvl2pPr marL="264627" indent="0">
+            <a:lvl2pPr marL="241219" indent="0">
               <a:buNone/>
-              <a:defRPr sz="810"/>
+              <a:defRPr sz="739"/>
             </a:lvl2pPr>
-            <a:lvl3pPr marL="529255" indent="0">
+            <a:lvl3pPr marL="482437" indent="0">
               <a:buNone/>
-              <a:defRPr sz="695"/>
+              <a:defRPr sz="633"/>
             </a:lvl3pPr>
-            <a:lvl4pPr marL="793882" indent="0">
+            <a:lvl4pPr marL="723656" indent="0">
               <a:buNone/>
-              <a:defRPr sz="579"/>
+              <a:defRPr sz="528"/>
             </a:lvl4pPr>
-            <a:lvl5pPr marL="1058509" indent="0">
+            <a:lvl5pPr marL="964875" indent="0">
               <a:buNone/>
-              <a:defRPr sz="579"/>
+              <a:defRPr sz="528"/>
             </a:lvl5pPr>
-            <a:lvl6pPr marL="1323137" indent="0">
+            <a:lvl6pPr marL="1206094" indent="0">
               <a:buNone/>
-              <a:defRPr sz="579"/>
+              <a:defRPr sz="528"/>
             </a:lvl6pPr>
-            <a:lvl7pPr marL="1587764" indent="0">
+            <a:lvl7pPr marL="1447312" indent="0">
               <a:buNone/>
-              <a:defRPr sz="579"/>
+              <a:defRPr sz="528"/>
             </a:lvl7pPr>
-            <a:lvl8pPr marL="1852392" indent="0">
+            <a:lvl8pPr marL="1688531" indent="0">
               <a:buNone/>
-              <a:defRPr sz="579"/>
+              <a:defRPr sz="528"/>
             </a:lvl8pPr>
-            <a:lvl9pPr marL="2117019" indent="0">
+            <a:lvl9pPr marL="1929750" indent="0">
               <a:buNone/>
-              <a:defRPr sz="579"/>
+              <a:defRPr sz="528"/>
             </a:lvl9pPr>
           </a:lstStyle>
           <a:p>
@@ -5413,7 +6241,7 @@
           <a:p>
             <a:fld id="{2294E16E-31E1-4807-9BDB-78BF3541B072}" type="datetimeFigureOut">
               <a:rPr lang="en-GB" smtClean="0"/>
-              <a:t>26/09/2022</a:t>
+              <a:t>09/10/2023</a:t>
             </a:fld>
             <a:endParaRPr lang="en-GB"/>
           </a:p>
@@ -5455,7 +6283,7 @@
           <a:p>
             <a:fld id="{1CB66000-84F1-465B-BD3A-D40F18E3F61B}" type="slidenum">
               <a:rPr lang="en-GB" smtClean="0"/>
-              <a:t>‹#›</a:t>
+              <a:t>‹N›</a:t>
             </a:fld>
             <a:endParaRPr lang="en-GB"/>
           </a:p>
@@ -5464,7 +6292,7 @@
     </p:spTree>
     <p:extLst>
       <p:ext uri="{BB962C8B-B14F-4D97-AF65-F5344CB8AC3E}">
-        <p14:creationId xmlns:p14="http://schemas.microsoft.com/office/powerpoint/2010/main" val="1159905848"/>
+        <p14:creationId xmlns:p14="http://schemas.microsoft.com/office/powerpoint/2010/main" val="3922249158"/>
       </p:ext>
     </p:extLst>
   </p:cSld>
@@ -5508,8 +6336,8 @@
         </p:nvSpPr>
         <p:spPr>
           <a:xfrm>
-            <a:off x="363875" y="452351"/>
-            <a:ext cx="4564975" cy="1642225"/>
+            <a:off x="331679" y="413979"/>
+            <a:ext cx="4161056" cy="1502918"/>
           </a:xfrm>
           <a:prstGeom prst="rect">
             <a:avLst/>
@@ -5525,7 +6353,6 @@
               <a:rPr lang="en-US"/>
               <a:t>Click to edit Master title style</a:t>
             </a:r>
-            <a:endParaRPr lang="en-US" dirty="0"/>
           </a:p>
         </p:txBody>
       </p:sp>
@@ -5541,8 +6368,8 @@
         </p:nvSpPr>
         <p:spPr>
           <a:xfrm>
-            <a:off x="363875" y="2261747"/>
-            <a:ext cx="4564975" cy="5390824"/>
+            <a:off x="331679" y="2069887"/>
+            <a:ext cx="4161056" cy="4933531"/>
           </a:xfrm>
           <a:prstGeom prst="rect">
             <a:avLst/>
@@ -5587,7 +6414,6 @@
               <a:rPr lang="en-US"/>
               <a:t>Fifth level</a:t>
             </a:r>
-            <a:endParaRPr lang="en-US" dirty="0"/>
           </a:p>
         </p:txBody>
       </p:sp>
@@ -5603,8 +6429,8 @@
         </p:nvSpPr>
         <p:spPr>
           <a:xfrm>
-            <a:off x="363875" y="7874813"/>
-            <a:ext cx="1190863" cy="452349"/>
+            <a:off x="331678" y="7206808"/>
+            <a:ext cx="1085493" cy="413977"/>
           </a:xfrm>
           <a:prstGeom prst="rect">
             <a:avLst/>
@@ -5614,7 +6440,7 @@
           <a:bodyPr vert="horz" lIns="91440" tIns="45720" rIns="91440" bIns="45720" rtlCol="0" anchor="ctr"/>
           <a:lstStyle>
             <a:lvl1pPr algn="l">
-              <a:defRPr sz="695">
+              <a:defRPr sz="633">
                 <a:solidFill>
                   <a:schemeClr val="tx1">
                     <a:tint val="75000"/>
@@ -5626,7 +6452,7 @@
           <a:p>
             <a:fld id="{2294E16E-31E1-4807-9BDB-78BF3541B072}" type="datetimeFigureOut">
               <a:rPr lang="en-GB" smtClean="0"/>
-              <a:t>26/09/2022</a:t>
+              <a:t>09/10/2023</a:t>
             </a:fld>
             <a:endParaRPr lang="en-GB"/>
           </a:p>
@@ -5644,8 +6470,8 @@
         </p:nvSpPr>
         <p:spPr>
           <a:xfrm>
-            <a:off x="1753215" y="7874813"/>
-            <a:ext cx="1786295" cy="452349"/>
+            <a:off x="1598087" y="7206808"/>
+            <a:ext cx="1628239" cy="413977"/>
           </a:xfrm>
           <a:prstGeom prst="rect">
             <a:avLst/>
@@ -5655,7 +6481,7 @@
           <a:bodyPr vert="horz" lIns="91440" tIns="45720" rIns="91440" bIns="45720" rtlCol="0" anchor="ctr"/>
           <a:lstStyle>
             <a:lvl1pPr algn="ctr">
-              <a:defRPr sz="695">
+              <a:defRPr sz="633">
                 <a:solidFill>
                   <a:schemeClr val="tx1">
                     <a:tint val="75000"/>
@@ -5681,8 +6507,8 @@
         </p:nvSpPr>
         <p:spPr>
           <a:xfrm>
-            <a:off x="3737987" y="7874813"/>
-            <a:ext cx="1190863" cy="452349"/>
+            <a:off x="3407242" y="7206808"/>
+            <a:ext cx="1085493" cy="413977"/>
           </a:xfrm>
           <a:prstGeom prst="rect">
             <a:avLst/>
@@ -5692,7 +6518,7 @@
           <a:bodyPr vert="horz" lIns="91440" tIns="45720" rIns="91440" bIns="45720" rtlCol="0" anchor="ctr"/>
           <a:lstStyle>
             <a:lvl1pPr algn="r">
-              <a:defRPr sz="695">
+              <a:defRPr sz="633">
                 <a:solidFill>
                   <a:schemeClr val="tx1">
                     <a:tint val="75000"/>
@@ -5704,7 +6530,7 @@
           <a:p>
             <a:fld id="{1CB66000-84F1-465B-BD3A-D40F18E3F61B}" type="slidenum">
               <a:rPr lang="en-GB" smtClean="0"/>
-              <a:t>‹#›</a:t>
+              <a:t>‹N›</a:t>
             </a:fld>
             <a:endParaRPr lang="en-GB"/>
           </a:p>
@@ -5713,27 +6539,27 @@
     </p:spTree>
     <p:extLst>
       <p:ext uri="{BB962C8B-B14F-4D97-AF65-F5344CB8AC3E}">
-        <p14:creationId xmlns:p14="http://schemas.microsoft.com/office/powerpoint/2010/main" val="4198749539"/>
+        <p14:creationId xmlns:p14="http://schemas.microsoft.com/office/powerpoint/2010/main" val="1039333881"/>
       </p:ext>
     </p:extLst>
   </p:cSld>
   <p:clrMap bg1="lt1" tx1="dk1" bg2="lt2" tx2="dk2" accent1="accent1" accent2="accent2" accent3="accent3" accent4="accent4" accent5="accent5" accent6="accent6" hlink="hlink" folHlink="folHlink"/>
   <p:sldLayoutIdLst>
-    <p:sldLayoutId id="2147483709" r:id="rId1"/>
-    <p:sldLayoutId id="2147483710" r:id="rId2"/>
-    <p:sldLayoutId id="2147483711" r:id="rId3"/>
-    <p:sldLayoutId id="2147483712" r:id="rId4"/>
-    <p:sldLayoutId id="2147483713" r:id="rId5"/>
-    <p:sldLayoutId id="2147483714" r:id="rId6"/>
-    <p:sldLayoutId id="2147483715" r:id="rId7"/>
-    <p:sldLayoutId id="2147483716" r:id="rId8"/>
-    <p:sldLayoutId id="2147483717" r:id="rId9"/>
-    <p:sldLayoutId id="2147483718" r:id="rId10"/>
-    <p:sldLayoutId id="2147483719" r:id="rId11"/>
+    <p:sldLayoutId id="2147483721" r:id="rId1"/>
+    <p:sldLayoutId id="2147483722" r:id="rId2"/>
+    <p:sldLayoutId id="2147483723" r:id="rId3"/>
+    <p:sldLayoutId id="2147483724" r:id="rId4"/>
+    <p:sldLayoutId id="2147483725" r:id="rId5"/>
+    <p:sldLayoutId id="2147483726" r:id="rId6"/>
+    <p:sldLayoutId id="2147483727" r:id="rId7"/>
+    <p:sldLayoutId id="2147483728" r:id="rId8"/>
+    <p:sldLayoutId id="2147483729" r:id="rId9"/>
+    <p:sldLayoutId id="2147483730" r:id="rId10"/>
+    <p:sldLayoutId id="2147483731" r:id="rId11"/>
   </p:sldLayoutIdLst>
   <p:txStyles>
     <p:titleStyle>
-      <a:lvl1pPr algn="l" defTabSz="529255" rtl="0" eaLnBrk="1" latinLnBrk="0" hangingPunct="1">
+      <a:lvl1pPr algn="l" defTabSz="482437" rtl="0" eaLnBrk="1" latinLnBrk="0" hangingPunct="1">
         <a:lnSpc>
           <a:spcPct val="90000"/>
         </a:lnSpc>
@@ -5741,7 +6567,7 @@
           <a:spcPct val="0"/>
         </a:spcBef>
         <a:buNone/>
-        <a:defRPr sz="2547" kern="1200">
+        <a:defRPr sz="2321" kern="1200">
           <a:solidFill>
             <a:schemeClr val="tx1"/>
           </a:solidFill>
@@ -5752,16 +6578,16 @@
       </a:lvl1pPr>
     </p:titleStyle>
     <p:bodyStyle>
-      <a:lvl1pPr marL="132314" indent="-132314" algn="l" defTabSz="529255" rtl="0" eaLnBrk="1" latinLnBrk="0" hangingPunct="1">
+      <a:lvl1pPr marL="120609" indent="-120609" algn="l" defTabSz="482437" rtl="0" eaLnBrk="1" latinLnBrk="0" hangingPunct="1">
         <a:lnSpc>
           <a:spcPct val="90000"/>
         </a:lnSpc>
         <a:spcBef>
-          <a:spcPts val="579"/>
+          <a:spcPts val="528"/>
         </a:spcBef>
         <a:buFont typeface="Arial" panose="020B0604020202020204" pitchFamily="34" charset="0"/>
         <a:buChar char="•"/>
-        <a:defRPr sz="1621" kern="1200">
+        <a:defRPr sz="1477" kern="1200">
           <a:solidFill>
             <a:schemeClr val="tx1"/>
           </a:solidFill>
@@ -5770,16 +6596,16 @@
           <a:cs typeface="+mn-cs"/>
         </a:defRPr>
       </a:lvl1pPr>
-      <a:lvl2pPr marL="396941" indent="-132314" algn="l" defTabSz="529255" rtl="0" eaLnBrk="1" latinLnBrk="0" hangingPunct="1">
+      <a:lvl2pPr marL="361828" indent="-120609" algn="l" defTabSz="482437" rtl="0" eaLnBrk="1" latinLnBrk="0" hangingPunct="1">
         <a:lnSpc>
           <a:spcPct val="90000"/>
         </a:lnSpc>
         <a:spcBef>
-          <a:spcPts val="289"/>
+          <a:spcPts val="264"/>
         </a:spcBef>
         <a:buFont typeface="Arial" panose="020B0604020202020204" pitchFamily="34" charset="0"/>
         <a:buChar char="•"/>
-        <a:defRPr sz="1389" kern="1200">
+        <a:defRPr sz="1266" kern="1200">
           <a:solidFill>
             <a:schemeClr val="tx1"/>
           </a:solidFill>
@@ -5788,16 +6614,16 @@
           <a:cs typeface="+mn-cs"/>
         </a:defRPr>
       </a:lvl2pPr>
-      <a:lvl3pPr marL="661568" indent="-132314" algn="l" defTabSz="529255" rtl="0" eaLnBrk="1" latinLnBrk="0" hangingPunct="1">
+      <a:lvl3pPr marL="603047" indent="-120609" algn="l" defTabSz="482437" rtl="0" eaLnBrk="1" latinLnBrk="0" hangingPunct="1">
         <a:lnSpc>
           <a:spcPct val="90000"/>
         </a:lnSpc>
         <a:spcBef>
-          <a:spcPts val="289"/>
+          <a:spcPts val="264"/>
         </a:spcBef>
         <a:buFont typeface="Arial" panose="020B0604020202020204" pitchFamily="34" charset="0"/>
         <a:buChar char="•"/>
-        <a:defRPr sz="1158" kern="1200">
+        <a:defRPr sz="1055" kern="1200">
           <a:solidFill>
             <a:schemeClr val="tx1"/>
           </a:solidFill>
@@ -5806,16 +6632,16 @@
           <a:cs typeface="+mn-cs"/>
         </a:defRPr>
       </a:lvl3pPr>
-      <a:lvl4pPr marL="926196" indent="-132314" algn="l" defTabSz="529255" rtl="0" eaLnBrk="1" latinLnBrk="0" hangingPunct="1">
+      <a:lvl4pPr marL="844266" indent="-120609" algn="l" defTabSz="482437" rtl="0" eaLnBrk="1" latinLnBrk="0" hangingPunct="1">
         <a:lnSpc>
           <a:spcPct val="90000"/>
         </a:lnSpc>
         <a:spcBef>
-          <a:spcPts val="289"/>
+          <a:spcPts val="264"/>
         </a:spcBef>
         <a:buFont typeface="Arial" panose="020B0604020202020204" pitchFamily="34" charset="0"/>
         <a:buChar char="•"/>
-        <a:defRPr sz="1042" kern="1200">
+        <a:defRPr sz="950" kern="1200">
           <a:solidFill>
             <a:schemeClr val="tx1"/>
           </a:solidFill>
@@ -5824,16 +6650,16 @@
           <a:cs typeface="+mn-cs"/>
         </a:defRPr>
       </a:lvl4pPr>
-      <a:lvl5pPr marL="1190823" indent="-132314" algn="l" defTabSz="529255" rtl="0" eaLnBrk="1" latinLnBrk="0" hangingPunct="1">
+      <a:lvl5pPr marL="1085484" indent="-120609" algn="l" defTabSz="482437" rtl="0" eaLnBrk="1" latinLnBrk="0" hangingPunct="1">
         <a:lnSpc>
           <a:spcPct val="90000"/>
         </a:lnSpc>
         <a:spcBef>
-          <a:spcPts val="289"/>
+          <a:spcPts val="264"/>
         </a:spcBef>
         <a:buFont typeface="Arial" panose="020B0604020202020204" pitchFamily="34" charset="0"/>
         <a:buChar char="•"/>
-        <a:defRPr sz="1042" kern="1200">
+        <a:defRPr sz="950" kern="1200">
           <a:solidFill>
             <a:schemeClr val="tx1"/>
           </a:solidFill>
@@ -5842,16 +6668,16 @@
           <a:cs typeface="+mn-cs"/>
         </a:defRPr>
       </a:lvl5pPr>
-      <a:lvl6pPr marL="1455450" indent="-132314" algn="l" defTabSz="529255" rtl="0" eaLnBrk="1" latinLnBrk="0" hangingPunct="1">
+      <a:lvl6pPr marL="1326703" indent="-120609" algn="l" defTabSz="482437" rtl="0" eaLnBrk="1" latinLnBrk="0" hangingPunct="1">
         <a:lnSpc>
           <a:spcPct val="90000"/>
         </a:lnSpc>
         <a:spcBef>
-          <a:spcPts val="289"/>
+          <a:spcPts val="264"/>
         </a:spcBef>
         <a:buFont typeface="Arial" panose="020B0604020202020204" pitchFamily="34" charset="0"/>
         <a:buChar char="•"/>
-        <a:defRPr sz="1042" kern="1200">
+        <a:defRPr sz="950" kern="1200">
           <a:solidFill>
             <a:schemeClr val="tx1"/>
           </a:solidFill>
@@ -5860,16 +6686,16 @@
           <a:cs typeface="+mn-cs"/>
         </a:defRPr>
       </a:lvl6pPr>
-      <a:lvl7pPr marL="1720078" indent="-132314" algn="l" defTabSz="529255" rtl="0" eaLnBrk="1" latinLnBrk="0" hangingPunct="1">
+      <a:lvl7pPr marL="1567922" indent="-120609" algn="l" defTabSz="482437" rtl="0" eaLnBrk="1" latinLnBrk="0" hangingPunct="1">
         <a:lnSpc>
           <a:spcPct val="90000"/>
         </a:lnSpc>
         <a:spcBef>
-          <a:spcPts val="289"/>
+          <a:spcPts val="264"/>
         </a:spcBef>
         <a:buFont typeface="Arial" panose="020B0604020202020204" pitchFamily="34" charset="0"/>
         <a:buChar char="•"/>
-        <a:defRPr sz="1042" kern="1200">
+        <a:defRPr sz="950" kern="1200">
           <a:solidFill>
             <a:schemeClr val="tx1"/>
           </a:solidFill>
@@ -5878,16 +6704,16 @@
           <a:cs typeface="+mn-cs"/>
         </a:defRPr>
       </a:lvl7pPr>
-      <a:lvl8pPr marL="1984705" indent="-132314" algn="l" defTabSz="529255" rtl="0" eaLnBrk="1" latinLnBrk="0" hangingPunct="1">
+      <a:lvl8pPr marL="1809140" indent="-120609" algn="l" defTabSz="482437" rtl="0" eaLnBrk="1" latinLnBrk="0" hangingPunct="1">
         <a:lnSpc>
           <a:spcPct val="90000"/>
         </a:lnSpc>
         <a:spcBef>
-          <a:spcPts val="289"/>
+          <a:spcPts val="264"/>
         </a:spcBef>
         <a:buFont typeface="Arial" panose="020B0604020202020204" pitchFamily="34" charset="0"/>
         <a:buChar char="•"/>
-        <a:defRPr sz="1042" kern="1200">
+        <a:defRPr sz="950" kern="1200">
           <a:solidFill>
             <a:schemeClr val="tx1"/>
           </a:solidFill>
@@ -5896,16 +6722,16 @@
           <a:cs typeface="+mn-cs"/>
         </a:defRPr>
       </a:lvl8pPr>
-      <a:lvl9pPr marL="2249333" indent="-132314" algn="l" defTabSz="529255" rtl="0" eaLnBrk="1" latinLnBrk="0" hangingPunct="1">
+      <a:lvl9pPr marL="2050359" indent="-120609" algn="l" defTabSz="482437" rtl="0" eaLnBrk="1" latinLnBrk="0" hangingPunct="1">
         <a:lnSpc>
           <a:spcPct val="90000"/>
         </a:lnSpc>
         <a:spcBef>
-          <a:spcPts val="289"/>
+          <a:spcPts val="264"/>
         </a:spcBef>
         <a:buFont typeface="Arial" panose="020B0604020202020204" pitchFamily="34" charset="0"/>
         <a:buChar char="•"/>
-        <a:defRPr sz="1042" kern="1200">
+        <a:defRPr sz="950" kern="1200">
           <a:solidFill>
             <a:schemeClr val="tx1"/>
           </a:solidFill>
@@ -5919,8 +6745,8 @@
       <a:defPPr>
         <a:defRPr lang="en-US"/>
       </a:defPPr>
-      <a:lvl1pPr marL="0" algn="l" defTabSz="529255" rtl="0" eaLnBrk="1" latinLnBrk="0" hangingPunct="1">
-        <a:defRPr sz="1042" kern="1200">
+      <a:lvl1pPr marL="0" algn="l" defTabSz="482437" rtl="0" eaLnBrk="1" latinLnBrk="0" hangingPunct="1">
+        <a:defRPr sz="950" kern="1200">
           <a:solidFill>
             <a:schemeClr val="tx1"/>
           </a:solidFill>
@@ -5929,8 +6755,8 @@
           <a:cs typeface="+mn-cs"/>
         </a:defRPr>
       </a:lvl1pPr>
-      <a:lvl2pPr marL="264627" algn="l" defTabSz="529255" rtl="0" eaLnBrk="1" latinLnBrk="0" hangingPunct="1">
-        <a:defRPr sz="1042" kern="1200">
+      <a:lvl2pPr marL="241219" algn="l" defTabSz="482437" rtl="0" eaLnBrk="1" latinLnBrk="0" hangingPunct="1">
+        <a:defRPr sz="950" kern="1200">
           <a:solidFill>
             <a:schemeClr val="tx1"/>
           </a:solidFill>
@@ -5939,8 +6765,8 @@
           <a:cs typeface="+mn-cs"/>
         </a:defRPr>
       </a:lvl2pPr>
-      <a:lvl3pPr marL="529255" algn="l" defTabSz="529255" rtl="0" eaLnBrk="1" latinLnBrk="0" hangingPunct="1">
-        <a:defRPr sz="1042" kern="1200">
+      <a:lvl3pPr marL="482437" algn="l" defTabSz="482437" rtl="0" eaLnBrk="1" latinLnBrk="0" hangingPunct="1">
+        <a:defRPr sz="950" kern="1200">
           <a:solidFill>
             <a:schemeClr val="tx1"/>
           </a:solidFill>
@@ -5949,8 +6775,8 @@
           <a:cs typeface="+mn-cs"/>
         </a:defRPr>
       </a:lvl3pPr>
-      <a:lvl4pPr marL="793882" algn="l" defTabSz="529255" rtl="0" eaLnBrk="1" latinLnBrk="0" hangingPunct="1">
-        <a:defRPr sz="1042" kern="1200">
+      <a:lvl4pPr marL="723656" algn="l" defTabSz="482437" rtl="0" eaLnBrk="1" latinLnBrk="0" hangingPunct="1">
+        <a:defRPr sz="950" kern="1200">
           <a:solidFill>
             <a:schemeClr val="tx1"/>
           </a:solidFill>
@@ -5959,8 +6785,8 @@
           <a:cs typeface="+mn-cs"/>
         </a:defRPr>
       </a:lvl4pPr>
-      <a:lvl5pPr marL="1058509" algn="l" defTabSz="529255" rtl="0" eaLnBrk="1" latinLnBrk="0" hangingPunct="1">
-        <a:defRPr sz="1042" kern="1200">
+      <a:lvl5pPr marL="964875" algn="l" defTabSz="482437" rtl="0" eaLnBrk="1" latinLnBrk="0" hangingPunct="1">
+        <a:defRPr sz="950" kern="1200">
           <a:solidFill>
             <a:schemeClr val="tx1"/>
           </a:solidFill>
@@ -5969,8 +6795,8 @@
           <a:cs typeface="+mn-cs"/>
         </a:defRPr>
       </a:lvl5pPr>
-      <a:lvl6pPr marL="1323137" algn="l" defTabSz="529255" rtl="0" eaLnBrk="1" latinLnBrk="0" hangingPunct="1">
-        <a:defRPr sz="1042" kern="1200">
+      <a:lvl6pPr marL="1206094" algn="l" defTabSz="482437" rtl="0" eaLnBrk="1" latinLnBrk="0" hangingPunct="1">
+        <a:defRPr sz="950" kern="1200">
           <a:solidFill>
             <a:schemeClr val="tx1"/>
           </a:solidFill>
@@ -5979,8 +6805,8 @@
           <a:cs typeface="+mn-cs"/>
         </a:defRPr>
       </a:lvl6pPr>
-      <a:lvl7pPr marL="1587764" algn="l" defTabSz="529255" rtl="0" eaLnBrk="1" latinLnBrk="0" hangingPunct="1">
-        <a:defRPr sz="1042" kern="1200">
+      <a:lvl7pPr marL="1447312" algn="l" defTabSz="482437" rtl="0" eaLnBrk="1" latinLnBrk="0" hangingPunct="1">
+        <a:defRPr sz="950" kern="1200">
           <a:solidFill>
             <a:schemeClr val="tx1"/>
           </a:solidFill>
@@ -5989,8 +6815,8 @@
           <a:cs typeface="+mn-cs"/>
         </a:defRPr>
       </a:lvl7pPr>
-      <a:lvl8pPr marL="1852392" algn="l" defTabSz="529255" rtl="0" eaLnBrk="1" latinLnBrk="0" hangingPunct="1">
-        <a:defRPr sz="1042" kern="1200">
+      <a:lvl8pPr marL="1688531" algn="l" defTabSz="482437" rtl="0" eaLnBrk="1" latinLnBrk="0" hangingPunct="1">
+        <a:defRPr sz="950" kern="1200">
           <a:solidFill>
             <a:schemeClr val="tx1"/>
           </a:solidFill>
@@ -5999,8 +6825,8 @@
           <a:cs typeface="+mn-cs"/>
         </a:defRPr>
       </a:lvl8pPr>
-      <a:lvl9pPr marL="2117019" algn="l" defTabSz="529255" rtl="0" eaLnBrk="1" latinLnBrk="0" hangingPunct="1">
-        <a:defRPr sz="1042" kern="1200">
+      <a:lvl9pPr marL="1929750" algn="l" defTabSz="482437" rtl="0" eaLnBrk="1" latinLnBrk="0" hangingPunct="1">
+        <a:defRPr sz="950" kern="1200">
           <a:solidFill>
             <a:schemeClr val="tx1"/>
           </a:solidFill>
@@ -6031,345 +6857,12 @@
           <a:chExt cx="0" cy="0"/>
         </a:xfrm>
       </p:grpSpPr>
-      <p:grpSp>
-        <p:nvGrpSpPr>
-          <p:cNvPr id="83" name="Group 82">
+      <p:sp>
+        <p:nvSpPr>
+          <p:cNvPr id="59" name="TextBox 58">
             <a:extLst>
               <a:ext uri="{FF2B5EF4-FFF2-40B4-BE49-F238E27FC236}">
-                <a16:creationId xmlns:a16="http://schemas.microsoft.com/office/drawing/2014/main" id="{08889A1E-937E-4C4F-8348-725EAEA453C9}"/>
-              </a:ext>
-            </a:extLst>
-          </p:cNvPr>
-          <p:cNvGrpSpPr/>
-          <p:nvPr/>
-        </p:nvGrpSpPr>
-        <p:grpSpPr>
-          <a:xfrm>
-            <a:off x="150387" y="5751559"/>
-            <a:ext cx="2521717" cy="2725200"/>
-            <a:chOff x="276999" y="5878171"/>
-            <a:chExt cx="2521717" cy="2725200"/>
-          </a:xfrm>
-        </p:grpSpPr>
-        <p:pic>
-          <p:nvPicPr>
-            <p:cNvPr id="84" name="Graphic 83">
-              <a:extLst>
-                <a:ext uri="{FF2B5EF4-FFF2-40B4-BE49-F238E27FC236}">
-                  <a16:creationId xmlns:a16="http://schemas.microsoft.com/office/drawing/2014/main" id="{CEA26300-8F95-4941-A0EA-A1850EF08E18}"/>
-                </a:ext>
-              </a:extLst>
-            </p:cNvPr>
-            <p:cNvPicPr>
-              <a:picLocks noChangeAspect="1"/>
-            </p:cNvPicPr>
-            <p:nvPr/>
-          </p:nvPicPr>
-          <p:blipFill rotWithShape="1">
-            <a:blip r:embed="rId2">
-              <a:extLst>
-                <a:ext uri="{28A0092B-C50C-407E-A947-70E740481C1C}">
-                  <a14:useLocalDpi xmlns:a14="http://schemas.microsoft.com/office/drawing/2010/main" val="0"/>
-                </a:ext>
-                <a:ext uri="{96DAC541-7B7A-43D3-8B79-37D633B846F1}">
-                  <asvg:svgBlip xmlns:asvg="http://schemas.microsoft.com/office/drawing/2016/SVG/main" r:embed="rId3"/>
-                </a:ext>
-              </a:extLst>
-            </a:blip>
-            <a:srcRect l="7778" t="20518" r="44028" b="5774"/>
-            <a:stretch/>
-          </p:blipFill>
-          <p:spPr>
-            <a:xfrm>
-              <a:off x="276999" y="5878171"/>
-              <a:ext cx="2521717" cy="2725200"/>
-            </a:xfrm>
-            <a:prstGeom prst="rect">
-              <a:avLst/>
-            </a:prstGeom>
-          </p:spPr>
-        </p:pic>
-        <p:sp>
-          <p:nvSpPr>
-            <p:cNvPr id="85" name="Rectangle 84">
-              <a:extLst>
-                <a:ext uri="{FF2B5EF4-FFF2-40B4-BE49-F238E27FC236}">
-                  <a16:creationId xmlns:a16="http://schemas.microsoft.com/office/drawing/2014/main" id="{14F9647C-A0EA-4842-BCD0-6FA10AAA025E}"/>
-                </a:ext>
-              </a:extLst>
-            </p:cNvPr>
-            <p:cNvSpPr/>
-            <p:nvPr/>
-          </p:nvSpPr>
-          <p:spPr>
-            <a:xfrm>
-              <a:off x="276999" y="5878171"/>
-              <a:ext cx="2520000" cy="2725200"/>
-            </a:xfrm>
-            <a:prstGeom prst="rect">
-              <a:avLst/>
-            </a:prstGeom>
-            <a:noFill/>
-            <a:ln>
-              <a:solidFill>
-                <a:schemeClr val="tx1"/>
-              </a:solidFill>
-            </a:ln>
-          </p:spPr>
-          <p:style>
-            <a:lnRef idx="2">
-              <a:schemeClr val="accent1">
-                <a:shade val="50000"/>
-              </a:schemeClr>
-            </a:lnRef>
-            <a:fillRef idx="1">
-              <a:schemeClr val="accent1"/>
-            </a:fillRef>
-            <a:effectRef idx="0">
-              <a:schemeClr val="accent1"/>
-            </a:effectRef>
-            <a:fontRef idx="minor">
-              <a:schemeClr val="lt1"/>
-            </a:fontRef>
-          </p:style>
-          <p:txBody>
-            <a:bodyPr rtlCol="0" anchor="ctr"/>
-            <a:lstStyle/>
-            <a:p>
-              <a:pPr algn="ctr"/>
-              <a:endParaRPr lang="en-GB" sz="1000"/>
-            </a:p>
-          </p:txBody>
-        </p:sp>
-      </p:grpSp>
-      <p:grpSp>
-        <p:nvGrpSpPr>
-          <p:cNvPr id="86" name="Group 85">
-            <a:extLst>
-              <a:ext uri="{FF2B5EF4-FFF2-40B4-BE49-F238E27FC236}">
-                <a16:creationId xmlns:a16="http://schemas.microsoft.com/office/drawing/2014/main" id="{59286259-A77E-43CC-BB29-5455BA280895}"/>
-              </a:ext>
-            </a:extLst>
-          </p:cNvPr>
-          <p:cNvGrpSpPr/>
-          <p:nvPr/>
-        </p:nvGrpSpPr>
-        <p:grpSpPr>
-          <a:xfrm>
-            <a:off x="150387" y="2949673"/>
-            <a:ext cx="2521717" cy="2725200"/>
-            <a:chOff x="276999" y="3076021"/>
-            <a:chExt cx="2521717" cy="2725200"/>
-          </a:xfrm>
-        </p:grpSpPr>
-        <p:pic>
-          <p:nvPicPr>
-            <p:cNvPr id="87" name="Graphic 86">
-              <a:extLst>
-                <a:ext uri="{FF2B5EF4-FFF2-40B4-BE49-F238E27FC236}">
-                  <a16:creationId xmlns:a16="http://schemas.microsoft.com/office/drawing/2014/main" id="{E95A0E27-99A8-4345-922F-708302E7CB79}"/>
-                </a:ext>
-              </a:extLst>
-            </p:cNvPr>
-            <p:cNvPicPr>
-              <a:picLocks noChangeAspect="1"/>
-            </p:cNvPicPr>
-            <p:nvPr/>
-          </p:nvPicPr>
-          <p:blipFill rotWithShape="1">
-            <a:blip r:embed="rId4">
-              <a:extLst>
-                <a:ext uri="{28A0092B-C50C-407E-A947-70E740481C1C}">
-                  <a14:useLocalDpi xmlns:a14="http://schemas.microsoft.com/office/drawing/2010/main" val="0"/>
-                </a:ext>
-                <a:ext uri="{96DAC541-7B7A-43D3-8B79-37D633B846F1}">
-                  <asvg:svgBlip xmlns:asvg="http://schemas.microsoft.com/office/drawing/2016/SVG/main" r:embed="rId5"/>
-                </a:ext>
-              </a:extLst>
-            </a:blip>
-            <a:srcRect l="7778" t="20518" r="44028" b="5774"/>
-            <a:stretch/>
-          </p:blipFill>
-          <p:spPr>
-            <a:xfrm>
-              <a:off x="276999" y="3076021"/>
-              <a:ext cx="2521717" cy="2725200"/>
-            </a:xfrm>
-            <a:prstGeom prst="rect">
-              <a:avLst/>
-            </a:prstGeom>
-          </p:spPr>
-        </p:pic>
-        <p:sp>
-          <p:nvSpPr>
-            <p:cNvPr id="88" name="Rectangle 87">
-              <a:extLst>
-                <a:ext uri="{FF2B5EF4-FFF2-40B4-BE49-F238E27FC236}">
-                  <a16:creationId xmlns:a16="http://schemas.microsoft.com/office/drawing/2014/main" id="{EE90108B-CCE6-4A54-AADA-92259E8FDD62}"/>
-                </a:ext>
-              </a:extLst>
-            </p:cNvPr>
-            <p:cNvSpPr/>
-            <p:nvPr/>
-          </p:nvSpPr>
-          <p:spPr>
-            <a:xfrm>
-              <a:off x="276999" y="3076021"/>
-              <a:ext cx="2520000" cy="2725200"/>
-            </a:xfrm>
-            <a:prstGeom prst="rect">
-              <a:avLst/>
-            </a:prstGeom>
-            <a:noFill/>
-            <a:ln>
-              <a:solidFill>
-                <a:schemeClr val="tx1"/>
-              </a:solidFill>
-            </a:ln>
-          </p:spPr>
-          <p:style>
-            <a:lnRef idx="2">
-              <a:schemeClr val="accent1">
-                <a:shade val="50000"/>
-              </a:schemeClr>
-            </a:lnRef>
-            <a:fillRef idx="1">
-              <a:schemeClr val="accent1"/>
-            </a:fillRef>
-            <a:effectRef idx="0">
-              <a:schemeClr val="accent1"/>
-            </a:effectRef>
-            <a:fontRef idx="minor">
-              <a:schemeClr val="lt1"/>
-            </a:fontRef>
-          </p:style>
-          <p:txBody>
-            <a:bodyPr rtlCol="0" anchor="ctr"/>
-            <a:lstStyle/>
-            <a:p>
-              <a:pPr algn="ctr"/>
-              <a:endParaRPr lang="en-GB" sz="1000"/>
-            </a:p>
-          </p:txBody>
-        </p:sp>
-      </p:grpSp>
-      <p:grpSp>
-        <p:nvGrpSpPr>
-          <p:cNvPr id="89" name="Group 88">
-            <a:extLst>
-              <a:ext uri="{FF2B5EF4-FFF2-40B4-BE49-F238E27FC236}">
-                <a16:creationId xmlns:a16="http://schemas.microsoft.com/office/drawing/2014/main" id="{3A2D4E9A-0093-4709-A1DA-C580661D622B}"/>
-              </a:ext>
-            </a:extLst>
-          </p:cNvPr>
-          <p:cNvGrpSpPr/>
-          <p:nvPr/>
-        </p:nvGrpSpPr>
-        <p:grpSpPr>
-          <a:xfrm>
-            <a:off x="150387" y="147787"/>
-            <a:ext cx="2521717" cy="2725200"/>
-            <a:chOff x="276999" y="274399"/>
-            <a:chExt cx="2521717" cy="2725200"/>
-          </a:xfrm>
-        </p:grpSpPr>
-        <p:pic>
-          <p:nvPicPr>
-            <p:cNvPr id="90" name="Graphic 89">
-              <a:extLst>
-                <a:ext uri="{FF2B5EF4-FFF2-40B4-BE49-F238E27FC236}">
-                  <a16:creationId xmlns:a16="http://schemas.microsoft.com/office/drawing/2014/main" id="{78368B6D-4D1D-4842-87CA-B66195276F69}"/>
-                </a:ext>
-              </a:extLst>
-            </p:cNvPr>
-            <p:cNvPicPr>
-              <a:picLocks noChangeAspect="1"/>
-            </p:cNvPicPr>
-            <p:nvPr/>
-          </p:nvPicPr>
-          <p:blipFill rotWithShape="1">
-            <a:blip r:embed="rId6">
-              <a:extLst>
-                <a:ext uri="{28A0092B-C50C-407E-A947-70E740481C1C}">
-                  <a14:useLocalDpi xmlns:a14="http://schemas.microsoft.com/office/drawing/2010/main" val="0"/>
-                </a:ext>
-                <a:ext uri="{96DAC541-7B7A-43D3-8B79-37D633B846F1}">
-                  <asvg:svgBlip xmlns:asvg="http://schemas.microsoft.com/office/drawing/2016/SVG/main" r:embed="rId7"/>
-                </a:ext>
-              </a:extLst>
-            </a:blip>
-            <a:srcRect l="7778" t="20518" r="44028" b="5774"/>
-            <a:stretch/>
-          </p:blipFill>
-          <p:spPr>
-            <a:xfrm>
-              <a:off x="276999" y="274399"/>
-              <a:ext cx="2521717" cy="2725200"/>
-            </a:xfrm>
-            <a:prstGeom prst="rect">
-              <a:avLst/>
-            </a:prstGeom>
-          </p:spPr>
-        </p:pic>
-        <p:sp>
-          <p:nvSpPr>
-            <p:cNvPr id="91" name="Rectangle 90">
-              <a:extLst>
-                <a:ext uri="{FF2B5EF4-FFF2-40B4-BE49-F238E27FC236}">
-                  <a16:creationId xmlns:a16="http://schemas.microsoft.com/office/drawing/2014/main" id="{40D7F759-D3D4-4F5D-9BDF-6D46DD2C3ECD}"/>
-                </a:ext>
-              </a:extLst>
-            </p:cNvPr>
-            <p:cNvSpPr/>
-            <p:nvPr/>
-          </p:nvSpPr>
-          <p:spPr>
-            <a:xfrm>
-              <a:off x="276999" y="274399"/>
-              <a:ext cx="2520000" cy="2725200"/>
-            </a:xfrm>
-            <a:prstGeom prst="rect">
-              <a:avLst/>
-            </a:prstGeom>
-            <a:noFill/>
-            <a:ln>
-              <a:solidFill>
-                <a:schemeClr val="tx1"/>
-              </a:solidFill>
-            </a:ln>
-          </p:spPr>
-          <p:style>
-            <a:lnRef idx="2">
-              <a:schemeClr val="accent1">
-                <a:shade val="50000"/>
-              </a:schemeClr>
-            </a:lnRef>
-            <a:fillRef idx="1">
-              <a:schemeClr val="accent1"/>
-            </a:fillRef>
-            <a:effectRef idx="0">
-              <a:schemeClr val="accent1"/>
-            </a:effectRef>
-            <a:fontRef idx="minor">
-              <a:schemeClr val="lt1"/>
-            </a:fontRef>
-          </p:style>
-          <p:txBody>
-            <a:bodyPr rtlCol="0" anchor="ctr"/>
-            <a:lstStyle/>
-            <a:p>
-              <a:pPr algn="ctr"/>
-              <a:endParaRPr lang="en-GB" sz="1000"/>
-            </a:p>
-          </p:txBody>
-        </p:sp>
-      </p:grpSp>
-      <p:sp>
-        <p:nvSpPr>
-          <p:cNvPr id="92" name="TextBox 91">
-            <a:extLst>
-              <a:ext uri="{FF2B5EF4-FFF2-40B4-BE49-F238E27FC236}">
-                <a16:creationId xmlns:a16="http://schemas.microsoft.com/office/drawing/2014/main" id="{37D9B613-D9C0-469C-BBC9-EEFE4A85A77A}"/>
+                <a16:creationId xmlns:a16="http://schemas.microsoft.com/office/drawing/2014/main" id="{CED439DF-2D7E-B3C5-67FF-360353E14808}"/>
               </a:ext>
             </a:extLst>
           </p:cNvPr>
@@ -6378,8 +6871,8 @@
         </p:nvSpPr>
         <p:spPr>
           <a:xfrm>
-            <a:off x="148670" y="-48716"/>
-            <a:ext cx="2520000" cy="246221"/>
+            <a:off x="326767" y="310113"/>
+            <a:ext cx="2168502" cy="215444"/>
           </a:xfrm>
           <a:prstGeom prst="rect">
             <a:avLst/>
@@ -6394,7 +6887,14 @@
           <a:p>
             <a:pPr algn="ctr"/>
             <a:r>
-              <a:rPr lang="en-GB" sz="1000" dirty="0"/>
+              <a:rPr lang="en-GB" sz="800">
+                <a:solidFill>
+                  <a:schemeClr val="tx1">
+                    <a:lumMod val="85000"/>
+                    <a:lumOff val="15000"/>
+                  </a:schemeClr>
+                </a:solidFill>
+              </a:rPr>
               <a:t>2019</a:t>
             </a:r>
           </a:p>
@@ -6402,10 +6902,10 @@
       </p:sp>
       <p:sp>
         <p:nvSpPr>
-          <p:cNvPr id="93" name="TextBox 92">
+          <p:cNvPr id="60" name="TextBox 59">
             <a:extLst>
               <a:ext uri="{FF2B5EF4-FFF2-40B4-BE49-F238E27FC236}">
-                <a16:creationId xmlns:a16="http://schemas.microsoft.com/office/drawing/2014/main" id="{9D06E09E-CD98-438C-A701-22FF937B3ED0}"/>
+                <a16:creationId xmlns:a16="http://schemas.microsoft.com/office/drawing/2014/main" id="{ADB5DB83-0619-8A7D-5971-A4CCAD0A65E5}"/>
               </a:ext>
             </a:extLst>
           </p:cNvPr>
@@ -6414,8 +6914,54 @@
         </p:nvSpPr>
         <p:spPr>
           <a:xfrm rot="16200000">
-            <a:off x="-1307276" y="1378674"/>
-            <a:ext cx="2742404" cy="246221"/>
+            <a:off x="-399330" y="1638466"/>
+            <a:ext cx="903388" cy="215444"/>
+          </a:xfrm>
+          <a:prstGeom prst="rect">
+            <a:avLst/>
+          </a:prstGeom>
+          <a:noFill/>
+          <a:ln>
+            <a:noFill/>
+          </a:ln>
+        </p:spPr>
+        <p:txBody>
+          <a:bodyPr wrap="square" rtlCol="0">
+            <a:spAutoFit/>
+          </a:bodyPr>
+          <a:lstStyle/>
+          <a:p>
+            <a:pPr algn="ctr"/>
+            <a:r>
+              <a:rPr lang="en-GB" sz="800">
+                <a:solidFill>
+                  <a:schemeClr val="tx1">
+                    <a:lumMod val="85000"/>
+                    <a:lumOff val="15000"/>
+                  </a:schemeClr>
+                </a:solidFill>
+              </a:rPr>
+              <a:t>EFFCI &gt;= 1</a:t>
+            </a:r>
+          </a:p>
+        </p:txBody>
+      </p:sp>
+      <p:sp>
+        <p:nvSpPr>
+          <p:cNvPr id="61" name="TextBox 60">
+            <a:extLst>
+              <a:ext uri="{FF2B5EF4-FFF2-40B4-BE49-F238E27FC236}">
+                <a16:creationId xmlns:a16="http://schemas.microsoft.com/office/drawing/2014/main" id="{EC0E2FD2-8D57-68B3-3268-75019ED7E471}"/>
+              </a:ext>
+            </a:extLst>
+          </p:cNvPr>
+          <p:cNvSpPr txBox="1"/>
+          <p:nvPr/>
+        </p:nvSpPr>
+        <p:spPr>
+          <a:xfrm>
+            <a:off x="2495270" y="310113"/>
+            <a:ext cx="2168502" cy="215444"/>
           </a:xfrm>
           <a:prstGeom prst="rect">
             <a:avLst/>
@@ -6430,18 +6976,25 @@
           <a:p>
             <a:pPr algn="ctr"/>
             <a:r>
-              <a:rPr lang="en-GB" sz="1000" dirty="0"/>
-              <a:t>EFFCI &gt;= 1</a:t>
+              <a:rPr lang="en-GB" sz="800">
+                <a:solidFill>
+                  <a:schemeClr val="tx1">
+                    <a:lumMod val="85000"/>
+                    <a:lumOff val="15000"/>
+                  </a:schemeClr>
+                </a:solidFill>
+              </a:rPr>
+              <a:t>2020</a:t>
             </a:r>
           </a:p>
         </p:txBody>
       </p:sp>
       <p:sp>
         <p:nvSpPr>
-          <p:cNvPr id="99" name="TextBox 98">
+          <p:cNvPr id="62" name="TextBox 61">
             <a:extLst>
               <a:ext uri="{FF2B5EF4-FFF2-40B4-BE49-F238E27FC236}">
-                <a16:creationId xmlns:a16="http://schemas.microsoft.com/office/drawing/2014/main" id="{BF248943-4EAD-4B54-8A2E-E71AF1EE239F}"/>
+                <a16:creationId xmlns:a16="http://schemas.microsoft.com/office/drawing/2014/main" id="{AB8CFB82-E9B0-CD22-AB9A-C42F588EAE4A}"/>
               </a:ext>
             </a:extLst>
           </p:cNvPr>
@@ -6450,383 +7003,8 @@
         </p:nvSpPr>
         <p:spPr>
           <a:xfrm>
-            <a:off x="2395032" y="203016"/>
-            <a:ext cx="216000" cy="215444"/>
-          </a:xfrm>
-          <a:prstGeom prst="rect">
-            <a:avLst/>
-          </a:prstGeom>
-          <a:noFill/>
-          <a:ln w="9525">
-            <a:solidFill>
-              <a:schemeClr val="tx1"/>
-            </a:solidFill>
-          </a:ln>
-        </p:spPr>
-        <p:txBody>
-          <a:bodyPr wrap="square" rtlCol="0">
-            <a:spAutoFit/>
-          </a:bodyPr>
-          <a:lstStyle/>
-          <a:p>
-            <a:pPr algn="ctr"/>
-            <a:r>
-              <a:rPr lang="es-ES" sz="800" dirty="0"/>
-              <a:t>a</a:t>
-            </a:r>
-            <a:endParaRPr lang="en-GB" sz="800" dirty="0"/>
-          </a:p>
-        </p:txBody>
-      </p:sp>
-      <p:grpSp>
-        <p:nvGrpSpPr>
-          <p:cNvPr id="100" name="Group 99">
-            <a:extLst>
-              <a:ext uri="{FF2B5EF4-FFF2-40B4-BE49-F238E27FC236}">
-                <a16:creationId xmlns:a16="http://schemas.microsoft.com/office/drawing/2014/main" id="{745601C8-8CDC-4891-B9F0-2D9B3B30AFE5}"/>
-              </a:ext>
-            </a:extLst>
-          </p:cNvPr>
-          <p:cNvGrpSpPr/>
-          <p:nvPr/>
-        </p:nvGrpSpPr>
-        <p:grpSpPr>
-          <a:xfrm>
-            <a:off x="2740111" y="5751559"/>
-            <a:ext cx="2521717" cy="2725200"/>
-            <a:chOff x="2854691" y="5878171"/>
-            <a:chExt cx="2521717" cy="2725200"/>
-          </a:xfrm>
-        </p:grpSpPr>
-        <p:pic>
-          <p:nvPicPr>
-            <p:cNvPr id="101" name="Graphic 100">
-              <a:extLst>
-                <a:ext uri="{FF2B5EF4-FFF2-40B4-BE49-F238E27FC236}">
-                  <a16:creationId xmlns:a16="http://schemas.microsoft.com/office/drawing/2014/main" id="{251B5695-0706-4DEE-AA0F-CD3EE48FECDB}"/>
-                </a:ext>
-              </a:extLst>
-            </p:cNvPr>
-            <p:cNvPicPr>
-              <a:picLocks noChangeAspect="1"/>
-            </p:cNvPicPr>
-            <p:nvPr/>
-          </p:nvPicPr>
-          <p:blipFill rotWithShape="1">
-            <a:blip r:embed="rId8">
-              <a:extLst>
-                <a:ext uri="{28A0092B-C50C-407E-A947-70E740481C1C}">
-                  <a14:useLocalDpi xmlns:a14="http://schemas.microsoft.com/office/drawing/2010/main" val="0"/>
-                </a:ext>
-                <a:ext uri="{96DAC541-7B7A-43D3-8B79-37D633B846F1}">
-                  <asvg:svgBlip xmlns:asvg="http://schemas.microsoft.com/office/drawing/2016/SVG/main" r:embed="rId9"/>
-                </a:ext>
-              </a:extLst>
-            </a:blip>
-            <a:srcRect l="7778" t="20518" r="44028" b="5774"/>
-            <a:stretch/>
-          </p:blipFill>
-          <p:spPr>
-            <a:xfrm>
-              <a:off x="2854691" y="5878171"/>
-              <a:ext cx="2521717" cy="2725200"/>
-            </a:xfrm>
-            <a:prstGeom prst="rect">
-              <a:avLst/>
-            </a:prstGeom>
-          </p:spPr>
-        </p:pic>
-        <p:sp>
-          <p:nvSpPr>
-            <p:cNvPr id="102" name="Rectangle 101">
-              <a:extLst>
-                <a:ext uri="{FF2B5EF4-FFF2-40B4-BE49-F238E27FC236}">
-                  <a16:creationId xmlns:a16="http://schemas.microsoft.com/office/drawing/2014/main" id="{197B5254-4999-4B44-A571-BBF557252F06}"/>
-                </a:ext>
-              </a:extLst>
-            </p:cNvPr>
-            <p:cNvSpPr/>
-            <p:nvPr/>
-          </p:nvSpPr>
-          <p:spPr>
-            <a:xfrm>
-              <a:off x="2854691" y="5878171"/>
-              <a:ext cx="2520000" cy="2725200"/>
-            </a:xfrm>
-            <a:prstGeom prst="rect">
-              <a:avLst/>
-            </a:prstGeom>
-            <a:noFill/>
-            <a:ln>
-              <a:solidFill>
-                <a:schemeClr val="tx1"/>
-              </a:solidFill>
-            </a:ln>
-          </p:spPr>
-          <p:style>
-            <a:lnRef idx="2">
-              <a:schemeClr val="accent1">
-                <a:shade val="50000"/>
-              </a:schemeClr>
-            </a:lnRef>
-            <a:fillRef idx="1">
-              <a:schemeClr val="accent1"/>
-            </a:fillRef>
-            <a:effectRef idx="0">
-              <a:schemeClr val="accent1"/>
-            </a:effectRef>
-            <a:fontRef idx="minor">
-              <a:schemeClr val="lt1"/>
-            </a:fontRef>
-          </p:style>
-          <p:txBody>
-            <a:bodyPr rtlCol="0" anchor="ctr"/>
-            <a:lstStyle/>
-            <a:p>
-              <a:pPr algn="ctr"/>
-              <a:endParaRPr lang="en-GB" sz="1000"/>
-            </a:p>
-          </p:txBody>
-        </p:sp>
-      </p:grpSp>
-      <p:grpSp>
-        <p:nvGrpSpPr>
-          <p:cNvPr id="103" name="Group 102">
-            <a:extLst>
-              <a:ext uri="{FF2B5EF4-FFF2-40B4-BE49-F238E27FC236}">
-                <a16:creationId xmlns:a16="http://schemas.microsoft.com/office/drawing/2014/main" id="{FC3CE34D-0ADE-42E4-BA77-FB893A9D5D23}"/>
-              </a:ext>
-            </a:extLst>
-          </p:cNvPr>
-          <p:cNvGrpSpPr/>
-          <p:nvPr/>
-        </p:nvGrpSpPr>
-        <p:grpSpPr>
-          <a:xfrm>
-            <a:off x="2740111" y="2949673"/>
-            <a:ext cx="2521717" cy="2725200"/>
-            <a:chOff x="2854691" y="3076021"/>
-            <a:chExt cx="2521717" cy="2725200"/>
-          </a:xfrm>
-        </p:grpSpPr>
-        <p:pic>
-          <p:nvPicPr>
-            <p:cNvPr id="104" name="Graphic 103">
-              <a:extLst>
-                <a:ext uri="{FF2B5EF4-FFF2-40B4-BE49-F238E27FC236}">
-                  <a16:creationId xmlns:a16="http://schemas.microsoft.com/office/drawing/2014/main" id="{F02DF2F2-0EA4-4B2D-85D7-ADC469DCAB58}"/>
-                </a:ext>
-              </a:extLst>
-            </p:cNvPr>
-            <p:cNvPicPr>
-              <a:picLocks noChangeAspect="1"/>
-            </p:cNvPicPr>
-            <p:nvPr/>
-          </p:nvPicPr>
-          <p:blipFill rotWithShape="1">
-            <a:blip r:embed="rId10">
-              <a:extLst>
-                <a:ext uri="{28A0092B-C50C-407E-A947-70E740481C1C}">
-                  <a14:useLocalDpi xmlns:a14="http://schemas.microsoft.com/office/drawing/2010/main" val="0"/>
-                </a:ext>
-                <a:ext uri="{96DAC541-7B7A-43D3-8B79-37D633B846F1}">
-                  <asvg:svgBlip xmlns:asvg="http://schemas.microsoft.com/office/drawing/2016/SVG/main" r:embed="rId11"/>
-                </a:ext>
-              </a:extLst>
-            </a:blip>
-            <a:srcRect l="7778" t="20518" r="44028" b="5774"/>
-            <a:stretch/>
-          </p:blipFill>
-          <p:spPr>
-            <a:xfrm>
-              <a:off x="2854691" y="3076021"/>
-              <a:ext cx="2521717" cy="2725200"/>
-            </a:xfrm>
-            <a:prstGeom prst="rect">
-              <a:avLst/>
-            </a:prstGeom>
-          </p:spPr>
-        </p:pic>
-        <p:sp>
-          <p:nvSpPr>
-            <p:cNvPr id="105" name="Rectangle 104">
-              <a:extLst>
-                <a:ext uri="{FF2B5EF4-FFF2-40B4-BE49-F238E27FC236}">
-                  <a16:creationId xmlns:a16="http://schemas.microsoft.com/office/drawing/2014/main" id="{79477594-F58D-492C-AB80-3D16A884286F}"/>
-                </a:ext>
-              </a:extLst>
-            </p:cNvPr>
-            <p:cNvSpPr/>
-            <p:nvPr/>
-          </p:nvSpPr>
-          <p:spPr>
-            <a:xfrm>
-              <a:off x="2854691" y="3076021"/>
-              <a:ext cx="2520000" cy="2725200"/>
-            </a:xfrm>
-            <a:prstGeom prst="rect">
-              <a:avLst/>
-            </a:prstGeom>
-            <a:noFill/>
-            <a:ln>
-              <a:solidFill>
-                <a:schemeClr val="tx1"/>
-              </a:solidFill>
-            </a:ln>
-          </p:spPr>
-          <p:style>
-            <a:lnRef idx="2">
-              <a:schemeClr val="accent1">
-                <a:shade val="50000"/>
-              </a:schemeClr>
-            </a:lnRef>
-            <a:fillRef idx="1">
-              <a:schemeClr val="accent1"/>
-            </a:fillRef>
-            <a:effectRef idx="0">
-              <a:schemeClr val="accent1"/>
-            </a:effectRef>
-            <a:fontRef idx="minor">
-              <a:schemeClr val="lt1"/>
-            </a:fontRef>
-          </p:style>
-          <p:txBody>
-            <a:bodyPr rtlCol="0" anchor="ctr"/>
-            <a:lstStyle/>
-            <a:p>
-              <a:pPr algn="ctr"/>
-              <a:endParaRPr lang="en-GB" sz="1000"/>
-            </a:p>
-          </p:txBody>
-        </p:sp>
-      </p:grpSp>
-      <p:grpSp>
-        <p:nvGrpSpPr>
-          <p:cNvPr id="106" name="Group 105">
-            <a:extLst>
-              <a:ext uri="{FF2B5EF4-FFF2-40B4-BE49-F238E27FC236}">
-                <a16:creationId xmlns:a16="http://schemas.microsoft.com/office/drawing/2014/main" id="{3D979CE6-A489-4A82-88E1-06B4A3FAFC3C}"/>
-              </a:ext>
-            </a:extLst>
-          </p:cNvPr>
-          <p:cNvGrpSpPr/>
-          <p:nvPr/>
-        </p:nvGrpSpPr>
-        <p:grpSpPr>
-          <a:xfrm>
-            <a:off x="2740111" y="147787"/>
-            <a:ext cx="2521717" cy="2725200"/>
-            <a:chOff x="2854691" y="274399"/>
-            <a:chExt cx="2521717" cy="2725200"/>
-          </a:xfrm>
-        </p:grpSpPr>
-        <p:pic>
-          <p:nvPicPr>
-            <p:cNvPr id="107" name="Graphic 106">
-              <a:extLst>
-                <a:ext uri="{FF2B5EF4-FFF2-40B4-BE49-F238E27FC236}">
-                  <a16:creationId xmlns:a16="http://schemas.microsoft.com/office/drawing/2014/main" id="{65FF2E0B-15FE-4DF7-A739-B68E8F4BC61C}"/>
-                </a:ext>
-              </a:extLst>
-            </p:cNvPr>
-            <p:cNvPicPr>
-              <a:picLocks noChangeAspect="1"/>
-            </p:cNvPicPr>
-            <p:nvPr/>
-          </p:nvPicPr>
-          <p:blipFill rotWithShape="1">
-            <a:blip r:embed="rId12">
-              <a:extLst>
-                <a:ext uri="{28A0092B-C50C-407E-A947-70E740481C1C}">
-                  <a14:useLocalDpi xmlns:a14="http://schemas.microsoft.com/office/drawing/2010/main" val="0"/>
-                </a:ext>
-                <a:ext uri="{96DAC541-7B7A-43D3-8B79-37D633B846F1}">
-                  <asvg:svgBlip xmlns:asvg="http://schemas.microsoft.com/office/drawing/2016/SVG/main" r:embed="rId13"/>
-                </a:ext>
-              </a:extLst>
-            </a:blip>
-            <a:srcRect l="7778" t="20516" r="44028" b="5775"/>
-            <a:stretch/>
-          </p:blipFill>
-          <p:spPr>
-            <a:xfrm>
-              <a:off x="2854691" y="274399"/>
-              <a:ext cx="2521717" cy="2725200"/>
-            </a:xfrm>
-            <a:prstGeom prst="rect">
-              <a:avLst/>
-            </a:prstGeom>
-          </p:spPr>
-        </p:pic>
-        <p:sp>
-          <p:nvSpPr>
-            <p:cNvPr id="108" name="Rectangle 107">
-              <a:extLst>
-                <a:ext uri="{FF2B5EF4-FFF2-40B4-BE49-F238E27FC236}">
-                  <a16:creationId xmlns:a16="http://schemas.microsoft.com/office/drawing/2014/main" id="{15EBC8E3-5377-45DA-A7E1-6F20EFEA60F5}"/>
-                </a:ext>
-              </a:extLst>
-            </p:cNvPr>
-            <p:cNvSpPr/>
-            <p:nvPr/>
-          </p:nvSpPr>
-          <p:spPr>
-            <a:xfrm>
-              <a:off x="2854691" y="274399"/>
-              <a:ext cx="2520000" cy="2725200"/>
-            </a:xfrm>
-            <a:prstGeom prst="rect">
-              <a:avLst/>
-            </a:prstGeom>
-            <a:noFill/>
-            <a:ln>
-              <a:solidFill>
-                <a:schemeClr val="tx1"/>
-              </a:solidFill>
-            </a:ln>
-          </p:spPr>
-          <p:style>
-            <a:lnRef idx="2">
-              <a:schemeClr val="accent1">
-                <a:shade val="50000"/>
-              </a:schemeClr>
-            </a:lnRef>
-            <a:fillRef idx="1">
-              <a:schemeClr val="accent1"/>
-            </a:fillRef>
-            <a:effectRef idx="0">
-              <a:schemeClr val="accent1"/>
-            </a:effectRef>
-            <a:fontRef idx="minor">
-              <a:schemeClr val="lt1"/>
-            </a:fontRef>
-          </p:style>
-          <p:txBody>
-            <a:bodyPr rtlCol="0" anchor="ctr"/>
-            <a:lstStyle/>
-            <a:p>
-              <a:pPr algn="ctr"/>
-              <a:endParaRPr lang="en-GB" sz="1000"/>
-            </a:p>
-          </p:txBody>
-        </p:sp>
-      </p:grpSp>
-      <p:sp>
-        <p:nvSpPr>
-          <p:cNvPr id="109" name="TextBox 108">
-            <a:extLst>
-              <a:ext uri="{FF2B5EF4-FFF2-40B4-BE49-F238E27FC236}">
-                <a16:creationId xmlns:a16="http://schemas.microsoft.com/office/drawing/2014/main" id="{55779BBD-849C-4FD7-A1FC-BD93F101E1AB}"/>
-              </a:ext>
-            </a:extLst>
-          </p:cNvPr>
-          <p:cNvSpPr txBox="1"/>
-          <p:nvPr/>
-        </p:nvSpPr>
-        <p:spPr>
-          <a:xfrm>
-            <a:off x="2736677" y="-48716"/>
-            <a:ext cx="2520000" cy="246221"/>
+            <a:off x="1419407" y="128313"/>
+            <a:ext cx="699540" cy="215443"/>
           </a:xfrm>
           <a:prstGeom prst="rect">
             <a:avLst/>
@@ -6839,20 +7017,218 @@
           </a:bodyPr>
           <a:lstStyle/>
           <a:p>
-            <a:pPr algn="ctr"/>
             <a:r>
-              <a:rPr lang="en-GB" sz="1000" dirty="0"/>
-              <a:t>2020</a:t>
+              <a:rPr lang="en-GB" sz="800">
+                <a:solidFill>
+                  <a:schemeClr val="tx1">
+                    <a:lumMod val="85000"/>
+                    <a:lumOff val="15000"/>
+                  </a:schemeClr>
+                </a:solidFill>
+              </a:rPr>
+              <a:t>“La Costa”</a:t>
             </a:r>
           </a:p>
         </p:txBody>
       </p:sp>
       <p:sp>
         <p:nvSpPr>
-          <p:cNvPr id="110" name="TextBox 109">
+          <p:cNvPr id="63" name="Oval 62">
             <a:extLst>
               <a:ext uri="{FF2B5EF4-FFF2-40B4-BE49-F238E27FC236}">
-                <a16:creationId xmlns:a16="http://schemas.microsoft.com/office/drawing/2014/main" id="{AFD52EBA-12FB-4422-9823-FE0863D8E1F6}"/>
+                <a16:creationId xmlns:a16="http://schemas.microsoft.com/office/drawing/2014/main" id="{1E62147A-98D3-6078-0E2E-3664BE5A0902}"/>
+              </a:ext>
+            </a:extLst>
+          </p:cNvPr>
+          <p:cNvSpPr/>
+          <p:nvPr/>
+        </p:nvSpPr>
+        <p:spPr>
+          <a:xfrm>
+            <a:off x="1415578" y="200035"/>
+            <a:ext cx="72000" cy="72000"/>
+          </a:xfrm>
+          <a:prstGeom prst="ellipse">
+            <a:avLst/>
+          </a:prstGeom>
+          <a:solidFill>
+            <a:srgbClr val="FEE900"/>
+          </a:solidFill>
+          <a:ln w="3175">
+            <a:solidFill>
+              <a:schemeClr val="tx1">
+                <a:lumMod val="65000"/>
+                <a:lumOff val="35000"/>
+              </a:schemeClr>
+            </a:solidFill>
+          </a:ln>
+        </p:spPr>
+        <p:style>
+          <a:lnRef idx="2">
+            <a:schemeClr val="accent1">
+              <a:shade val="50000"/>
+            </a:schemeClr>
+          </a:lnRef>
+          <a:fillRef idx="1">
+            <a:schemeClr val="accent1"/>
+          </a:fillRef>
+          <a:effectRef idx="0">
+            <a:schemeClr val="accent1"/>
+          </a:effectRef>
+          <a:fontRef idx="minor">
+            <a:schemeClr val="lt1"/>
+          </a:fontRef>
+        </p:style>
+        <p:txBody>
+          <a:bodyPr rtlCol="0" anchor="ctr"/>
+          <a:lstStyle/>
+          <a:p>
+            <a:pPr algn="ctr"/>
+            <a:endParaRPr lang="en-GB" sz="800">
+              <a:solidFill>
+                <a:schemeClr val="tx1">
+                  <a:lumMod val="85000"/>
+                  <a:lumOff val="15000"/>
+                </a:schemeClr>
+              </a:solidFill>
+            </a:endParaRPr>
+          </a:p>
+        </p:txBody>
+      </p:sp>
+      <p:sp>
+        <p:nvSpPr>
+          <p:cNvPr id="64" name="Oval 63">
+            <a:extLst>
+              <a:ext uri="{FF2B5EF4-FFF2-40B4-BE49-F238E27FC236}">
+                <a16:creationId xmlns:a16="http://schemas.microsoft.com/office/drawing/2014/main" id="{F063DA2A-4C9F-78C4-A56C-1202D061135B}"/>
+              </a:ext>
+            </a:extLst>
+          </p:cNvPr>
+          <p:cNvSpPr/>
+          <p:nvPr/>
+        </p:nvSpPr>
+        <p:spPr>
+          <a:xfrm>
+            <a:off x="2170443" y="200035"/>
+            <a:ext cx="72000" cy="72000"/>
+          </a:xfrm>
+          <a:prstGeom prst="ellipse">
+            <a:avLst/>
+          </a:prstGeom>
+          <a:solidFill>
+            <a:srgbClr val="C0996B"/>
+          </a:solidFill>
+          <a:ln w="3175">
+            <a:solidFill>
+              <a:schemeClr val="tx1">
+                <a:lumMod val="65000"/>
+                <a:lumOff val="35000"/>
+              </a:schemeClr>
+            </a:solidFill>
+          </a:ln>
+        </p:spPr>
+        <p:style>
+          <a:lnRef idx="2">
+            <a:schemeClr val="accent1">
+              <a:shade val="50000"/>
+            </a:schemeClr>
+          </a:lnRef>
+          <a:fillRef idx="1">
+            <a:schemeClr val="accent1"/>
+          </a:fillRef>
+          <a:effectRef idx="0">
+            <a:schemeClr val="accent1"/>
+          </a:effectRef>
+          <a:fontRef idx="minor">
+            <a:schemeClr val="lt1"/>
+          </a:fontRef>
+        </p:style>
+        <p:txBody>
+          <a:bodyPr rtlCol="0" anchor="ctr"/>
+          <a:lstStyle/>
+          <a:p>
+            <a:pPr algn="ctr"/>
+            <a:endParaRPr lang="en-GB" sz="800">
+              <a:solidFill>
+                <a:schemeClr val="tx1">
+                  <a:lumMod val="85000"/>
+                  <a:lumOff val="15000"/>
+                </a:schemeClr>
+              </a:solidFill>
+            </a:endParaRPr>
+          </a:p>
+        </p:txBody>
+      </p:sp>
+      <p:sp>
+        <p:nvSpPr>
+          <p:cNvPr id="65" name="Oval 64">
+            <a:extLst>
+              <a:ext uri="{FF2B5EF4-FFF2-40B4-BE49-F238E27FC236}">
+                <a16:creationId xmlns:a16="http://schemas.microsoft.com/office/drawing/2014/main" id="{7C230A14-CA86-A885-4714-2D622CBE1B51}"/>
+              </a:ext>
+            </a:extLst>
+          </p:cNvPr>
+          <p:cNvSpPr/>
+          <p:nvPr/>
+        </p:nvSpPr>
+        <p:spPr>
+          <a:xfrm>
+            <a:off x="2922539" y="200035"/>
+            <a:ext cx="72000" cy="72000"/>
+          </a:xfrm>
+          <a:prstGeom prst="ellipse">
+            <a:avLst/>
+          </a:prstGeom>
+          <a:solidFill>
+            <a:srgbClr val="A9FE00"/>
+          </a:solidFill>
+          <a:ln w="3175">
+            <a:solidFill>
+              <a:schemeClr val="tx1">
+                <a:lumMod val="65000"/>
+                <a:lumOff val="35000"/>
+              </a:schemeClr>
+            </a:solidFill>
+          </a:ln>
+        </p:spPr>
+        <p:style>
+          <a:lnRef idx="2">
+            <a:schemeClr val="accent1">
+              <a:shade val="50000"/>
+            </a:schemeClr>
+          </a:lnRef>
+          <a:fillRef idx="1">
+            <a:schemeClr val="accent1"/>
+          </a:fillRef>
+          <a:effectRef idx="0">
+            <a:schemeClr val="accent1"/>
+          </a:effectRef>
+          <a:fontRef idx="minor">
+            <a:schemeClr val="lt1"/>
+          </a:fontRef>
+        </p:style>
+        <p:txBody>
+          <a:bodyPr rtlCol="0" anchor="ctr"/>
+          <a:lstStyle/>
+          <a:p>
+            <a:pPr algn="ctr"/>
+            <a:endParaRPr lang="en-GB" sz="800">
+              <a:solidFill>
+                <a:schemeClr val="tx1">
+                  <a:lumMod val="85000"/>
+                  <a:lumOff val="15000"/>
+                </a:schemeClr>
+              </a:solidFill>
+            </a:endParaRPr>
+          </a:p>
+        </p:txBody>
+      </p:sp>
+      <p:sp>
+        <p:nvSpPr>
+          <p:cNvPr id="66" name="TextBox 65">
+            <a:extLst>
+              <a:ext uri="{FF2B5EF4-FFF2-40B4-BE49-F238E27FC236}">
+                <a16:creationId xmlns:a16="http://schemas.microsoft.com/office/drawing/2014/main" id="{E37A1976-8171-5789-3387-0D6F842E4D4C}"/>
               </a:ext>
             </a:extLst>
           </p:cNvPr>
@@ -6860,9 +7236,9 @@
           <p:nvPr/>
         </p:nvSpPr>
         <p:spPr>
-          <a:xfrm rot="16200000">
-            <a:off x="-1307276" y="4191661"/>
-            <a:ext cx="2742404" cy="246221"/>
+          <a:xfrm>
+            <a:off x="326767" y="-45517"/>
+            <a:ext cx="4337005" cy="246221"/>
           </a:xfrm>
           <a:prstGeom prst="rect">
             <a:avLst/>
@@ -6877,18 +7253,25 @@
           <a:p>
             <a:pPr algn="ctr"/>
             <a:r>
-              <a:rPr lang="en-GB" sz="1000" dirty="0"/>
-              <a:t>EFFCI &gt;= 6</a:t>
+              <a:rPr lang="en-GB" sz="1000" b="1">
+                <a:solidFill>
+                  <a:schemeClr val="tx1">
+                    <a:lumMod val="85000"/>
+                    <a:lumOff val="15000"/>
+                  </a:schemeClr>
+                </a:solidFill>
+              </a:rPr>
+              <a:t>Point flood reports for</a:t>
             </a:r>
           </a:p>
         </p:txBody>
       </p:sp>
       <p:sp>
         <p:nvSpPr>
-          <p:cNvPr id="111" name="TextBox 110">
+          <p:cNvPr id="67" name="TextBox 66">
             <a:extLst>
               <a:ext uri="{FF2B5EF4-FFF2-40B4-BE49-F238E27FC236}">
-                <a16:creationId xmlns:a16="http://schemas.microsoft.com/office/drawing/2014/main" id="{71DC6237-B2A6-490B-BA6E-0C6F816A8A81}"/>
+                <a16:creationId xmlns:a16="http://schemas.microsoft.com/office/drawing/2014/main" id="{DCA67142-A09A-5247-AC6F-13E80FADC4C9}"/>
               </a:ext>
             </a:extLst>
           </p:cNvPr>
@@ -6897,50 +7280,8 @@
         </p:nvSpPr>
         <p:spPr>
           <a:xfrm>
-            <a:off x="2395032" y="3010747"/>
-            <a:ext cx="216000" cy="215444"/>
-          </a:xfrm>
-          <a:prstGeom prst="rect">
-            <a:avLst/>
-          </a:prstGeom>
-          <a:noFill/>
-          <a:ln w="9525">
-            <a:solidFill>
-              <a:schemeClr val="tx1"/>
-            </a:solidFill>
-          </a:ln>
-        </p:spPr>
-        <p:txBody>
-          <a:bodyPr wrap="square" rtlCol="0">
-            <a:spAutoFit/>
-          </a:bodyPr>
-          <a:lstStyle/>
-          <a:p>
-            <a:pPr algn="ctr"/>
-            <a:r>
-              <a:rPr lang="es-ES" sz="800" dirty="0"/>
-              <a:t>b</a:t>
-            </a:r>
-            <a:endParaRPr lang="en-GB" sz="800" dirty="0"/>
-          </a:p>
-        </p:txBody>
-      </p:sp>
-      <p:sp>
-        <p:nvSpPr>
-          <p:cNvPr id="112" name="TextBox 111">
-            <a:extLst>
-              <a:ext uri="{FF2B5EF4-FFF2-40B4-BE49-F238E27FC236}">
-                <a16:creationId xmlns:a16="http://schemas.microsoft.com/office/drawing/2014/main" id="{928A9739-1930-41B0-BF0D-B0840A6BC98B}"/>
-              </a:ext>
-            </a:extLst>
-          </p:cNvPr>
-          <p:cNvSpPr txBox="1"/>
-          <p:nvPr/>
-        </p:nvSpPr>
-        <p:spPr>
-          <a:xfrm rot="16200000">
-            <a:off x="-1307276" y="6981741"/>
-            <a:ext cx="2742404" cy="246221"/>
+            <a:off x="2180783" y="128313"/>
+            <a:ext cx="699539" cy="215444"/>
           </a:xfrm>
           <a:prstGeom prst="rect">
             <a:avLst/>
@@ -6953,20 +7294,26 @@
           </a:bodyPr>
           <a:lstStyle/>
           <a:p>
-            <a:pPr algn="ctr"/>
             <a:r>
-              <a:rPr lang="en-GB" sz="1000" dirty="0"/>
-              <a:t>EFFCI &gt;= 10</a:t>
+              <a:rPr lang="en-GB" sz="800">
+                <a:solidFill>
+                  <a:schemeClr val="tx1">
+                    <a:lumMod val="85000"/>
+                    <a:lumOff val="15000"/>
+                  </a:schemeClr>
+                </a:solidFill>
+              </a:rPr>
+              <a:t>“La Sierra”</a:t>
             </a:r>
           </a:p>
         </p:txBody>
       </p:sp>
       <p:sp>
         <p:nvSpPr>
-          <p:cNvPr id="113" name="TextBox 112">
+          <p:cNvPr id="68" name="TextBox 67">
             <a:extLst>
               <a:ext uri="{FF2B5EF4-FFF2-40B4-BE49-F238E27FC236}">
-                <a16:creationId xmlns:a16="http://schemas.microsoft.com/office/drawing/2014/main" id="{948A4E9F-0DCD-44B0-A049-D468D58D7A00}"/>
+                <a16:creationId xmlns:a16="http://schemas.microsoft.com/office/drawing/2014/main" id="{0D9022CD-908A-6AF7-B87C-4E5D77B34010}"/>
               </a:ext>
             </a:extLst>
           </p:cNvPr>
@@ -6975,7 +7322,351 @@
         </p:nvSpPr>
         <p:spPr>
           <a:xfrm>
-            <a:off x="2395032" y="5815695"/>
+            <a:off x="2942158" y="128313"/>
+            <a:ext cx="699539" cy="215444"/>
+          </a:xfrm>
+          <a:prstGeom prst="rect">
+            <a:avLst/>
+          </a:prstGeom>
+          <a:noFill/>
+        </p:spPr>
+        <p:txBody>
+          <a:bodyPr wrap="square" rtlCol="0">
+            <a:spAutoFit/>
+          </a:bodyPr>
+          <a:lstStyle/>
+          <a:p>
+            <a:r>
+              <a:rPr lang="en-GB" sz="800">
+                <a:solidFill>
+                  <a:schemeClr val="tx1">
+                    <a:lumMod val="85000"/>
+                    <a:lumOff val="15000"/>
+                  </a:schemeClr>
+                </a:solidFill>
+              </a:rPr>
+              <a:t>“El Oriente”</a:t>
+            </a:r>
+          </a:p>
+        </p:txBody>
+      </p:sp>
+      <p:pic>
+        <p:nvPicPr>
+          <p:cNvPr id="69" name="Picture 68" descr="A map of different colors&#10;&#10;Description automatically generated">
+            <a:extLst>
+              <a:ext uri="{FF2B5EF4-FFF2-40B4-BE49-F238E27FC236}">
+                <a16:creationId xmlns:a16="http://schemas.microsoft.com/office/drawing/2014/main" id="{D58FADA8-8086-D85B-8D3B-9DBB5B12A0F7}"/>
+              </a:ext>
+            </a:extLst>
+          </p:cNvPr>
+          <p:cNvPicPr>
+            <a:picLocks noChangeAspect="1"/>
+          </p:cNvPicPr>
+          <p:nvPr/>
+        </p:nvPicPr>
+        <p:blipFill rotWithShape="1">
+          <a:blip r:embed="rId2">
+            <a:extLst>
+              <a:ext uri="{28A0092B-C50C-407E-A947-70E740481C1C}">
+                <a14:useLocalDpi xmlns:a14="http://schemas.microsoft.com/office/drawing/2010/main" val="0"/>
+              </a:ext>
+            </a:extLst>
+          </a:blip>
+          <a:srcRect l="3950" t="16322" r="42672" b="4367"/>
+          <a:stretch/>
+        </p:blipFill>
+        <p:spPr>
+          <a:xfrm>
+            <a:off x="164818" y="521293"/>
+            <a:ext cx="2330451" cy="2449790"/>
+          </a:xfrm>
+          <a:prstGeom prst="rect">
+            <a:avLst/>
+          </a:prstGeom>
+        </p:spPr>
+      </p:pic>
+      <p:pic>
+        <p:nvPicPr>
+          <p:cNvPr id="70" name="Picture 69" descr="A map of different colors&#10;&#10;Description automatically generated">
+            <a:extLst>
+              <a:ext uri="{FF2B5EF4-FFF2-40B4-BE49-F238E27FC236}">
+                <a16:creationId xmlns:a16="http://schemas.microsoft.com/office/drawing/2014/main" id="{E8C5188A-A656-1EBC-3C7E-7620EB300559}"/>
+              </a:ext>
+            </a:extLst>
+          </p:cNvPr>
+          <p:cNvPicPr>
+            <a:picLocks noChangeAspect="1"/>
+          </p:cNvPicPr>
+          <p:nvPr/>
+        </p:nvPicPr>
+        <p:blipFill rotWithShape="1">
+          <a:blip r:embed="rId3">
+            <a:extLst>
+              <a:ext uri="{28A0092B-C50C-407E-A947-70E740481C1C}">
+                <a14:useLocalDpi xmlns:a14="http://schemas.microsoft.com/office/drawing/2010/main" val="0"/>
+              </a:ext>
+            </a:extLst>
+          </a:blip>
+          <a:srcRect l="3950" t="19493" r="42672" b="4494"/>
+          <a:stretch/>
+        </p:blipFill>
+        <p:spPr>
+          <a:xfrm>
+            <a:off x="164818" y="2979115"/>
+            <a:ext cx="2330451" cy="2347927"/>
+          </a:xfrm>
+          <a:prstGeom prst="rect">
+            <a:avLst/>
+          </a:prstGeom>
+        </p:spPr>
+      </p:pic>
+      <p:pic>
+        <p:nvPicPr>
+          <p:cNvPr id="71" name="Picture 70" descr="A map of different colors&#10;&#10;Description automatically generated">
+            <a:extLst>
+              <a:ext uri="{FF2B5EF4-FFF2-40B4-BE49-F238E27FC236}">
+                <a16:creationId xmlns:a16="http://schemas.microsoft.com/office/drawing/2014/main" id="{F97695B2-B48E-D79D-C7D1-EDE06ED8AF6A}"/>
+              </a:ext>
+            </a:extLst>
+          </p:cNvPr>
+          <p:cNvPicPr>
+            <a:picLocks noChangeAspect="1"/>
+          </p:cNvPicPr>
+          <p:nvPr/>
+        </p:nvPicPr>
+        <p:blipFill rotWithShape="1">
+          <a:blip r:embed="rId4">
+            <a:extLst>
+              <a:ext uri="{28A0092B-C50C-407E-A947-70E740481C1C}">
+                <a14:useLocalDpi xmlns:a14="http://schemas.microsoft.com/office/drawing/2010/main" val="0"/>
+              </a:ext>
+            </a:extLst>
+          </a:blip>
+          <a:srcRect l="3950" t="19361" r="42672" b="2094"/>
+          <a:stretch/>
+        </p:blipFill>
+        <p:spPr>
+          <a:xfrm>
+            <a:off x="164818" y="5335074"/>
+            <a:ext cx="2330452" cy="2426123"/>
+          </a:xfrm>
+          <a:prstGeom prst="rect">
+            <a:avLst/>
+          </a:prstGeom>
+        </p:spPr>
+      </p:pic>
+      <p:pic>
+        <p:nvPicPr>
+          <p:cNvPr id="72" name="Picture 71" descr="A map of different colors&#10;&#10;Description automatically generated">
+            <a:extLst>
+              <a:ext uri="{FF2B5EF4-FFF2-40B4-BE49-F238E27FC236}">
+                <a16:creationId xmlns:a16="http://schemas.microsoft.com/office/drawing/2014/main" id="{1F470B5D-39FE-D633-D522-3916A61C7D8E}"/>
+              </a:ext>
+            </a:extLst>
+          </p:cNvPr>
+          <p:cNvPicPr>
+            <a:picLocks noChangeAspect="1"/>
+          </p:cNvPicPr>
+          <p:nvPr/>
+        </p:nvPicPr>
+        <p:blipFill rotWithShape="1">
+          <a:blip r:embed="rId5">
+            <a:extLst>
+              <a:ext uri="{28A0092B-C50C-407E-A947-70E740481C1C}">
+                <a14:useLocalDpi xmlns:a14="http://schemas.microsoft.com/office/drawing/2010/main" val="0"/>
+              </a:ext>
+            </a:extLst>
+          </a:blip>
+          <a:srcRect l="7172" t="16322" r="39449" b="4367"/>
+          <a:stretch/>
+        </p:blipFill>
+        <p:spPr>
+          <a:xfrm>
+            <a:off x="2497454" y="521293"/>
+            <a:ext cx="2330451" cy="2449790"/>
+          </a:xfrm>
+          <a:prstGeom prst="rect">
+            <a:avLst/>
+          </a:prstGeom>
+        </p:spPr>
+      </p:pic>
+      <p:pic>
+        <p:nvPicPr>
+          <p:cNvPr id="73" name="Picture 72" descr="A map of the south america&#10;&#10;Description automatically generated">
+            <a:extLst>
+              <a:ext uri="{FF2B5EF4-FFF2-40B4-BE49-F238E27FC236}">
+                <a16:creationId xmlns:a16="http://schemas.microsoft.com/office/drawing/2014/main" id="{E1E26006-90D7-FECE-0D31-C91BBD50C7FD}"/>
+              </a:ext>
+            </a:extLst>
+          </p:cNvPr>
+          <p:cNvPicPr>
+            <a:picLocks noChangeAspect="1"/>
+          </p:cNvPicPr>
+          <p:nvPr/>
+        </p:nvPicPr>
+        <p:blipFill rotWithShape="1">
+          <a:blip r:embed="rId6">
+            <a:extLst>
+              <a:ext uri="{28A0092B-C50C-407E-A947-70E740481C1C}">
+                <a14:useLocalDpi xmlns:a14="http://schemas.microsoft.com/office/drawing/2010/main" val="0"/>
+              </a:ext>
+            </a:extLst>
+          </a:blip>
+          <a:srcRect l="7172" t="19493" r="39449" b="4494"/>
+          <a:stretch/>
+        </p:blipFill>
+        <p:spPr>
+          <a:xfrm>
+            <a:off x="2497454" y="2979115"/>
+            <a:ext cx="2330452" cy="2347929"/>
+          </a:xfrm>
+          <a:prstGeom prst="rect">
+            <a:avLst/>
+          </a:prstGeom>
+        </p:spPr>
+      </p:pic>
+      <p:pic>
+        <p:nvPicPr>
+          <p:cNvPr id="74" name="Picture 73" descr="A map of different colors&#10;&#10;Description automatically generated">
+            <a:extLst>
+              <a:ext uri="{FF2B5EF4-FFF2-40B4-BE49-F238E27FC236}">
+                <a16:creationId xmlns:a16="http://schemas.microsoft.com/office/drawing/2014/main" id="{53930D14-6A6C-5B5D-6265-A5E0AD6428F1}"/>
+              </a:ext>
+            </a:extLst>
+          </p:cNvPr>
+          <p:cNvPicPr>
+            <a:picLocks noChangeAspect="1"/>
+          </p:cNvPicPr>
+          <p:nvPr/>
+        </p:nvPicPr>
+        <p:blipFill rotWithShape="1">
+          <a:blip r:embed="rId7">
+            <a:extLst>
+              <a:ext uri="{28A0092B-C50C-407E-A947-70E740481C1C}">
+                <a14:useLocalDpi xmlns:a14="http://schemas.microsoft.com/office/drawing/2010/main" val="0"/>
+              </a:ext>
+            </a:extLst>
+          </a:blip>
+          <a:srcRect l="7172" t="19361" r="39449" b="2094"/>
+          <a:stretch/>
+        </p:blipFill>
+        <p:spPr>
+          <a:xfrm>
+            <a:off x="2497454" y="5335076"/>
+            <a:ext cx="2330452" cy="2426122"/>
+          </a:xfrm>
+          <a:prstGeom prst="rect">
+            <a:avLst/>
+          </a:prstGeom>
+        </p:spPr>
+      </p:pic>
+      <p:sp>
+        <p:nvSpPr>
+          <p:cNvPr id="75" name="TextBox 74">
+            <a:extLst>
+              <a:ext uri="{FF2B5EF4-FFF2-40B4-BE49-F238E27FC236}">
+                <a16:creationId xmlns:a16="http://schemas.microsoft.com/office/drawing/2014/main" id="{78E9F1CB-8298-B91F-438E-D510F52FEA28}"/>
+              </a:ext>
+            </a:extLst>
+          </p:cNvPr>
+          <p:cNvSpPr txBox="1"/>
+          <p:nvPr/>
+        </p:nvSpPr>
+        <p:spPr>
+          <a:xfrm rot="16200000">
+            <a:off x="-332504" y="4045356"/>
+            <a:ext cx="769734" cy="215444"/>
+          </a:xfrm>
+          <a:prstGeom prst="rect">
+            <a:avLst/>
+          </a:prstGeom>
+          <a:noFill/>
+          <a:ln>
+            <a:noFill/>
+          </a:ln>
+        </p:spPr>
+        <p:txBody>
+          <a:bodyPr wrap="square" rtlCol="0">
+            <a:spAutoFit/>
+          </a:bodyPr>
+          <a:lstStyle/>
+          <a:p>
+            <a:pPr algn="ctr"/>
+            <a:r>
+              <a:rPr lang="en-GB" sz="800">
+                <a:solidFill>
+                  <a:schemeClr val="tx1">
+                    <a:lumMod val="85000"/>
+                    <a:lumOff val="15000"/>
+                  </a:schemeClr>
+                </a:solidFill>
+              </a:rPr>
+              <a:t>EFFCI &gt;= 6</a:t>
+            </a:r>
+          </a:p>
+        </p:txBody>
+      </p:sp>
+      <p:sp>
+        <p:nvSpPr>
+          <p:cNvPr id="76" name="TextBox 75">
+            <a:extLst>
+              <a:ext uri="{FF2B5EF4-FFF2-40B4-BE49-F238E27FC236}">
+                <a16:creationId xmlns:a16="http://schemas.microsoft.com/office/drawing/2014/main" id="{716361D2-FEFE-6BF7-DD82-D2938962FB00}"/>
+              </a:ext>
+            </a:extLst>
+          </p:cNvPr>
+          <p:cNvSpPr txBox="1"/>
+          <p:nvPr/>
+        </p:nvSpPr>
+        <p:spPr>
+          <a:xfrm rot="16200000">
+            <a:off x="-399332" y="6440413"/>
+            <a:ext cx="903389" cy="215444"/>
+          </a:xfrm>
+          <a:prstGeom prst="rect">
+            <a:avLst/>
+          </a:prstGeom>
+          <a:noFill/>
+          <a:ln>
+            <a:noFill/>
+          </a:ln>
+        </p:spPr>
+        <p:txBody>
+          <a:bodyPr wrap="square" rtlCol="0">
+            <a:spAutoFit/>
+          </a:bodyPr>
+          <a:lstStyle/>
+          <a:p>
+            <a:pPr algn="ctr"/>
+            <a:r>
+              <a:rPr lang="en-GB" sz="800">
+                <a:solidFill>
+                  <a:schemeClr val="tx1">
+                    <a:lumMod val="85000"/>
+                    <a:lumOff val="15000"/>
+                  </a:schemeClr>
+                </a:solidFill>
+              </a:rPr>
+              <a:t>EFFCI &gt;= 10</a:t>
+            </a:r>
+          </a:p>
+        </p:txBody>
+      </p:sp>
+      <p:sp>
+        <p:nvSpPr>
+          <p:cNvPr id="77" name="TextBox 76">
+            <a:extLst>
+              <a:ext uri="{FF2B5EF4-FFF2-40B4-BE49-F238E27FC236}">
+                <a16:creationId xmlns:a16="http://schemas.microsoft.com/office/drawing/2014/main" id="{EFB5CF1A-5073-DC8B-3FE0-977FA870996B}"/>
+              </a:ext>
+            </a:extLst>
+          </p:cNvPr>
+          <p:cNvSpPr txBox="1"/>
+          <p:nvPr/>
+        </p:nvSpPr>
+        <p:spPr>
+          <a:xfrm>
+            <a:off x="2131343" y="2604564"/>
             <a:ext cx="216000" cy="215444"/>
           </a:xfrm>
           <a:prstGeom prst="rect">
@@ -6984,7 +7675,10 @@
           <a:noFill/>
           <a:ln w="9525">
             <a:solidFill>
-              <a:schemeClr val="tx1"/>
+              <a:schemeClr val="tx1">
+                <a:lumMod val="65000"/>
+                <a:lumOff val="35000"/>
+              </a:schemeClr>
             </a:solidFill>
           </a:ln>
         </p:spPr>
@@ -6996,19 +7690,33 @@
           <a:p>
             <a:pPr algn="ctr"/>
             <a:r>
-              <a:rPr lang="es-ES" sz="800" dirty="0"/>
-              <a:t>c</a:t>
+              <a:rPr lang="es-ES" sz="800">
+                <a:solidFill>
+                  <a:schemeClr val="tx1">
+                    <a:lumMod val="85000"/>
+                    <a:lumOff val="15000"/>
+                  </a:schemeClr>
+                </a:solidFill>
+              </a:rPr>
+              <a:t>a</a:t>
             </a:r>
-            <a:endParaRPr lang="en-GB" sz="800" dirty="0"/>
+            <a:endParaRPr lang="en-GB" sz="800">
+              <a:solidFill>
+                <a:schemeClr val="tx1">
+                  <a:lumMod val="85000"/>
+                  <a:lumOff val="15000"/>
+                </a:schemeClr>
+              </a:solidFill>
+            </a:endParaRPr>
           </a:p>
         </p:txBody>
       </p:sp>
       <p:sp>
         <p:nvSpPr>
-          <p:cNvPr id="114" name="TextBox 113">
+          <p:cNvPr id="78" name="TextBox 77">
             <a:extLst>
               <a:ext uri="{FF2B5EF4-FFF2-40B4-BE49-F238E27FC236}">
-                <a16:creationId xmlns:a16="http://schemas.microsoft.com/office/drawing/2014/main" id="{898FE3E2-3D30-4BF0-B727-F5A6861060D1}"/>
+                <a16:creationId xmlns:a16="http://schemas.microsoft.com/office/drawing/2014/main" id="{A641455B-8A00-B3BE-B0D9-B4A7D7E6EA80}"/>
               </a:ext>
             </a:extLst>
           </p:cNvPr>
@@ -7017,7 +7725,7 @@
         </p:nvSpPr>
         <p:spPr>
           <a:xfrm>
-            <a:off x="4990263" y="203016"/>
+            <a:off x="2131343" y="4980995"/>
             <a:ext cx="216000" cy="215444"/>
           </a:xfrm>
           <a:prstGeom prst="rect">
@@ -7026,7 +7734,10 @@
           <a:noFill/>
           <a:ln w="9525">
             <a:solidFill>
-              <a:schemeClr val="tx1"/>
+              <a:schemeClr val="tx1">
+                <a:lumMod val="65000"/>
+                <a:lumOff val="35000"/>
+              </a:schemeClr>
             </a:solidFill>
           </a:ln>
         </p:spPr>
@@ -7038,19 +7749,33 @@
           <a:p>
             <a:pPr algn="ctr"/>
             <a:r>
-              <a:rPr lang="es-ES" sz="800" dirty="0"/>
-              <a:t>d</a:t>
+              <a:rPr lang="es-ES" sz="800">
+                <a:solidFill>
+                  <a:schemeClr val="tx1">
+                    <a:lumMod val="85000"/>
+                    <a:lumOff val="15000"/>
+                  </a:schemeClr>
+                </a:solidFill>
+              </a:rPr>
+              <a:t>b</a:t>
             </a:r>
-            <a:endParaRPr lang="en-GB" sz="800" dirty="0"/>
+            <a:endParaRPr lang="en-GB" sz="800">
+              <a:solidFill>
+                <a:schemeClr val="tx1">
+                  <a:lumMod val="85000"/>
+                  <a:lumOff val="15000"/>
+                </a:schemeClr>
+              </a:solidFill>
+            </a:endParaRPr>
           </a:p>
         </p:txBody>
       </p:sp>
       <p:sp>
         <p:nvSpPr>
-          <p:cNvPr id="115" name="TextBox 114">
+          <p:cNvPr id="79" name="TextBox 78">
             <a:extLst>
               <a:ext uri="{FF2B5EF4-FFF2-40B4-BE49-F238E27FC236}">
-                <a16:creationId xmlns:a16="http://schemas.microsoft.com/office/drawing/2014/main" id="{39A92815-0DCA-4786-979B-FDE7DE11801D}"/>
+                <a16:creationId xmlns:a16="http://schemas.microsoft.com/office/drawing/2014/main" id="{0979CDC5-F480-F87E-B8E0-3112261875C3}"/>
               </a:ext>
             </a:extLst>
           </p:cNvPr>
@@ -7059,7 +7784,7 @@
         </p:nvSpPr>
         <p:spPr>
           <a:xfrm>
-            <a:off x="4990263" y="3010747"/>
+            <a:off x="2135700" y="7328922"/>
             <a:ext cx="216000" cy="215444"/>
           </a:xfrm>
           <a:prstGeom prst="rect">
@@ -7068,7 +7793,10 @@
           <a:noFill/>
           <a:ln w="9525">
             <a:solidFill>
-              <a:schemeClr val="tx1"/>
+              <a:schemeClr val="tx1">
+                <a:lumMod val="65000"/>
+                <a:lumOff val="35000"/>
+              </a:schemeClr>
             </a:solidFill>
           </a:ln>
         </p:spPr>
@@ -7080,19 +7808,33 @@
           <a:p>
             <a:pPr algn="ctr"/>
             <a:r>
-              <a:rPr lang="es-ES" sz="800" dirty="0"/>
-              <a:t>e</a:t>
+              <a:rPr lang="es-ES" sz="800">
+                <a:solidFill>
+                  <a:schemeClr val="tx1">
+                    <a:lumMod val="85000"/>
+                    <a:lumOff val="15000"/>
+                  </a:schemeClr>
+                </a:solidFill>
+              </a:rPr>
+              <a:t>c</a:t>
             </a:r>
-            <a:endParaRPr lang="en-GB" sz="800" dirty="0"/>
+            <a:endParaRPr lang="en-GB" sz="800">
+              <a:solidFill>
+                <a:schemeClr val="tx1">
+                  <a:lumMod val="85000"/>
+                  <a:lumOff val="15000"/>
+                </a:schemeClr>
+              </a:solidFill>
+            </a:endParaRPr>
           </a:p>
         </p:txBody>
       </p:sp>
       <p:sp>
         <p:nvSpPr>
-          <p:cNvPr id="116" name="TextBox 115">
+          <p:cNvPr id="80" name="TextBox 79">
             <a:extLst>
               <a:ext uri="{FF2B5EF4-FFF2-40B4-BE49-F238E27FC236}">
-                <a16:creationId xmlns:a16="http://schemas.microsoft.com/office/drawing/2014/main" id="{A7BEB4BB-01F0-40C9-A47A-CFFCBAF653E2}"/>
+                <a16:creationId xmlns:a16="http://schemas.microsoft.com/office/drawing/2014/main" id="{25352047-C30C-B405-F79D-792CA5BF09B5}"/>
               </a:ext>
             </a:extLst>
           </p:cNvPr>
@@ -7101,7 +7843,7 @@
         </p:nvSpPr>
         <p:spPr>
           <a:xfrm>
-            <a:off x="4990263" y="5815695"/>
+            <a:off x="4313868" y="2604564"/>
             <a:ext cx="216000" cy="215444"/>
           </a:xfrm>
           <a:prstGeom prst="rect">
@@ -7110,7 +7852,10 @@
           <a:noFill/>
           <a:ln w="9525">
             <a:solidFill>
-              <a:schemeClr val="tx1"/>
+              <a:schemeClr val="tx1">
+                <a:lumMod val="65000"/>
+                <a:lumOff val="35000"/>
+              </a:schemeClr>
             </a:solidFill>
           </a:ln>
         </p:spPr>
@@ -7122,336 +7867,145 @@
           <a:p>
             <a:pPr algn="ctr"/>
             <a:r>
-              <a:rPr lang="es-ES" sz="800" dirty="0"/>
-              <a:t>f</a:t>
+              <a:rPr lang="es-ES" sz="800">
+                <a:solidFill>
+                  <a:schemeClr val="tx1">
+                    <a:lumMod val="85000"/>
+                    <a:lumOff val="15000"/>
+                  </a:schemeClr>
+                </a:solidFill>
+              </a:rPr>
+              <a:t>d</a:t>
             </a:r>
-            <a:endParaRPr lang="en-GB" sz="800" dirty="0"/>
+            <a:endParaRPr lang="en-GB" sz="800">
+              <a:solidFill>
+                <a:schemeClr val="tx1">
+                  <a:lumMod val="85000"/>
+                  <a:lumOff val="15000"/>
+                </a:schemeClr>
+              </a:solidFill>
+            </a:endParaRPr>
           </a:p>
         </p:txBody>
       </p:sp>
-      <p:grpSp>
-        <p:nvGrpSpPr>
-          <p:cNvPr id="2" name="Group 1">
+      <p:sp>
+        <p:nvSpPr>
+          <p:cNvPr id="81" name="TextBox 80">
             <a:extLst>
               <a:ext uri="{FF2B5EF4-FFF2-40B4-BE49-F238E27FC236}">
-                <a16:creationId xmlns:a16="http://schemas.microsoft.com/office/drawing/2014/main" id="{18546E26-0DAE-4868-A527-05FBE2F241BA}"/>
+                <a16:creationId xmlns:a16="http://schemas.microsoft.com/office/drawing/2014/main" id="{B66E93D2-201C-DF19-6C23-B59BA0DA9F23}"/>
               </a:ext>
             </a:extLst>
           </p:cNvPr>
-          <p:cNvGrpSpPr/>
+          <p:cNvSpPr txBox="1"/>
           <p:nvPr/>
-        </p:nvGrpSpPr>
-        <p:grpSpPr>
+        </p:nvSpPr>
+        <p:spPr>
           <a:xfrm>
-            <a:off x="1495670" y="2128197"/>
-            <a:ext cx="1475885" cy="683219"/>
-            <a:chOff x="1524245" y="2147247"/>
-            <a:chExt cx="1475885" cy="683219"/>
+            <a:off x="4313868" y="4986727"/>
+            <a:ext cx="216000" cy="215444"/>
           </a:xfrm>
-        </p:grpSpPr>
-        <p:sp>
-          <p:nvSpPr>
-            <p:cNvPr id="95" name="TextBox 94">
-              <a:extLst>
-                <a:ext uri="{FF2B5EF4-FFF2-40B4-BE49-F238E27FC236}">
-                  <a16:creationId xmlns:a16="http://schemas.microsoft.com/office/drawing/2014/main" id="{E9980B4C-2EFC-49A7-90B4-9C9A97721C26}"/>
-                </a:ext>
-              </a:extLst>
-            </p:cNvPr>
-            <p:cNvSpPr txBox="1"/>
-            <p:nvPr/>
-          </p:nvSpPr>
-          <p:spPr>
-            <a:xfrm>
-              <a:off x="1671391" y="2296175"/>
-              <a:ext cx="1328739" cy="215444"/>
-            </a:xfrm>
-            <a:prstGeom prst="rect">
-              <a:avLst/>
-            </a:prstGeom>
-            <a:noFill/>
-          </p:spPr>
-          <p:txBody>
-            <a:bodyPr wrap="square" rtlCol="0">
-              <a:spAutoFit/>
-            </a:bodyPr>
-            <a:lstStyle/>
-            <a:p>
-              <a:r>
-                <a:rPr lang="en-GB" sz="800" dirty="0"/>
-                <a:t>“La Costa”</a:t>
-              </a:r>
-            </a:p>
-          </p:txBody>
-        </p:sp>
-        <p:sp>
-          <p:nvSpPr>
-            <p:cNvPr id="96" name="Oval 95">
-              <a:extLst>
-                <a:ext uri="{FF2B5EF4-FFF2-40B4-BE49-F238E27FC236}">
-                  <a16:creationId xmlns:a16="http://schemas.microsoft.com/office/drawing/2014/main" id="{99A3E4F1-8198-4D88-AE12-C7F3BBAF4306}"/>
-                </a:ext>
-              </a:extLst>
-            </p:cNvPr>
-            <p:cNvSpPr/>
-            <p:nvPr/>
-          </p:nvSpPr>
-          <p:spPr>
-            <a:xfrm>
-              <a:off x="1627631" y="2367897"/>
-              <a:ext cx="72000" cy="72000"/>
-            </a:xfrm>
-            <a:prstGeom prst="ellipse">
-              <a:avLst/>
-            </a:prstGeom>
+          <a:prstGeom prst="rect">
+            <a:avLst/>
+          </a:prstGeom>
+          <a:noFill/>
+          <a:ln w="9525">
             <a:solidFill>
-              <a:srgbClr val="FFD900"/>
+              <a:schemeClr val="tx1">
+                <a:lumMod val="65000"/>
+                <a:lumOff val="35000"/>
+              </a:schemeClr>
             </a:solidFill>
-            <a:ln w="3175">
+          </a:ln>
+        </p:spPr>
+        <p:txBody>
+          <a:bodyPr wrap="square" rtlCol="0">
+            <a:spAutoFit/>
+          </a:bodyPr>
+          <a:lstStyle/>
+          <a:p>
+            <a:pPr algn="ctr"/>
+            <a:r>
+              <a:rPr lang="es-ES" sz="800">
+                <a:solidFill>
+                  <a:schemeClr val="tx1">
+                    <a:lumMod val="85000"/>
+                    <a:lumOff val="15000"/>
+                  </a:schemeClr>
+                </a:solidFill>
+              </a:rPr>
+              <a:t>e</a:t>
+            </a:r>
+            <a:endParaRPr lang="en-GB" sz="800">
               <a:solidFill>
-                <a:schemeClr val="tx1"/>
+                <a:schemeClr val="tx1">
+                  <a:lumMod val="85000"/>
+                  <a:lumOff val="15000"/>
+                </a:schemeClr>
               </a:solidFill>
-            </a:ln>
-          </p:spPr>
-          <p:style>
-            <a:lnRef idx="2">
-              <a:schemeClr val="accent1">
-                <a:shade val="50000"/>
+            </a:endParaRPr>
+          </a:p>
+        </p:txBody>
+      </p:sp>
+      <p:sp>
+        <p:nvSpPr>
+          <p:cNvPr id="82" name="TextBox 81">
+            <a:extLst>
+              <a:ext uri="{FF2B5EF4-FFF2-40B4-BE49-F238E27FC236}">
+                <a16:creationId xmlns:a16="http://schemas.microsoft.com/office/drawing/2014/main" id="{5AD4E0C3-D847-7048-88AE-742598B249F3}"/>
+              </a:ext>
+            </a:extLst>
+          </p:cNvPr>
+          <p:cNvSpPr txBox="1"/>
+          <p:nvPr/>
+        </p:nvSpPr>
+        <p:spPr>
+          <a:xfrm>
+            <a:off x="4313868" y="7328922"/>
+            <a:ext cx="216000" cy="215444"/>
+          </a:xfrm>
+          <a:prstGeom prst="rect">
+            <a:avLst/>
+          </a:prstGeom>
+          <a:noFill/>
+          <a:ln w="9525">
+            <a:solidFill>
+              <a:schemeClr val="tx1">
+                <a:lumMod val="65000"/>
+                <a:lumOff val="35000"/>
               </a:schemeClr>
-            </a:lnRef>
-            <a:fillRef idx="1">
-              <a:schemeClr val="accent1"/>
-            </a:fillRef>
-            <a:effectRef idx="0">
-              <a:schemeClr val="accent1"/>
-            </a:effectRef>
-            <a:fontRef idx="minor">
-              <a:schemeClr val="lt1"/>
-            </a:fontRef>
-          </p:style>
-          <p:txBody>
-            <a:bodyPr rtlCol="0" anchor="ctr"/>
-            <a:lstStyle/>
-            <a:p>
-              <a:pPr algn="ctr"/>
-              <a:endParaRPr lang="en-GB" sz="800"/>
-            </a:p>
-          </p:txBody>
-        </p:sp>
-        <p:sp>
-          <p:nvSpPr>
-            <p:cNvPr id="97" name="Oval 96">
-              <a:extLst>
-                <a:ext uri="{FF2B5EF4-FFF2-40B4-BE49-F238E27FC236}">
-                  <a16:creationId xmlns:a16="http://schemas.microsoft.com/office/drawing/2014/main" id="{294CA738-FE67-4CF4-9E40-86060B91CFDE}"/>
-                </a:ext>
-              </a:extLst>
-            </p:cNvPr>
-            <p:cNvSpPr/>
-            <p:nvPr/>
-          </p:nvSpPr>
-          <p:spPr>
-            <a:xfrm>
-              <a:off x="1627631" y="2530848"/>
-              <a:ext cx="72000" cy="72000"/>
-            </a:xfrm>
-            <a:prstGeom prst="ellipse">
-              <a:avLst/>
-            </a:prstGeom>
-            <a:solidFill>
-              <a:srgbClr val="996400"/>
             </a:solidFill>
-            <a:ln w="3175">
+          </a:ln>
+        </p:spPr>
+        <p:txBody>
+          <a:bodyPr wrap="square" rtlCol="0">
+            <a:spAutoFit/>
+          </a:bodyPr>
+          <a:lstStyle/>
+          <a:p>
+            <a:pPr algn="ctr"/>
+            <a:r>
+              <a:rPr lang="es-ES" sz="800">
+                <a:solidFill>
+                  <a:schemeClr val="tx1">
+                    <a:lumMod val="85000"/>
+                    <a:lumOff val="15000"/>
+                  </a:schemeClr>
+                </a:solidFill>
+              </a:rPr>
+              <a:t>f</a:t>
+            </a:r>
+            <a:endParaRPr lang="en-GB" sz="800">
               <a:solidFill>
-                <a:schemeClr val="tx1"/>
+                <a:schemeClr val="tx1">
+                  <a:lumMod val="85000"/>
+                  <a:lumOff val="15000"/>
+                </a:schemeClr>
               </a:solidFill>
-            </a:ln>
-          </p:spPr>
-          <p:style>
-            <a:lnRef idx="2">
-              <a:schemeClr val="accent1">
-                <a:shade val="50000"/>
-              </a:schemeClr>
-            </a:lnRef>
-            <a:fillRef idx="1">
-              <a:schemeClr val="accent1"/>
-            </a:fillRef>
-            <a:effectRef idx="0">
-              <a:schemeClr val="accent1"/>
-            </a:effectRef>
-            <a:fontRef idx="minor">
-              <a:schemeClr val="lt1"/>
-            </a:fontRef>
-          </p:style>
-          <p:txBody>
-            <a:bodyPr rtlCol="0" anchor="ctr"/>
-            <a:lstStyle/>
-            <a:p>
-              <a:pPr algn="ctr"/>
-              <a:endParaRPr lang="en-GB" sz="800"/>
-            </a:p>
-          </p:txBody>
-        </p:sp>
-        <p:sp>
-          <p:nvSpPr>
-            <p:cNvPr id="98" name="Oval 97">
-              <a:extLst>
-                <a:ext uri="{FF2B5EF4-FFF2-40B4-BE49-F238E27FC236}">
-                  <a16:creationId xmlns:a16="http://schemas.microsoft.com/office/drawing/2014/main" id="{B3C4AA53-4B7A-4886-BA01-9DEB0993365A}"/>
-                </a:ext>
-              </a:extLst>
-            </p:cNvPr>
-            <p:cNvSpPr/>
-            <p:nvPr/>
-          </p:nvSpPr>
-          <p:spPr>
-            <a:xfrm>
-              <a:off x="1627631" y="2686744"/>
-              <a:ext cx="72000" cy="72000"/>
-            </a:xfrm>
-            <a:prstGeom prst="ellipse">
-              <a:avLst/>
-            </a:prstGeom>
-            <a:solidFill>
-              <a:srgbClr val="008B2F"/>
-            </a:solidFill>
-            <a:ln w="3175">
-              <a:solidFill>
-                <a:schemeClr val="tx1"/>
-              </a:solidFill>
-            </a:ln>
-          </p:spPr>
-          <p:style>
-            <a:lnRef idx="2">
-              <a:schemeClr val="accent1">
-                <a:shade val="50000"/>
-              </a:schemeClr>
-            </a:lnRef>
-            <a:fillRef idx="1">
-              <a:schemeClr val="accent1"/>
-            </a:fillRef>
-            <a:effectRef idx="0">
-              <a:schemeClr val="accent1"/>
-            </a:effectRef>
-            <a:fontRef idx="minor">
-              <a:schemeClr val="lt1"/>
-            </a:fontRef>
-          </p:style>
-          <p:txBody>
-            <a:bodyPr rtlCol="0" anchor="ctr"/>
-            <a:lstStyle/>
-            <a:p>
-              <a:pPr algn="ctr"/>
-              <a:endParaRPr lang="en-GB" sz="800"/>
-            </a:p>
-          </p:txBody>
-        </p:sp>
-        <p:sp>
-          <p:nvSpPr>
-            <p:cNvPr id="36" name="TextBox 35">
-              <a:extLst>
-                <a:ext uri="{FF2B5EF4-FFF2-40B4-BE49-F238E27FC236}">
-                  <a16:creationId xmlns:a16="http://schemas.microsoft.com/office/drawing/2014/main" id="{9BEE48C2-CA14-4B69-88A2-87E59D384FE2}"/>
-                </a:ext>
-              </a:extLst>
-            </p:cNvPr>
-            <p:cNvSpPr txBox="1"/>
-            <p:nvPr/>
-          </p:nvSpPr>
-          <p:spPr>
-            <a:xfrm>
-              <a:off x="1524245" y="2147247"/>
-              <a:ext cx="1212432" cy="215444"/>
-            </a:xfrm>
-            <a:prstGeom prst="rect">
-              <a:avLst/>
-            </a:prstGeom>
-            <a:noFill/>
-          </p:spPr>
-          <p:txBody>
-            <a:bodyPr wrap="square" rtlCol="0">
-              <a:spAutoFit/>
-            </a:bodyPr>
-            <a:lstStyle/>
-            <a:p>
-              <a:r>
-                <a:rPr lang="en-GB" sz="800" dirty="0"/>
-                <a:t>Point flood reports for:</a:t>
-              </a:r>
-            </a:p>
-          </p:txBody>
-        </p:sp>
-        <p:sp>
-          <p:nvSpPr>
-            <p:cNvPr id="37" name="TextBox 36">
-              <a:extLst>
-                <a:ext uri="{FF2B5EF4-FFF2-40B4-BE49-F238E27FC236}">
-                  <a16:creationId xmlns:a16="http://schemas.microsoft.com/office/drawing/2014/main" id="{0123747F-4327-4A3F-AA0A-EC34732D5666}"/>
-                </a:ext>
-              </a:extLst>
-            </p:cNvPr>
-            <p:cNvSpPr txBox="1"/>
-            <p:nvPr/>
-          </p:nvSpPr>
-          <p:spPr>
-            <a:xfrm>
-              <a:off x="1671391" y="2459126"/>
-              <a:ext cx="1328739" cy="215444"/>
-            </a:xfrm>
-            <a:prstGeom prst="rect">
-              <a:avLst/>
-            </a:prstGeom>
-            <a:noFill/>
-          </p:spPr>
-          <p:txBody>
-            <a:bodyPr wrap="square" rtlCol="0">
-              <a:spAutoFit/>
-            </a:bodyPr>
-            <a:lstStyle/>
-            <a:p>
-              <a:r>
-                <a:rPr lang="en-GB" sz="800" dirty="0"/>
-                <a:t>“La Sierra”</a:t>
-              </a:r>
-            </a:p>
-          </p:txBody>
-        </p:sp>
-        <p:sp>
-          <p:nvSpPr>
-            <p:cNvPr id="38" name="TextBox 37">
-              <a:extLst>
-                <a:ext uri="{FF2B5EF4-FFF2-40B4-BE49-F238E27FC236}">
-                  <a16:creationId xmlns:a16="http://schemas.microsoft.com/office/drawing/2014/main" id="{F37BACEB-E65F-4CC5-8B77-44D06A4C4C80}"/>
-                </a:ext>
-              </a:extLst>
-            </p:cNvPr>
-            <p:cNvSpPr txBox="1"/>
-            <p:nvPr/>
-          </p:nvSpPr>
-          <p:spPr>
-            <a:xfrm>
-              <a:off x="1671391" y="2615022"/>
-              <a:ext cx="1328739" cy="215444"/>
-            </a:xfrm>
-            <a:prstGeom prst="rect">
-              <a:avLst/>
-            </a:prstGeom>
-            <a:noFill/>
-          </p:spPr>
-          <p:txBody>
-            <a:bodyPr wrap="square" rtlCol="0">
-              <a:spAutoFit/>
-            </a:bodyPr>
-            <a:lstStyle/>
-            <a:p>
-              <a:r>
-                <a:rPr lang="en-GB" sz="800" dirty="0"/>
-                <a:t>“El Oriente”</a:t>
-              </a:r>
-            </a:p>
-          </p:txBody>
-        </p:sp>
-      </p:grpSp>
+            </a:endParaRPr>
+          </a:p>
+        </p:txBody>
+      </p:sp>
     </p:spTree>
     <p:extLst>
       <p:ext uri="{BB962C8B-B14F-4D97-AF65-F5344CB8AC3E}">
@@ -7720,7 +8274,7 @@
   <a:extraClrSchemeLst/>
   <a:extLst>
     <a:ext uri="{05A4C25C-085E-4340-85A3-A5531E510DB2}">
-      <thm15:themeFamily xmlns:thm15="http://schemas.microsoft.com/office/thememl/2012/main" name="Office Theme" id="{62F939B6-93AF-4DB8-9C6B-D6C7DFDC589F}" vid="{4A3C46E8-61CC-4603-A589-7422A47A8E4A}"/>
+      <thm15:themeFamily xmlns:thm15="http://schemas.microsoft.com/office/thememl/2012/main" name="Office Theme 2013 - 2022" id="{62F939B6-93AF-4DB8-9C6B-D6C7DFDC589F}" vid="{4A3C46E8-61CC-4603-A589-7422A47A8E4A}"/>
     </a:ext>
   </a:extLst>
 </a:theme>

</xml_diff>